<commit_message>
edits to pptx, removed unneeded stuff
</commit_message>
<xml_diff>
--- a/G103-capstone-1-pres-draft-1.pptx
+++ b/G103-capstone-1-pres-draft-1.pptx
@@ -8891,14 +8891,14 @@
       </p:sp>
       <p:sp>
         <p:nvSpPr>
-          <p:cNvPr id="81" name="Google Shape;81;p17"/>
+          <p:cNvPr id="4" name="Google Shape;81;p17"/>
           <p:cNvSpPr txBox="1"/>
           <p:nvPr/>
         </p:nvSpPr>
         <p:spPr>
           <a:xfrm>
-            <a:off x="757875" y="1300825"/>
-            <a:ext cx="6995400" cy="3271200"/>
+            <a:off x="0" y="887213"/>
+            <a:ext cx="8638578" cy="4091450"/>
           </a:xfrm>
           <a:prstGeom prst="rect">
             <a:avLst/>
@@ -8909,17 +8909,17 @@
           </a:ln>
         </p:spPr>
         <p:txBody>
-          <a:bodyPr spcFirstLastPara="1" wrap="square" lIns="34275" tIns="34275" rIns="34275" bIns="34275" anchor="t" anchorCtr="0">
+          <a:bodyPr spcFirstLastPara="1" wrap="square" lIns="45700" tIns="45700" rIns="45700" bIns="45700" anchor="t" anchorCtr="0">
             <a:noAutofit/>
           </a:bodyPr>
           <a:lstStyle/>
           <a:p>
-            <a:pPr marL="457200" lvl="0" indent="-342900" algn="l" rtl="0">
-              <a:spcBef>
-                <a:spcPts val="1000"/>
-              </a:spcBef>
-              <a:spcAft>
-                <a:spcPts val="1000"/>
+            <a:pPr marL="609585" indent="-457189">
+              <a:spcBef>
+                <a:spcPts val="1333"/>
+              </a:spcBef>
+              <a:spcAft>
+                <a:spcPts val="1333"/>
               </a:spcAft>
               <a:buClr>
                 <a:schemeClr val="dk1"/>
@@ -8929,7 +8929,7 @@
               <a:buChar char="•"/>
             </a:pPr>
             <a:r>
-              <a:rPr lang="en-US" dirty="0" smtClean="0">
+              <a:rPr lang="en-US" sz="1300" dirty="0">
                 <a:solidFill>
                   <a:schemeClr val="dk1"/>
                 </a:solidFill>
@@ -8938,10 +8938,10 @@
                 <a:cs typeface="Raleway"/>
                 <a:sym typeface="Raleway"/>
               </a:rPr>
-              <a:t>While it is easy to assume that there is an effect of time of day on the scores and amount of comments on </a:t>
-            </a:r>
-            <a:r>
-              <a:rPr lang="en-US" dirty="0" err="1" smtClean="0">
+              <a:t>I’ve noticed in my near decade of </a:t>
+            </a:r>
+            <a:r>
+              <a:rPr lang="en-US" sz="1300" dirty="0" err="1">
                 <a:solidFill>
                   <a:schemeClr val="dk1"/>
                 </a:solidFill>
@@ -8953,7 +8953,7 @@
               <a:t>Reddit</a:t>
             </a:r>
             <a:r>
-              <a:rPr lang="en-US" dirty="0" smtClean="0">
+              <a:rPr lang="en-US" sz="1300" dirty="0">
                 <a:solidFill>
                   <a:schemeClr val="dk1"/>
                 </a:solidFill>
@@ -8962,28 +8962,16 @@
                 <a:cs typeface="Raleway"/>
                 <a:sym typeface="Raleway"/>
               </a:rPr>
-              <a:t> posts, it is not </a:t>
-            </a:r>
-            <a:r>
-              <a:rPr lang="en-US" dirty="0" smtClean="0">
-                <a:solidFill>
-                  <a:schemeClr val="dk1"/>
-                </a:solidFill>
-                <a:latin typeface="Raleway"/>
-                <a:ea typeface="Raleway"/>
-                <a:cs typeface="Raleway"/>
-                <a:sym typeface="Raleway"/>
-              </a:rPr>
-              <a:t>immediately obvious how these scores and comment counts are distributed. </a:t>
+              <a:t> use that many posts with huge score values do not have a comparably large amount of comments. Thinking about this, I decided to make my scraper to test whether or not these values are indeed independent of one another. Furthermore, I wanted to see their relationship to time of day.</a:t>
             </a:r>
           </a:p>
           <a:p>
-            <a:pPr marL="457200" lvl="0" indent="-342900" algn="l" rtl="0">
-              <a:spcBef>
-                <a:spcPts val="1000"/>
-              </a:spcBef>
-              <a:spcAft>
-                <a:spcPts val="1000"/>
+            <a:pPr marL="609585" indent="-457189">
+              <a:spcBef>
+                <a:spcPts val="1333"/>
+              </a:spcBef>
+              <a:spcAft>
+                <a:spcPts val="1333"/>
               </a:spcAft>
               <a:buClr>
                 <a:schemeClr val="dk1"/>
@@ -8993,7 +8981,7 @@
               <a:buChar char="•"/>
             </a:pPr>
             <a:r>
-              <a:rPr lang="en-US" dirty="0" smtClean="0">
+              <a:rPr lang="en-US" sz="1300" dirty="0">
                 <a:solidFill>
                   <a:schemeClr val="dk1"/>
                 </a:solidFill>
@@ -9002,10 +8990,10 @@
                 <a:cs typeface="Raleway"/>
                 <a:sym typeface="Raleway"/>
               </a:rPr>
-              <a:t>I created a </a:t>
-            </a:r>
-            <a:r>
-              <a:rPr lang="en-US" dirty="0" err="1" smtClean="0">
+              <a:t>I created my scraper using the PRAW library that scraped </a:t>
+            </a:r>
+            <a:r>
+              <a:rPr lang="en-US" sz="1300" dirty="0" err="1">
                 <a:solidFill>
                   <a:schemeClr val="dk1"/>
                 </a:solidFill>
@@ -9014,10 +9002,10 @@
                 <a:cs typeface="Raleway"/>
                 <a:sym typeface="Raleway"/>
               </a:rPr>
-              <a:t>reddit</a:t>
-            </a:r>
-            <a:r>
-              <a:rPr lang="en-US" dirty="0" smtClean="0">
+              <a:t>datetime</a:t>
+            </a:r>
+            <a:r>
+              <a:rPr lang="en-US" sz="1300" dirty="0">
                 <a:solidFill>
                   <a:schemeClr val="dk1"/>
                 </a:solidFill>
@@ -9026,10 +9014,10 @@
                 <a:cs typeface="Raleway"/>
                 <a:sym typeface="Raleway"/>
               </a:rPr>
-              <a:t> scraper using the PRAW library that scraped </a:t>
-            </a:r>
-            <a:r>
-              <a:rPr lang="en-US" dirty="0" err="1" smtClean="0">
+              <a:t>, ID, number of comments, title text, score, </a:t>
+            </a:r>
+            <a:r>
+              <a:rPr lang="en-US" sz="1300" dirty="0" err="1">
                 <a:solidFill>
                   <a:schemeClr val="dk1"/>
                 </a:solidFill>
@@ -9038,10 +9026,10 @@
                 <a:cs typeface="Raleway"/>
                 <a:sym typeface="Raleway"/>
               </a:rPr>
-              <a:t>datetime</a:t>
-            </a:r>
-            <a:r>
-              <a:rPr lang="en-US" dirty="0" smtClean="0">
+              <a:t>bodytext</a:t>
+            </a:r>
+            <a:r>
+              <a:rPr lang="en-US" sz="1300" dirty="0">
                 <a:solidFill>
                   <a:schemeClr val="dk1"/>
                 </a:solidFill>
@@ -9050,10 +9038,10 @@
                 <a:cs typeface="Raleway"/>
                 <a:sym typeface="Raleway"/>
               </a:rPr>
-              <a:t>, ID, number of comments, title text, score, </a:t>
-            </a:r>
-            <a:r>
-              <a:rPr lang="en-US" dirty="0" err="1" smtClean="0">
+              <a:t>, and URLs from </a:t>
+            </a:r>
+            <a:r>
+              <a:rPr lang="en-US" sz="1300" dirty="0" err="1">
                 <a:solidFill>
                   <a:schemeClr val="dk1"/>
                 </a:solidFill>
@@ -9062,10 +9050,10 @@
                 <a:cs typeface="Raleway"/>
                 <a:sym typeface="Raleway"/>
               </a:rPr>
-              <a:t>bodytext</a:t>
-            </a:r>
-            <a:r>
-              <a:rPr lang="en-US" dirty="0" smtClean="0">
+              <a:t>reddit</a:t>
+            </a:r>
+            <a:r>
+              <a:rPr lang="en-US" sz="1300" dirty="0">
                 <a:solidFill>
                   <a:schemeClr val="dk1"/>
                 </a:solidFill>
@@ -9074,10 +9062,10 @@
                 <a:cs typeface="Raleway"/>
                 <a:sym typeface="Raleway"/>
               </a:rPr>
-              <a:t>, and URLs from </a:t>
-            </a:r>
-            <a:r>
-              <a:rPr lang="en-US" dirty="0" err="1" smtClean="0">
+              <a:t>/r/all. There was an error with the body text, so this was immediately dropped from the </a:t>
+            </a:r>
+            <a:r>
+              <a:rPr lang="en-US" sz="1300" dirty="0" err="1">
                 <a:solidFill>
                   <a:schemeClr val="dk1"/>
                 </a:solidFill>
@@ -9086,10 +9074,10 @@
                 <a:cs typeface="Raleway"/>
                 <a:sym typeface="Raleway"/>
               </a:rPr>
-              <a:t>reddit</a:t>
-            </a:r>
-            <a:r>
-              <a:rPr lang="en-US" dirty="0" smtClean="0">
+              <a:t>dataframe</a:t>
+            </a:r>
+            <a:r>
+              <a:rPr lang="en-US" sz="1300" dirty="0">
                 <a:solidFill>
                   <a:schemeClr val="dk1"/>
                 </a:solidFill>
@@ -9098,40 +9086,16 @@
                 <a:cs typeface="Raleway"/>
                 <a:sym typeface="Raleway"/>
               </a:rPr>
-              <a:t>/r/all. There was an error with the body text, so this was immediately dropped from the </a:t>
-            </a:r>
-            <a:r>
-              <a:rPr lang="en-US" dirty="0" err="1" smtClean="0">
-                <a:solidFill>
-                  <a:schemeClr val="dk1"/>
-                </a:solidFill>
-                <a:latin typeface="Raleway"/>
-                <a:ea typeface="Raleway"/>
-                <a:cs typeface="Raleway"/>
-                <a:sym typeface="Raleway"/>
-              </a:rPr>
-              <a:t>dataframe</a:t>
-            </a:r>
-            <a:r>
-              <a:rPr lang="en-US" dirty="0" smtClean="0">
-                <a:solidFill>
-                  <a:schemeClr val="dk1"/>
-                </a:solidFill>
-                <a:latin typeface="Raleway"/>
-                <a:ea typeface="Raleway"/>
-                <a:cs typeface="Raleway"/>
-                <a:sym typeface="Raleway"/>
-              </a:rPr>
               <a:t>. </a:t>
             </a:r>
           </a:p>
           <a:p>
-            <a:pPr marL="457200" lvl="0" indent="-342900">
-              <a:spcBef>
-                <a:spcPts val="1000"/>
-              </a:spcBef>
-              <a:spcAft>
-                <a:spcPts val="1000"/>
+            <a:pPr marL="609585" indent="-457189">
+              <a:spcBef>
+                <a:spcPts val="1333"/>
+              </a:spcBef>
+              <a:spcAft>
+                <a:spcPts val="1333"/>
               </a:spcAft>
               <a:buClr>
                 <a:schemeClr val="dk1"/>
@@ -9141,7 +9105,7 @@
               <a:buChar char="•"/>
             </a:pPr>
             <a:r>
-              <a:rPr lang="en-US" dirty="0" smtClean="0">
+              <a:rPr lang="en-US" sz="1300" dirty="0">
                 <a:solidFill>
                   <a:schemeClr val="dk1"/>
                 </a:solidFill>
@@ -9153,7 +9117,7 @@
               <a:t>The scraper scraped the ‘Hot’ organization of posts on r/all from </a:t>
             </a:r>
             <a:r>
-              <a:rPr lang="is-IS" dirty="0">
+              <a:rPr lang="is-IS" sz="1300" dirty="0">
                 <a:solidFill>
                   <a:schemeClr val="dk1"/>
                 </a:solidFill>
@@ -9162,52 +9126,16 @@
                 <a:cs typeface="Raleway"/>
                 <a:sym typeface="Raleway"/>
               </a:rPr>
-              <a:t>2020-01-03 </a:t>
-            </a:r>
-            <a:r>
-              <a:rPr lang="is-IS" dirty="0" smtClean="0">
-                <a:solidFill>
-                  <a:schemeClr val="dk1"/>
-                </a:solidFill>
-                <a:latin typeface="Raleway"/>
-                <a:ea typeface="Raleway"/>
-                <a:cs typeface="Raleway"/>
-                <a:sym typeface="Raleway"/>
-              </a:rPr>
-              <a:t>07:04:51 to 2020-01-06 08:30:00. </a:t>
-            </a:r>
-            <a:r>
-              <a:rPr lang="is-IS" dirty="0">
-                <a:solidFill>
-                  <a:schemeClr val="dk1"/>
-                </a:solidFill>
-                <a:latin typeface="Raleway"/>
-                <a:ea typeface="Raleway"/>
-                <a:cs typeface="Raleway"/>
-                <a:sym typeface="Raleway"/>
-              </a:rPr>
-              <a:t>S</a:t>
-            </a:r>
-            <a:r>
-              <a:rPr lang="is-IS" dirty="0" smtClean="0">
-                <a:solidFill>
-                  <a:schemeClr val="dk1"/>
-                </a:solidFill>
-                <a:latin typeface="Raleway"/>
-                <a:ea typeface="Raleway"/>
-                <a:cs typeface="Raleway"/>
-                <a:sym typeface="Raleway"/>
-              </a:rPr>
-              <a:t>ome posts incorrectly had datetime values after the time of scraping, and were removed. </a:t>
+              <a:t>2020-01-03 07:04:51 to 2020-01-06 06:00:00. Some posts incorrectly had datetime values after the time of scraping, and were removed due to impossibility. </a:t>
             </a:r>
           </a:p>
           <a:p>
-            <a:pPr marL="457200" lvl="0" indent="-342900">
-              <a:spcBef>
-                <a:spcPts val="1000"/>
-              </a:spcBef>
-              <a:spcAft>
-                <a:spcPts val="1000"/>
+            <a:pPr marL="609585" indent="-457189">
+              <a:spcBef>
+                <a:spcPts val="1333"/>
+              </a:spcBef>
+              <a:spcAft>
+                <a:spcPts val="1333"/>
               </a:spcAft>
               <a:buClr>
                 <a:schemeClr val="dk1"/>
@@ -9217,7 +9145,7 @@
               <a:buChar char="•"/>
             </a:pPr>
             <a:r>
-              <a:rPr lang="is-IS" dirty="0" smtClean="0">
+              <a:rPr lang="is-IS" sz="1300" dirty="0">
                 <a:solidFill>
                   <a:schemeClr val="dk1"/>
                 </a:solidFill>
@@ -9226,16 +9154,16 @@
                 <a:cs typeface="Raleway"/>
                 <a:sym typeface="Raleway"/>
               </a:rPr>
-              <a:t> After primary EDA, my main question became clear: does hour of the day affect the amount of posts made per hour above the average comment or score threshold? </a:t>
+              <a:t> After primary EDA, my main questions became clear: does hour of the day affect the amount of posts made per hour that are above the average comment or score threshold? Are their certain periods of the day where highly upvoted posts and highly commented posts are less likely to be made?</a:t>
             </a:r>
           </a:p>
           <a:p>
-            <a:pPr marL="457200" lvl="0" indent="-342900">
-              <a:spcBef>
-                <a:spcPts val="1000"/>
-              </a:spcBef>
-              <a:spcAft>
-                <a:spcPts val="1000"/>
+            <a:pPr marL="609585" indent="-457189">
+              <a:spcBef>
+                <a:spcPts val="1333"/>
+              </a:spcBef>
+              <a:spcAft>
+                <a:spcPts val="1333"/>
               </a:spcAft>
               <a:buClr>
                 <a:schemeClr val="dk1"/>
@@ -9244,7 +9172,7 @@
               <a:buFont typeface="Raleway"/>
               <a:buChar char="•"/>
             </a:pPr>
-            <a:endParaRPr lang="en-US" dirty="0" smtClean="0">
+            <a:endParaRPr lang="en-US" sz="2400" dirty="0">
               <a:solidFill>
                 <a:schemeClr val="dk1"/>
               </a:solidFill>
@@ -9326,44 +9254,25 @@
           <a:p>
             <a:r>
               <a:rPr lang="en-US" sz="1100" dirty="0"/>
-              <a:t>At the beginning of my analysis, </a:t>
-            </a:r>
-            <a:r>
-              <a:rPr lang="en-US" sz="1100" dirty="0" smtClean="0"/>
-              <a:t>I plotted the total count of posts by hour over the period I was scraping during      </a:t>
+              <a:t>At the beginning of my analysis, I plotted the total count of posts by hour over the period I was scraping (time delta = 2 days, 22 hour, 55 minutes and 9 seconds). From this we can see the counts form a multinomial distribution with cresting </a:t>
+            </a:r>
+            <a:r>
+              <a:rPr lang="en-US" sz="1100" dirty="0" err="1"/>
+              <a:t>occuring</a:t>
             </a:r>
             <a:r>
               <a:rPr lang="en-US" sz="1100" dirty="0"/>
-              <a:t>the time period (time delta = </a:t>
-            </a:r>
-            <a:r>
-              <a:rPr lang="en-US" sz="1100" dirty="0" smtClean="0"/>
-              <a:t>2 days</a:t>
+              <a:t> around 00:00 and </a:t>
+            </a:r>
+            <a:r>
+              <a:rPr lang="en-US" sz="1100" dirty="0" err="1"/>
+              <a:t>troughing</a:t>
             </a:r>
             <a:r>
               <a:rPr lang="en-US" sz="1100" dirty="0"/>
-              <a:t>, </a:t>
-            </a:r>
-            <a:r>
-              <a:rPr lang="en-US" sz="1100" dirty="0" smtClean="0"/>
-              <a:t>22 hour, 55 </a:t>
-            </a:r>
-            <a:r>
-              <a:rPr lang="en-US" sz="1100" dirty="0"/>
-              <a:t>minutes and 9 </a:t>
-            </a:r>
-            <a:r>
-              <a:rPr lang="en-US" sz="1100" dirty="0" smtClean="0"/>
-              <a:t>seconds). From this we can see the counts form a multinomial distribution with cresting around 00:00 and </a:t>
-            </a:r>
-            <a:r>
-              <a:rPr lang="en-US" sz="1100" dirty="0" err="1" smtClean="0"/>
-              <a:t>troughing</a:t>
-            </a:r>
-            <a:r>
-              <a:rPr lang="en-US" sz="1100" dirty="0" smtClean="0"/>
-              <a:t> just after 12:00. </a:t>
-            </a:r>
+              <a:t> just after 12:00 on each day. This pattern inspired this study. </a:t>
+            </a:r>
+            <a:endParaRPr lang="en-US" sz="1100" dirty="0"/>
           </a:p>
         </p:txBody>
       </p:sp>
@@ -9784,7 +9693,7 @@
               <a:buChar char="•"/>
             </a:pPr>
             <a:r>
-              <a:rPr lang="en-US" dirty="0" smtClean="0">
+              <a:rPr lang="en-US" dirty="0">
                 <a:solidFill>
                   <a:schemeClr val="dk1"/>
                 </a:solidFill>
@@ -9793,11 +9702,11 @@
                 <a:cs typeface="Raleway"/>
                 <a:sym typeface="Raleway"/>
               </a:rPr>
-              <a:t>Encouraged by the findings of the chi square-test, I performed 4 more t-tests:</a:t>
+              <a:t>Encouraged by the findings of the chi square-test, I performed 4 more independent samples t-tests:</a:t>
             </a:r>
           </a:p>
           <a:p>
-            <a:pPr marL="114300" lvl="1">
+            <a:pPr marL="114300">
               <a:spcBef>
                 <a:spcPts val="1000"/>
               </a:spcBef>
@@ -9819,10 +9728,10 @@
                 <a:cs typeface="Raleway"/>
                 <a:sym typeface="Raleway"/>
               </a:rPr>
-              <a:t>	-First, I determined that whether or not it is morning or afternoon does not 	significantly effect the amount of posts made with scores, t(22) = 1.70, p=.103, and 	comments, t(22) = </a:t>
-            </a:r>
-            <a:r>
-              <a:rPr lang="nb-NO" dirty="0" smtClean="0">
+              <a:t>	-</a:t>
+            </a:r>
+            <a:r>
+              <a:rPr lang="en-US" dirty="0">
                 <a:solidFill>
                   <a:schemeClr val="dk1"/>
                 </a:solidFill>
@@ -9831,10 +9740,10 @@
                 <a:cs typeface="Raleway"/>
                 <a:sym typeface="Raleway"/>
               </a:rPr>
-              <a:t>0.360, </a:t>
-            </a:r>
-            <a:r>
-              <a:rPr lang="nb-NO" dirty="0" err="1" smtClean="0">
+              <a:t>First, I determined that whether it is morning (0-11 hours) or afternoon (12-23) 	does not significantly effect the amount of posts made with scores, t(22) = -1.699, 	p=.103, and comments, t(22) = 0.783, </a:t>
+            </a:r>
+            <a:r>
+              <a:rPr lang="en-US" dirty="0" err="1">
                 <a:solidFill>
                   <a:schemeClr val="dk1"/>
                 </a:solidFill>
@@ -9846,7 +9755,7 @@
               <a:t>pvalue</a:t>
             </a:r>
             <a:r>
-              <a:rPr lang="nb-NO" dirty="0" smtClean="0">
+              <a:rPr lang="en-US" dirty="0">
                 <a:solidFill>
                   <a:schemeClr val="dk1"/>
                 </a:solidFill>
@@ -9855,23 +9764,11 @@
                 <a:cs typeface="Raleway"/>
                 <a:sym typeface="Raleway"/>
               </a:rPr>
-              <a:t>=0.726</a:t>
-            </a:r>
-            <a:r>
-              <a:rPr lang="en-US" dirty="0" smtClean="0">
-                <a:solidFill>
-                  <a:schemeClr val="dk1"/>
-                </a:solidFill>
-                <a:latin typeface="Raleway"/>
-                <a:ea typeface="Raleway"/>
-                <a:cs typeface="Raleway"/>
-                <a:sym typeface="Raleway"/>
-              </a:rPr>
-              <a:t>. </a:t>
+              <a:t>=0.442. </a:t>
             </a:r>
           </a:p>
           <a:p>
-            <a:pPr marL="114300" lvl="1">
+            <a:pPr marL="114300">
               <a:spcBef>
                 <a:spcPts val="1000"/>
               </a:spcBef>
@@ -9893,7 +9790,7 @@
                 <a:cs typeface="Raleway"/>
                 <a:sym typeface="Raleway"/>
               </a:rPr>
-              <a:t>	- Secondly, I did determine that there was a significant difference in the mean posts 	made during working hours (9-18) and privately spent hours (</a:t>
+              <a:t>	- </a:t>
             </a:r>
             <a:r>
               <a:rPr lang="en-US" dirty="0">
@@ -9905,125 +9802,8 @@
                 <a:cs typeface="Raleway"/>
                 <a:sym typeface="Raleway"/>
               </a:rPr>
-              <a:t>measuring hours 0-8 </a:t>
-            </a:r>
-            <a:r>
-              <a:rPr lang="en-US" dirty="0" smtClean="0">
-                <a:solidFill>
-                  <a:schemeClr val="dk1"/>
-                </a:solidFill>
-                <a:latin typeface="Raleway"/>
-                <a:ea typeface="Raleway"/>
-                <a:cs typeface="Raleway"/>
-                <a:sym typeface="Raleway"/>
-              </a:rPr>
-              <a:t>	and </a:t>
-            </a:r>
-            <a:r>
-              <a:rPr lang="en-US" dirty="0">
-                <a:solidFill>
-                  <a:schemeClr val="dk1"/>
-                </a:solidFill>
-                <a:latin typeface="Raleway"/>
-                <a:ea typeface="Raleway"/>
-                <a:cs typeface="Raleway"/>
-                <a:sym typeface="Raleway"/>
-              </a:rPr>
-              <a:t>hours 19-23) </a:t>
-            </a:r>
-            <a:r>
-              <a:rPr lang="en-US" dirty="0" smtClean="0">
-                <a:solidFill>
-                  <a:schemeClr val="dk1"/>
-                </a:solidFill>
-                <a:latin typeface="Raleway"/>
-                <a:ea typeface="Raleway"/>
-                <a:cs typeface="Raleway"/>
-                <a:sym typeface="Raleway"/>
-              </a:rPr>
-              <a:t>for scores, t(22) </a:t>
-            </a:r>
-            <a:r>
-              <a:rPr lang="is-IS" dirty="0" smtClean="0">
-                <a:solidFill>
-                  <a:schemeClr val="dk1"/>
-                </a:solidFill>
-                <a:latin typeface="Raleway"/>
-                <a:ea typeface="Raleway"/>
-                <a:cs typeface="Raleway"/>
-                <a:sym typeface="Raleway"/>
-              </a:rPr>
-              <a:t>=5.391744526383595</a:t>
-            </a:r>
-            <a:r>
-              <a:rPr lang="is-IS" dirty="0">
-                <a:solidFill>
-                  <a:schemeClr val="dk1"/>
-                </a:solidFill>
-                <a:latin typeface="Raleway"/>
-                <a:ea typeface="Raleway"/>
-                <a:cs typeface="Raleway"/>
-                <a:sym typeface="Raleway"/>
-              </a:rPr>
-              <a:t>, </a:t>
-            </a:r>
-            <a:r>
-              <a:rPr lang="is-IS" dirty="0" smtClean="0">
-                <a:solidFill>
-                  <a:schemeClr val="dk1"/>
-                </a:solidFill>
-                <a:latin typeface="Raleway"/>
-                <a:ea typeface="Raleway"/>
-                <a:cs typeface="Raleway"/>
-                <a:sym typeface="Raleway"/>
-              </a:rPr>
-              <a:t>p=2.051e-05, and 	comments, </a:t>
-            </a:r>
-            <a:r>
-              <a:rPr lang="nb-NO" dirty="0" smtClean="0">
-                <a:solidFill>
-                  <a:schemeClr val="dk1"/>
-                </a:solidFill>
-                <a:latin typeface="Raleway"/>
-                <a:ea typeface="Raleway"/>
-                <a:cs typeface="Raleway"/>
-                <a:sym typeface="Raleway"/>
-              </a:rPr>
-              <a:t>t(22)=6.546265522854069</a:t>
-            </a:r>
-            <a:r>
-              <a:rPr lang="nb-NO" dirty="0">
-                <a:solidFill>
-                  <a:schemeClr val="dk1"/>
-                </a:solidFill>
-                <a:latin typeface="Raleway"/>
-                <a:ea typeface="Raleway"/>
-                <a:cs typeface="Raleway"/>
-                <a:sym typeface="Raleway"/>
-              </a:rPr>
-              <a:t>, </a:t>
-            </a:r>
-            <a:r>
-              <a:rPr lang="nb-NO" dirty="0" smtClean="0">
-                <a:solidFill>
-                  <a:schemeClr val="dk1"/>
-                </a:solidFill>
-                <a:latin typeface="Raleway"/>
-                <a:ea typeface="Raleway"/>
-                <a:cs typeface="Raleway"/>
-                <a:sym typeface="Raleway"/>
-              </a:rPr>
-              <a:t>p=1.388e-06).</a:t>
-            </a:r>
-            <a:endParaRPr lang="en-US" dirty="0" smtClean="0">
-              <a:solidFill>
-                <a:schemeClr val="dk1"/>
-              </a:solidFill>
-              <a:latin typeface="Raleway"/>
-              <a:ea typeface="Raleway"/>
-              <a:cs typeface="Raleway"/>
-              <a:sym typeface="Raleway"/>
-            </a:endParaRPr>
+              <a:t>Secondly, I found that there was a significant difference in the mean posts 	made 	during working hours (9-18) and privately spent hours (measuring hours 0-8 	and 	hours 19-23) for scores, t(22) =2.620, p=0.0156, and comments, 	t(22)=4.491, p=1.82e-4).</a:t>
+            </a:r>
           </a:p>
         </p:txBody>
       </p:sp>
@@ -10091,46 +9871,37 @@
           <a:lstStyle/>
           <a:p>
             <a:r>
-              <a:rPr lang="en-US" sz="1200" dirty="0" smtClean="0"/>
+              <a:rPr lang="en-US" sz="1200" dirty="0"/>
               <a:t>Its now evident that some factors associated with time of day are significantly associated with the rate at which highly </a:t>
             </a:r>
             <a:r>
-              <a:rPr lang="en-US" sz="1200" dirty="0" err="1" smtClean="0"/>
+              <a:rPr lang="en-US" sz="1200" dirty="0" err="1"/>
               <a:t>upvoted</a:t>
             </a:r>
             <a:r>
-              <a:rPr lang="en-US" sz="1200" dirty="0" smtClean="0"/>
+              <a:rPr lang="en-US" sz="1200" dirty="0"/>
               <a:t> posts and comments are made. </a:t>
             </a:r>
           </a:p>
           <a:p>
             <a:r>
-              <a:rPr lang="en-US" sz="1200" dirty="0" smtClean="0"/>
+              <a:rPr lang="en-US" sz="1200" dirty="0"/>
               <a:t>The next step would be to determine what these factors are, such as the work day effect indicated in this project, and incorporating those into a predictive model. This model could be modified to create a viable method for determining the best time of days for marketing on </a:t>
             </a:r>
             <a:r>
-              <a:rPr lang="en-US" sz="1200" dirty="0" err="1" smtClean="0"/>
+              <a:rPr lang="en-US" sz="1200" dirty="0" err="1"/>
               <a:t>reddit</a:t>
             </a:r>
             <a:r>
-              <a:rPr lang="en-US" sz="1200" dirty="0" smtClean="0"/>
+              <a:rPr lang="en-US" sz="1200" dirty="0"/>
               <a:t>. </a:t>
             </a:r>
           </a:p>
           <a:p>
             <a:r>
-              <a:rPr lang="en-US" sz="1200" dirty="0" smtClean="0"/>
-              <a:t>My goal for my next capstone is to take the scraped title data I already have, incorporate it with newly scraped information as well as comment text data, and then use </a:t>
-            </a:r>
-            <a:r>
-              <a:rPr lang="en-US" sz="1200" dirty="0" err="1" smtClean="0"/>
-              <a:t>nlp</a:t>
-            </a:r>
-            <a:r>
-              <a:rPr lang="en-US" sz="1200" dirty="0" smtClean="0"/>
-              <a:t> to optimize my model of posting. </a:t>
-            </a:r>
-            <a:endParaRPr lang="en-US" sz="1200" dirty="0"/>
+              <a:rPr lang="en-US" sz="1200" dirty="0"/>
+              <a:t>My goal for my next capstone is to take the scraped title data I already have, incorporate it with newly scraped information as well as comment text data, and then use NLP to optimize my model of posting rates. </a:t>
+            </a:r>
           </a:p>
         </p:txBody>
       </p:sp>
@@ -10205,7 +9976,7 @@
     </p:spTree>
     <p:extLst>
       <p:ext uri="{BB962C8B-B14F-4D97-AF65-F5344CB8AC3E}">
-        <p14:creationId xmlns:p14="http://schemas.microsoft.com/office/powerpoint/2010/main" val="1269737413"/>
+        <p14:creationId xmlns:p14="http://schemas.microsoft.com/office/powerpoint/2010/main" val="1640329882"/>
       </p:ext>
     </p:extLst>
   </p:cSld>

</xml_diff>

<commit_message>
edits to final presentation and EDA doc
</commit_message>
<xml_diff>
--- a/G103-capstone-1-pres-draft-1.pptx
+++ b/G103-capstone-1-pres-draft-1.pptx
@@ -5,7 +5,7 @@
     <p:sldMasterId id="2147483661" r:id="rId1"/>
   </p:sldMasterIdLst>
   <p:notesMasterIdLst>
-    <p:notesMasterId r:id="rId12"/>
+    <p:notesMasterId r:id="rId13"/>
   </p:notesMasterIdLst>
   <p:sldIdLst>
     <p:sldId id="256" r:id="rId2"/>
@@ -14,10 +14,11 @@
     <p:sldId id="267" r:id="rId5"/>
     <p:sldId id="269" r:id="rId6"/>
     <p:sldId id="259" r:id="rId7"/>
-    <p:sldId id="270" r:id="rId8"/>
-    <p:sldId id="271" r:id="rId9"/>
-    <p:sldId id="265" r:id="rId10"/>
-    <p:sldId id="266" r:id="rId11"/>
+    <p:sldId id="272" r:id="rId8"/>
+    <p:sldId id="270" r:id="rId9"/>
+    <p:sldId id="271" r:id="rId10"/>
+    <p:sldId id="265" r:id="rId11"/>
+    <p:sldId id="266" r:id="rId12"/>
   </p:sldIdLst>
   <p:sldSz cx="9144000" cy="5143500" type="screen16x9"/>
   <p:notesSz cx="6858000" cy="9144000"/>
@@ -761,6 +762,55 @@
           </a:bodyPr>
           <a:lstStyle/>
           <a:p>
+            <a:pPr marL="457200" marR="0" lvl="0" indent="-317500" algn="l" defTabSz="914400" rtl="0" eaLnBrk="1" fontAlgn="auto" latinLnBrk="0" hangingPunct="1">
+              <a:lnSpc>
+                <a:spcPct val="100000"/>
+              </a:lnSpc>
+              <a:spcBef>
+                <a:spcPts val="0"/>
+              </a:spcBef>
+              <a:spcAft>
+                <a:spcPts val="0"/>
+              </a:spcAft>
+              <a:buClr>
+                <a:srgbClr val="000000"/>
+              </a:buClr>
+              <a:buSzPts val="1400"/>
+              <a:buFont typeface="Arial"/>
+              <a:buChar char="-"/>
+              <a:tabLst/>
+              <a:defRPr/>
+            </a:pPr>
+            <a:r>
+              <a:rPr lang="en-US" dirty="0" smtClean="0"/>
+              <a:t>Hi,</a:t>
+            </a:r>
+            <a:r>
+              <a:rPr lang="en-US" baseline="0" dirty="0" smtClean="0"/>
+              <a:t> My name is James Skelton and I am a data scientist. This is my first capstone project: an analysis of </a:t>
+            </a:r>
+            <a:r>
+              <a:rPr lang="en-US" baseline="0" dirty="0" err="1" smtClean="0"/>
+              <a:t>Reddit</a:t>
+            </a:r>
+            <a:r>
+              <a:rPr lang="en-US" baseline="0" dirty="0" smtClean="0"/>
+              <a:t> </a:t>
+            </a:r>
+            <a:r>
+              <a:rPr lang="en-US" sz="1100" b="1" dirty="0" smtClean="0">
+                <a:solidFill>
+                  <a:srgbClr val="FFFFFF"/>
+                </a:solidFill>
+                <a:latin typeface="Raleway"/>
+                <a:ea typeface="Raleway"/>
+                <a:cs typeface="Raleway"/>
+                <a:sym typeface="Raleway"/>
+              </a:rPr>
+              <a:t>Scores and Comments by Hour of Day</a:t>
+            </a:r>
+          </a:p>
+          <a:p>
             <a:pPr marL="457200" lvl="0" indent="-317500" algn="l" rtl="0">
               <a:spcBef>
                 <a:spcPts val="0"/>
@@ -771,7 +821,7 @@
               <a:buSzPts val="1400"/>
               <a:buChar char="-"/>
             </a:pPr>
-            <a:endParaRPr/>
+            <a:endParaRPr dirty="0"/>
           </a:p>
         </p:txBody>
       </p:sp>
@@ -884,7 +934,54 @@
               </a:spcAft>
               <a:buNone/>
             </a:pPr>
-            <a:endParaRPr/>
+            <a:r>
+              <a:rPr lang="en-US" dirty="0" smtClean="0"/>
+              <a:t>I</a:t>
+            </a:r>
+            <a:r>
+              <a:rPr lang="en-US" baseline="0" dirty="0" smtClean="0"/>
+              <a:t> graduated in 2018 with a BSc in </a:t>
+            </a:r>
+            <a:r>
+              <a:rPr lang="en-US" baseline="0" dirty="0" err="1" smtClean="0"/>
+              <a:t>pyschology</a:t>
+            </a:r>
+            <a:r>
+              <a:rPr lang="en-US" baseline="0" dirty="0" smtClean="0"/>
+              <a:t> from the University of St. Andrews in Scotland. Before making a career change, I was a private tutor in the </a:t>
+            </a:r>
+            <a:r>
+              <a:rPr lang="en-US" baseline="0" dirty="0" err="1" smtClean="0"/>
+              <a:t>austin</a:t>
+            </a:r>
+            <a:r>
+              <a:rPr lang="en-US" baseline="0" dirty="0" smtClean="0"/>
+              <a:t> area. </a:t>
+            </a:r>
+          </a:p>
+          <a:p>
+            <a:pPr marL="0" lvl="0" indent="0" algn="l" rtl="0">
+              <a:spcBef>
+                <a:spcPts val="0"/>
+              </a:spcBef>
+              <a:spcAft>
+                <a:spcPts val="0"/>
+              </a:spcAft>
+              <a:buNone/>
+            </a:pPr>
+            <a:r>
+              <a:rPr lang="en-US" baseline="0" dirty="0" smtClean="0"/>
+              <a:t>I am a compulsive </a:t>
+            </a:r>
+            <a:r>
+              <a:rPr lang="en-US" baseline="0" dirty="0" err="1" smtClean="0"/>
+              <a:t>reddit</a:t>
+            </a:r>
+            <a:r>
+              <a:rPr lang="en-US" baseline="0" dirty="0" smtClean="0"/>
+              <a:t> browser, which naturally lead me to this topic. </a:t>
+            </a:r>
+            <a:endParaRPr dirty="0"/>
           </a:p>
         </p:txBody>
       </p:sp>
@@ -997,7 +1094,38 @@
               </a:spcAft>
               <a:buNone/>
             </a:pPr>
-            <a:endParaRPr/>
+            <a:r>
+              <a:rPr lang="en-US" dirty="0" smtClean="0"/>
+              <a:t>After 8 years of using </a:t>
+            </a:r>
+            <a:r>
+              <a:rPr lang="en-US" dirty="0" err="1" smtClean="0"/>
+              <a:t>reddit</a:t>
+            </a:r>
+            <a:r>
+              <a:rPr lang="en-US" dirty="0" smtClean="0"/>
+              <a:t>, I</a:t>
+            </a:r>
+            <a:r>
+              <a:rPr lang="en-US" baseline="0" dirty="0" smtClean="0"/>
+              <a:t> had always thought it was odd how their appeared to be an noticeable amount of posts that had a significant amounts of </a:t>
+            </a:r>
+            <a:r>
+              <a:rPr lang="en-US" baseline="0" dirty="0" err="1" smtClean="0"/>
+              <a:t>upvotes</a:t>
+            </a:r>
+            <a:r>
+              <a:rPr lang="en-US" baseline="0" dirty="0" smtClean="0"/>
+              <a:t> (score value), but did not have a comparable amount of comments, and vice versa. With that in mind, I focused on these two categories for scraping, as well as their created time. Scraping from the hot post organization on r/all allowed me to get posts that were suitably “seen” and had been generally given a chance to receive </a:t>
+            </a:r>
+            <a:r>
+              <a:rPr lang="en-US" baseline="0" dirty="0" err="1" smtClean="0"/>
+              <a:t>upvotes</a:t>
+            </a:r>
+            <a:r>
+              <a:rPr lang="en-US" baseline="0" dirty="0" smtClean="0"/>
+              <a:t> and comments before scraping. </a:t>
+            </a:r>
           </a:p>
         </p:txBody>
       </p:sp>
@@ -1104,6 +1232,110 @@
           <a:bodyPr/>
           <a:lstStyle/>
           <a:p>
+            <a:r>
+              <a:rPr lang="en-US" dirty="0" smtClean="0"/>
+              <a:t>To</a:t>
+            </a:r>
+            <a:r>
+              <a:rPr lang="en-US" baseline="0" dirty="0" smtClean="0"/>
+              <a:t> begin, I made a simple histogram of the total count of posts made per hour over my period of scraping. As you can see, a clear pattern forms where there is peak activity around midnight, and a trough of activity around 1 pm. This pattern is what inspired me to focus on the effects related to day time on the posts. </a:t>
+            </a:r>
+          </a:p>
+          <a:p>
+            <a:r>
+              <a:rPr lang="en-US" baseline="0" dirty="0" smtClean="0"/>
+              <a:t>This led me to consider two possibilities: is there a difference in these values in the morning and the afternoon? What about the workday and the hours outside of the work day?</a:t>
+            </a:r>
+            <a:endParaRPr lang="en-US" dirty="0"/>
+          </a:p>
+        </p:txBody>
+      </p:sp>
+    </p:spTree>
+    <p:extLst>
+      <p:ext uri="{BB962C8B-B14F-4D97-AF65-F5344CB8AC3E}">
+        <p14:creationId xmlns:p14="http://schemas.microsoft.com/office/powerpoint/2010/main" val="325789418"/>
+      </p:ext>
+    </p:extLst>
+  </p:cSld>
+  <p:clrMapOvr>
+    <a:masterClrMapping/>
+  </p:clrMapOvr>
+</p:notes>
+</file>
+
+<file path=ppt/notesSlides/notesSlide5.xml><?xml version="1.0" encoding="utf-8"?>
+<p:notes xmlns:a="http://schemas.openxmlformats.org/drawingml/2006/main" xmlns:r="http://schemas.openxmlformats.org/officeDocument/2006/relationships" xmlns:p="http://schemas.openxmlformats.org/presentationml/2006/main">
+  <p:cSld>
+    <p:spTree>
+      <p:nvGrpSpPr>
+        <p:cNvPr id="1" name=""/>
+        <p:cNvGrpSpPr/>
+        <p:nvPr/>
+      </p:nvGrpSpPr>
+      <p:grpSpPr>
+        <a:xfrm>
+          <a:off x="0" y="0"/>
+          <a:ext cx="0" cy="0"/>
+          <a:chOff x="0" y="0"/>
+          <a:chExt cx="0" cy="0"/>
+        </a:xfrm>
+      </p:grpSpPr>
+      <p:sp>
+        <p:nvSpPr>
+          <p:cNvPr id="2" name="Slide Image Placeholder 1"/>
+          <p:cNvSpPr>
+            <a:spLocks noGrp="1" noRot="1" noChangeAspect="1"/>
+          </p:cNvSpPr>
+          <p:nvPr>
+            <p:ph type="sldImg"/>
+          </p:nvPr>
+        </p:nvSpPr>
+        <p:spPr>
+          <a:xfrm>
+            <a:off x="381000" y="685800"/>
+            <a:ext cx="6096000" cy="3429000"/>
+          </a:xfrm>
+        </p:spPr>
+      </p:sp>
+      <p:sp>
+        <p:nvSpPr>
+          <p:cNvPr id="3" name="Notes Placeholder 2"/>
+          <p:cNvSpPr>
+            <a:spLocks noGrp="1"/>
+          </p:cNvSpPr>
+          <p:nvPr>
+            <p:ph type="body" idx="1"/>
+          </p:nvPr>
+        </p:nvSpPr>
+        <p:spPr/>
+        <p:txBody>
+          <a:bodyPr/>
+          <a:lstStyle/>
+          <a:p>
+            <a:r>
+              <a:rPr lang="en-US" dirty="0" smtClean="0"/>
+              <a:t>I wanted to see if the distribution of the counts</a:t>
+            </a:r>
+            <a:r>
+              <a:rPr lang="en-US" baseline="0" dirty="0" smtClean="0"/>
+              <a:t> of highly commented and highly </a:t>
+            </a:r>
+            <a:r>
+              <a:rPr lang="en-US" baseline="0" dirty="0" err="1" smtClean="0"/>
+              <a:t>upvoted</a:t>
+            </a:r>
+            <a:r>
+              <a:rPr lang="en-US" baseline="0" dirty="0" smtClean="0"/>
+              <a:t> posts were the same, so I performed a chi square analysis on the two sets of data. Based on these findings, </a:t>
+            </a:r>
+            <a:r>
+              <a:rPr lang="en-US" baseline="0" dirty="0" err="1" smtClean="0"/>
+              <a:t>i</a:t>
+            </a:r>
+            <a:r>
+              <a:rPr lang="en-US" baseline="0" dirty="0" smtClean="0"/>
+              <a:t> was able to reject the null hypothesis and assert the two variables were indeed dependent on one another.</a:t>
+            </a:r>
             <a:endParaRPr lang="en-US" dirty="0"/>
           </a:p>
         </p:txBody>
@@ -1121,7 +1353,7 @@
 </p:notes>
 </file>
 
-<file path=ppt/notesSlides/notesSlide5.xml><?xml version="1.0" encoding="utf-8"?>
+<file path=ppt/notesSlides/notesSlide6.xml><?xml version="1.0" encoding="utf-8"?>
 <p:notes xmlns:a="http://schemas.openxmlformats.org/drawingml/2006/main" xmlns:r="http://schemas.openxmlformats.org/officeDocument/2006/relationships" xmlns:p="http://schemas.openxmlformats.org/presentationml/2006/main" showMasterSp="0" showMasterPhAnim="0">
   <p:cSld>
     <p:spTree>
@@ -1176,7 +1408,15 @@
               </a:spcAft>
               <a:buNone/>
             </a:pPr>
-            <a:endParaRPr/>
+            <a:r>
+              <a:rPr lang="en-US" dirty="0" smtClean="0"/>
+              <a:t>Based</a:t>
+            </a:r>
+            <a:r>
+              <a:rPr lang="en-US" baseline="0" dirty="0" smtClean="0"/>
+              <a:t> on the two histograms I showed before, I first wanted to show if post values for the morning were significantly different than post values for the afternoon. Based on the data, I found no significant effect there. The average post values were therefore similar in the morning and afternoon. </a:t>
+            </a:r>
+            <a:endParaRPr dirty="0"/>
           </a:p>
         </p:txBody>
       </p:sp>
@@ -1234,7 +1474,202 @@
 </p:notes>
 </file>
 
-<file path=ppt/notesSlides/notesSlide6.xml><?xml version="1.0" encoding="utf-8"?>
+<file path=ppt/notesSlides/notesSlide7.xml><?xml version="1.0" encoding="utf-8"?>
+<p:notes xmlns:a="http://schemas.openxmlformats.org/drawingml/2006/main" xmlns:r="http://schemas.openxmlformats.org/officeDocument/2006/relationships" xmlns:p="http://schemas.openxmlformats.org/presentationml/2006/main">
+  <p:cSld>
+    <p:spTree>
+      <p:nvGrpSpPr>
+        <p:cNvPr id="1" name=""/>
+        <p:cNvGrpSpPr/>
+        <p:nvPr/>
+      </p:nvGrpSpPr>
+      <p:grpSpPr>
+        <a:xfrm>
+          <a:off x="0" y="0"/>
+          <a:ext cx="0" cy="0"/>
+          <a:chOff x="0" y="0"/>
+          <a:chExt cx="0" cy="0"/>
+        </a:xfrm>
+      </p:grpSpPr>
+      <p:sp>
+        <p:nvSpPr>
+          <p:cNvPr id="2" name="Slide Image Placeholder 1"/>
+          <p:cNvSpPr>
+            <a:spLocks noGrp="1" noRot="1" noChangeAspect="1"/>
+          </p:cNvSpPr>
+          <p:nvPr>
+            <p:ph type="sldImg"/>
+          </p:nvPr>
+        </p:nvSpPr>
+        <p:spPr>
+          <a:xfrm>
+            <a:off x="381000" y="685800"/>
+            <a:ext cx="6096000" cy="3429000"/>
+          </a:xfrm>
+        </p:spPr>
+      </p:sp>
+      <p:sp>
+        <p:nvSpPr>
+          <p:cNvPr id="3" name="Notes Placeholder 2"/>
+          <p:cNvSpPr>
+            <a:spLocks noGrp="1"/>
+          </p:cNvSpPr>
+          <p:nvPr>
+            <p:ph type="body" idx="1"/>
+          </p:nvPr>
+        </p:nvSpPr>
+        <p:spPr/>
+        <p:txBody>
+          <a:bodyPr/>
+          <a:lstStyle/>
+          <a:p>
+            <a:r>
+              <a:rPr lang="en-US" dirty="0" smtClean="0"/>
+              <a:t>Noticing</a:t>
+            </a:r>
+            <a:r>
+              <a:rPr lang="en-US" baseline="0" dirty="0" smtClean="0"/>
+              <a:t> the pattern of the histograms, It appeared to me that typical work hours (9-18) looked to be lower than posts made outside of those hours. To test this, I performed a chi square analysis. My null hypothesis was that there was no significant difference in the average post values above the threshold between the two periods. My alternate hypothesis was that posts made during work hours would have significantly lower values than outside of those hours. Based on the t-test results, I was able to reject the null hypothesis and show that there was indeed a significant effect of the work day.  </a:t>
+            </a:r>
+            <a:endParaRPr lang="en-US" dirty="0"/>
+          </a:p>
+        </p:txBody>
+      </p:sp>
+    </p:spTree>
+    <p:extLst>
+      <p:ext uri="{BB962C8B-B14F-4D97-AF65-F5344CB8AC3E}">
+        <p14:creationId xmlns:p14="http://schemas.microsoft.com/office/powerpoint/2010/main" val="891971568"/>
+      </p:ext>
+    </p:extLst>
+  </p:cSld>
+  <p:clrMapOvr>
+    <a:masterClrMapping/>
+  </p:clrMapOvr>
+</p:notes>
+</file>
+
+<file path=ppt/notesSlides/notesSlide8.xml><?xml version="1.0" encoding="utf-8"?>
+<p:notes xmlns:a="http://schemas.openxmlformats.org/drawingml/2006/main" xmlns:r="http://schemas.openxmlformats.org/officeDocument/2006/relationships" xmlns:p="http://schemas.openxmlformats.org/presentationml/2006/main">
+  <p:cSld>
+    <p:spTree>
+      <p:nvGrpSpPr>
+        <p:cNvPr id="1" name=""/>
+        <p:cNvGrpSpPr/>
+        <p:nvPr/>
+      </p:nvGrpSpPr>
+      <p:grpSpPr>
+        <a:xfrm>
+          <a:off x="0" y="0"/>
+          <a:ext cx="0" cy="0"/>
+          <a:chOff x="0" y="0"/>
+          <a:chExt cx="0" cy="0"/>
+        </a:xfrm>
+      </p:grpSpPr>
+      <p:sp>
+        <p:nvSpPr>
+          <p:cNvPr id="2" name="Slide Image Placeholder 1"/>
+          <p:cNvSpPr>
+            <a:spLocks noGrp="1" noRot="1" noChangeAspect="1"/>
+          </p:cNvSpPr>
+          <p:nvPr>
+            <p:ph type="sldImg"/>
+          </p:nvPr>
+        </p:nvSpPr>
+        <p:spPr>
+          <a:xfrm>
+            <a:off x="381000" y="685800"/>
+            <a:ext cx="6096000" cy="3429000"/>
+          </a:xfrm>
+        </p:spPr>
+      </p:sp>
+      <p:sp>
+        <p:nvSpPr>
+          <p:cNvPr id="3" name="Notes Placeholder 2"/>
+          <p:cNvSpPr>
+            <a:spLocks noGrp="1"/>
+          </p:cNvSpPr>
+          <p:nvPr>
+            <p:ph type="body" idx="1"/>
+          </p:nvPr>
+        </p:nvSpPr>
+        <p:spPr/>
+        <p:txBody>
+          <a:bodyPr/>
+          <a:lstStyle/>
+          <a:p>
+            <a:pPr marL="457200" marR="0" indent="-298450" algn="l" defTabSz="914400" rtl="0" eaLnBrk="1" fontAlgn="auto" latinLnBrk="0" hangingPunct="1">
+              <a:lnSpc>
+                <a:spcPct val="100000"/>
+              </a:lnSpc>
+              <a:spcBef>
+                <a:spcPts val="0"/>
+              </a:spcBef>
+              <a:spcAft>
+                <a:spcPts val="0"/>
+              </a:spcAft>
+              <a:buClr>
+                <a:srgbClr val="000000"/>
+              </a:buClr>
+              <a:buSzPts val="1100"/>
+              <a:buFont typeface="Arial"/>
+              <a:buChar char="●"/>
+              <a:tabLst/>
+              <a:defRPr/>
+            </a:pPr>
+            <a:r>
+              <a:rPr lang="en-US" sz="1100" dirty="0" smtClean="0"/>
+              <a:t>In conclusion, posting</a:t>
+            </a:r>
+            <a:r>
+              <a:rPr lang="en-US" sz="1100" baseline="0" dirty="0" smtClean="0"/>
+              <a:t> during working hours is significantly less likely to garner an above average amount of comments or score. </a:t>
+            </a:r>
+            <a:endParaRPr lang="en-US" sz="1100" dirty="0" smtClean="0"/>
+          </a:p>
+          <a:p>
+            <a:pPr marL="457200" marR="0" indent="-298450" algn="l" defTabSz="914400" rtl="0" eaLnBrk="1" fontAlgn="auto" latinLnBrk="0" hangingPunct="1">
+              <a:lnSpc>
+                <a:spcPct val="100000"/>
+              </a:lnSpc>
+              <a:spcBef>
+                <a:spcPts val="0"/>
+              </a:spcBef>
+              <a:spcAft>
+                <a:spcPts val="0"/>
+              </a:spcAft>
+              <a:buClr>
+                <a:srgbClr val="000000"/>
+              </a:buClr>
+              <a:buSzPts val="1100"/>
+              <a:buFont typeface="Arial"/>
+              <a:buChar char="●"/>
+              <a:tabLst/>
+              <a:defRPr/>
+            </a:pPr>
+            <a:r>
+              <a:rPr lang="en-US" sz="1100" dirty="0" smtClean="0"/>
+              <a:t>My goal for my next capstone is to take the scraped title data I already have, incorporate it with newly scraped information as well as comment text data, and then use NLP to optimize my model of posting rates. </a:t>
+            </a:r>
+          </a:p>
+          <a:p>
+            <a:endParaRPr lang="en-US" dirty="0"/>
+          </a:p>
+        </p:txBody>
+      </p:sp>
+    </p:spTree>
+    <p:extLst>
+      <p:ext uri="{BB962C8B-B14F-4D97-AF65-F5344CB8AC3E}">
+        <p14:creationId xmlns:p14="http://schemas.microsoft.com/office/powerpoint/2010/main" val="1491981676"/>
+      </p:ext>
+    </p:extLst>
+  </p:cSld>
+  <p:clrMapOvr>
+    <a:masterClrMapping/>
+  </p:clrMapOvr>
+</p:notes>
+</file>
+
+<file path=ppt/notesSlides/notesSlide9.xml><?xml version="1.0" encoding="utf-8"?>
 <p:notes xmlns:a="http://schemas.openxmlformats.org/drawingml/2006/main" xmlns:r="http://schemas.openxmlformats.org/officeDocument/2006/relationships" xmlns:p="http://schemas.openxmlformats.org/presentationml/2006/main" showMasterSp="0" showMasterPhAnim="0">
   <p:cSld>
     <p:spTree>
@@ -7722,10 +8157,705 @@
   <p:clrMapOvr>
     <a:masterClrMapping/>
   </p:clrMapOvr>
+  <p:timing>
+    <p:tnLst>
+      <p:par>
+        <p:cTn id="1" dur="indefinite" restart="never" nodeType="tmRoot"/>
+      </p:par>
+    </p:tnLst>
+  </p:timing>
 </p:sld>
 </file>
 
 <file path=ppt/slides/slide10.xml><?xml version="1.0" encoding="utf-8"?>
+<p:sld xmlns:a="http://schemas.openxmlformats.org/drawingml/2006/main" xmlns:r="http://schemas.openxmlformats.org/officeDocument/2006/relationships" xmlns:p="http://schemas.openxmlformats.org/presentationml/2006/main">
+  <p:cSld>
+    <p:spTree>
+      <p:nvGrpSpPr>
+        <p:cNvPr id="1" name="Shape 79"/>
+        <p:cNvGrpSpPr/>
+        <p:nvPr/>
+      </p:nvGrpSpPr>
+      <p:grpSpPr>
+        <a:xfrm>
+          <a:off x="0" y="0"/>
+          <a:ext cx="0" cy="0"/>
+          <a:chOff x="0" y="0"/>
+          <a:chExt cx="0" cy="0"/>
+        </a:xfrm>
+      </p:grpSpPr>
+      <p:sp>
+        <p:nvSpPr>
+          <p:cNvPr id="80" name="Google Shape;80;p17"/>
+          <p:cNvSpPr txBox="1">
+            <a:spLocks noGrp="1"/>
+          </p:cNvSpPr>
+          <p:nvPr>
+            <p:ph type="body" idx="1"/>
+          </p:nvPr>
+        </p:nvSpPr>
+        <p:spPr>
+          <a:xfrm>
+            <a:off x="443100" y="346913"/>
+            <a:ext cx="7505100" cy="540300"/>
+          </a:xfrm>
+          <a:prstGeom prst="rect">
+            <a:avLst/>
+          </a:prstGeom>
+          <a:noFill/>
+          <a:ln>
+            <a:noFill/>
+          </a:ln>
+        </p:spPr>
+        <p:txBody>
+          <a:bodyPr spcFirstLastPara="1" wrap="square" lIns="68575" tIns="68575" rIns="68575" bIns="68575" anchor="t" anchorCtr="0">
+            <a:noAutofit/>
+          </a:bodyPr>
+          <a:lstStyle/>
+          <a:p>
+            <a:pPr marL="0" lvl="0" indent="0"/>
+            <a:r>
+              <a:rPr lang="en" dirty="0" smtClean="0">
+                <a:latin typeface="Raleway Medium"/>
+                <a:ea typeface="Raleway Medium"/>
+                <a:cs typeface="Raleway Medium"/>
+                <a:sym typeface="Raleway Medium"/>
+              </a:rPr>
+              <a:t>Questions</a:t>
+            </a:r>
+            <a:r>
+              <a:rPr lang="en-US" dirty="0" smtClean="0">
+                <a:latin typeface="Raleway Medium"/>
+                <a:ea typeface="Raleway Medium"/>
+                <a:cs typeface="Raleway Medium"/>
+                <a:sym typeface="Raleway Medium"/>
+              </a:rPr>
+              <a:t>: Effect of Afternoon and Morning hours</a:t>
+            </a:r>
+            <a:endParaRPr lang="en" dirty="0">
+              <a:latin typeface="Raleway Medium"/>
+              <a:ea typeface="Raleway Medium"/>
+              <a:cs typeface="Raleway Medium"/>
+              <a:sym typeface="Raleway Medium"/>
+            </a:endParaRPr>
+          </a:p>
+        </p:txBody>
+      </p:sp>
+      <p:sp>
+        <p:nvSpPr>
+          <p:cNvPr id="81" name="Google Shape;81;p17"/>
+          <p:cNvSpPr txBox="1"/>
+          <p:nvPr/>
+        </p:nvSpPr>
+        <p:spPr>
+          <a:xfrm>
+            <a:off x="757875" y="1300825"/>
+            <a:ext cx="6995400" cy="3271200"/>
+          </a:xfrm>
+          <a:prstGeom prst="rect">
+            <a:avLst/>
+          </a:prstGeom>
+          <a:noFill/>
+          <a:ln>
+            <a:noFill/>
+          </a:ln>
+        </p:spPr>
+        <p:txBody>
+          <a:bodyPr spcFirstLastPara="1" wrap="square" lIns="34275" tIns="34275" rIns="34275" bIns="34275" anchor="t" anchorCtr="0">
+            <a:noAutofit/>
+          </a:bodyPr>
+          <a:lstStyle/>
+          <a:p>
+            <a:pPr marL="457200" lvl="0" indent="-342900">
+              <a:spcBef>
+                <a:spcPts val="1000"/>
+              </a:spcBef>
+              <a:spcAft>
+                <a:spcPts val="1000"/>
+              </a:spcAft>
+              <a:buClr>
+                <a:schemeClr val="dk1"/>
+              </a:buClr>
+              <a:buSzPts val="1800"/>
+              <a:buFont typeface="Raleway"/>
+              <a:buChar char="•"/>
+            </a:pPr>
+            <a:r>
+              <a:rPr lang="en-US" sz="1000" dirty="0" smtClean="0">
+                <a:solidFill>
+                  <a:schemeClr val="dk1"/>
+                </a:solidFill>
+                <a:latin typeface="Raleway"/>
+                <a:ea typeface="Raleway"/>
+                <a:cs typeface="Raleway"/>
+                <a:sym typeface="Raleway"/>
+              </a:rPr>
+              <a:t>Is there a significant difference in the amount of posts which receive above average comment count (comment </a:t>
+            </a:r>
+            <a:r>
+              <a:rPr lang="en-US" sz="1000" dirty="0">
+                <a:solidFill>
+                  <a:schemeClr val="dk1"/>
+                </a:solidFill>
+                <a:latin typeface="Raleway"/>
+                <a:ea typeface="Raleway"/>
+                <a:cs typeface="Raleway"/>
+                <a:sym typeface="Raleway"/>
+              </a:rPr>
+              <a:t>count average = </a:t>
+            </a:r>
+            <a:r>
+              <a:rPr lang="hr-HR" sz="1000" dirty="0">
+                <a:solidFill>
+                  <a:schemeClr val="dk1"/>
+                </a:solidFill>
+                <a:latin typeface="Raleway"/>
+                <a:ea typeface="Raleway"/>
+                <a:cs typeface="Raleway"/>
+                <a:sym typeface="Raleway"/>
+              </a:rPr>
+              <a:t>68.359865</a:t>
+            </a:r>
+            <a:r>
+              <a:rPr lang="en-US" sz="1000" dirty="0">
+                <a:solidFill>
+                  <a:schemeClr val="dk1"/>
+                </a:solidFill>
+                <a:latin typeface="Raleway"/>
+                <a:ea typeface="Raleway"/>
+                <a:cs typeface="Raleway"/>
+                <a:sym typeface="Raleway"/>
+              </a:rPr>
+              <a:t>)</a:t>
+            </a:r>
+            <a:r>
+              <a:rPr lang="en-US" sz="1000" dirty="0" smtClean="0">
+                <a:solidFill>
+                  <a:schemeClr val="dk1"/>
+                </a:solidFill>
+                <a:latin typeface="Raleway"/>
+                <a:ea typeface="Raleway"/>
+                <a:cs typeface="Raleway"/>
+                <a:sym typeface="Raleway"/>
+              </a:rPr>
+              <a:t> </a:t>
+            </a:r>
+            <a:r>
+              <a:rPr lang="is-IS" sz="1000" dirty="0" smtClean="0">
+                <a:solidFill>
+                  <a:schemeClr val="dk1"/>
+                </a:solidFill>
+                <a:latin typeface="Raleway"/>
+                <a:ea typeface="Raleway"/>
+                <a:cs typeface="Raleway"/>
+                <a:sym typeface="Raleway"/>
+              </a:rPr>
+              <a:t>during the morning (hour of day 0 -11) and the afternoon (hour of day range 11-23)?</a:t>
+            </a:r>
+          </a:p>
+          <a:p>
+            <a:pPr marL="114300" lvl="4">
+              <a:spcBef>
+                <a:spcPts val="1000"/>
+              </a:spcBef>
+              <a:spcAft>
+                <a:spcPts val="1000"/>
+              </a:spcAft>
+              <a:buClr>
+                <a:schemeClr val="dk1"/>
+              </a:buClr>
+              <a:buSzPts val="1800"/>
+            </a:pPr>
+            <a:r>
+              <a:rPr lang="is-IS" sz="1000" dirty="0" smtClean="0">
+                <a:solidFill>
+                  <a:schemeClr val="dk1"/>
+                </a:solidFill>
+                <a:latin typeface="Raleway"/>
+                <a:ea typeface="Raleway"/>
+                <a:cs typeface="Raleway"/>
+                <a:sym typeface="Raleway"/>
+              </a:rPr>
+              <a:t>	-Null hypothesis: there is no significant difference between the mean number of highly commented posts made per 	hour during the morning hours and the afternoon hours</a:t>
+            </a:r>
+          </a:p>
+          <a:p>
+            <a:pPr marL="114300" lvl="4">
+              <a:spcBef>
+                <a:spcPts val="1000"/>
+              </a:spcBef>
+              <a:spcAft>
+                <a:spcPts val="1000"/>
+              </a:spcAft>
+              <a:buClr>
+                <a:schemeClr val="dk1"/>
+              </a:buClr>
+              <a:buSzPts val="1800"/>
+            </a:pPr>
+            <a:r>
+              <a:rPr lang="is-IS" sz="1000" dirty="0">
+                <a:solidFill>
+                  <a:schemeClr val="dk1"/>
+                </a:solidFill>
+                <a:latin typeface="Raleway"/>
+                <a:ea typeface="Raleway"/>
+                <a:cs typeface="Raleway"/>
+                <a:sym typeface="Raleway"/>
+              </a:rPr>
+              <a:t>	</a:t>
+            </a:r>
+            <a:r>
+              <a:rPr lang="is-IS" sz="1000" dirty="0" smtClean="0">
+                <a:solidFill>
+                  <a:schemeClr val="dk1"/>
+                </a:solidFill>
+                <a:latin typeface="Raleway"/>
+                <a:ea typeface="Raleway"/>
+                <a:cs typeface="Raleway"/>
+                <a:sym typeface="Raleway"/>
+              </a:rPr>
+              <a:t>-Alternate hypothesis: the mean number of posts with above average comment count made per hour during the 	afternoon is significantly different than the mean number of posts made above the comment threshold in the morning.</a:t>
+            </a:r>
+          </a:p>
+          <a:p>
+            <a:pPr marL="457200" indent="-342900">
+              <a:spcBef>
+                <a:spcPts val="1000"/>
+              </a:spcBef>
+              <a:spcAft>
+                <a:spcPts val="1000"/>
+              </a:spcAft>
+              <a:buClr>
+                <a:schemeClr val="dk1"/>
+              </a:buClr>
+              <a:buSzPts val="1800"/>
+              <a:buFont typeface="Raleway"/>
+              <a:buChar char="•"/>
+            </a:pPr>
+            <a:r>
+              <a:rPr lang="en-US" sz="1000" dirty="0">
+                <a:solidFill>
+                  <a:schemeClr val="dk1"/>
+                </a:solidFill>
+                <a:latin typeface="Raleway"/>
+                <a:ea typeface="Raleway"/>
+                <a:cs typeface="Raleway"/>
+                <a:sym typeface="Raleway"/>
+              </a:rPr>
+              <a:t>Is there a significant difference in the amount of posts which receive above average </a:t>
+            </a:r>
+            <a:r>
+              <a:rPr lang="en-US" sz="1000" dirty="0" smtClean="0">
+                <a:solidFill>
+                  <a:schemeClr val="dk1"/>
+                </a:solidFill>
+                <a:latin typeface="Raleway"/>
+                <a:ea typeface="Raleway"/>
+                <a:cs typeface="Raleway"/>
+                <a:sym typeface="Raleway"/>
+              </a:rPr>
+              <a:t>amount of </a:t>
+            </a:r>
+            <a:r>
+              <a:rPr lang="en-US" sz="1000" dirty="0" err="1" smtClean="0">
+                <a:solidFill>
+                  <a:schemeClr val="dk1"/>
+                </a:solidFill>
+                <a:latin typeface="Raleway"/>
+                <a:ea typeface="Raleway"/>
+                <a:cs typeface="Raleway"/>
+                <a:sym typeface="Raleway"/>
+              </a:rPr>
+              <a:t>upvotes</a:t>
+            </a:r>
+            <a:r>
+              <a:rPr lang="en-US" sz="1000" dirty="0" smtClean="0">
+                <a:solidFill>
+                  <a:schemeClr val="dk1"/>
+                </a:solidFill>
+                <a:latin typeface="Raleway"/>
+                <a:ea typeface="Raleway"/>
+                <a:cs typeface="Raleway"/>
+                <a:sym typeface="Raleway"/>
+              </a:rPr>
+              <a:t> </a:t>
+            </a:r>
+            <a:r>
+              <a:rPr lang="en-US" sz="1000" dirty="0">
+                <a:solidFill>
+                  <a:schemeClr val="dk1"/>
+                </a:solidFill>
+                <a:latin typeface="Raleway"/>
+                <a:ea typeface="Raleway"/>
+                <a:cs typeface="Raleway"/>
+                <a:sym typeface="Raleway"/>
+              </a:rPr>
+              <a:t>(score average = </a:t>
+            </a:r>
+            <a:r>
+              <a:rPr lang="is-IS" sz="1000" dirty="0">
+                <a:solidFill>
+                  <a:schemeClr val="dk1"/>
+                </a:solidFill>
+                <a:latin typeface="Raleway"/>
+                <a:ea typeface="Raleway"/>
+                <a:cs typeface="Raleway"/>
+                <a:sym typeface="Raleway"/>
+              </a:rPr>
+              <a:t>2385.594459) during the morning (hour of day 0 -11) and the afternoon (hour of day range 11-23</a:t>
+            </a:r>
+            <a:r>
+              <a:rPr lang="is-IS" sz="1000" dirty="0" smtClean="0">
+                <a:solidFill>
+                  <a:schemeClr val="dk1"/>
+                </a:solidFill>
+                <a:latin typeface="Raleway"/>
+                <a:ea typeface="Raleway"/>
+                <a:cs typeface="Raleway"/>
+                <a:sym typeface="Raleway"/>
+              </a:rPr>
+              <a:t>)?</a:t>
+            </a:r>
+          </a:p>
+          <a:p>
+            <a:pPr marL="114300" lvl="4">
+              <a:spcBef>
+                <a:spcPts val="1000"/>
+              </a:spcBef>
+              <a:spcAft>
+                <a:spcPts val="1000"/>
+              </a:spcAft>
+              <a:buClr>
+                <a:schemeClr val="dk1"/>
+              </a:buClr>
+              <a:buSzPts val="1800"/>
+            </a:pPr>
+            <a:r>
+              <a:rPr lang="is-IS" sz="1000" dirty="0">
+                <a:solidFill>
+                  <a:schemeClr val="dk1"/>
+                </a:solidFill>
+                <a:latin typeface="Raleway"/>
+                <a:ea typeface="Raleway"/>
+                <a:cs typeface="Raleway"/>
+                <a:sym typeface="Raleway"/>
+              </a:rPr>
+              <a:t>	</a:t>
+            </a:r>
+            <a:r>
+              <a:rPr lang="is-IS" sz="1000" dirty="0" smtClean="0">
+                <a:solidFill>
+                  <a:schemeClr val="dk1"/>
+                </a:solidFill>
+                <a:latin typeface="Raleway"/>
+                <a:ea typeface="Raleway"/>
+                <a:cs typeface="Raleway"/>
+                <a:sym typeface="Raleway"/>
+              </a:rPr>
+              <a:t>-</a:t>
+            </a:r>
+            <a:r>
+              <a:rPr lang="is-IS" sz="1000" dirty="0">
+                <a:solidFill>
+                  <a:schemeClr val="dk1"/>
+                </a:solidFill>
+                <a:latin typeface="Raleway"/>
+                <a:ea typeface="Raleway"/>
+                <a:cs typeface="Raleway"/>
+                <a:sym typeface="Raleway"/>
+              </a:rPr>
+              <a:t>Null hypothesis: there is no significant difference between the mean number of highly </a:t>
+            </a:r>
+            <a:r>
+              <a:rPr lang="is-IS" sz="1000" dirty="0" smtClean="0">
+                <a:solidFill>
+                  <a:schemeClr val="dk1"/>
+                </a:solidFill>
+                <a:latin typeface="Raleway"/>
+                <a:ea typeface="Raleway"/>
+                <a:cs typeface="Raleway"/>
+                <a:sym typeface="Raleway"/>
+              </a:rPr>
+              <a:t>scored </a:t>
+            </a:r>
+            <a:r>
+              <a:rPr lang="is-IS" sz="1000" dirty="0">
+                <a:solidFill>
+                  <a:schemeClr val="dk1"/>
+                </a:solidFill>
+                <a:latin typeface="Raleway"/>
+                <a:ea typeface="Raleway"/>
+                <a:cs typeface="Raleway"/>
+                <a:sym typeface="Raleway"/>
+              </a:rPr>
+              <a:t>posts </a:t>
+            </a:r>
+            <a:r>
+              <a:rPr lang="is-IS" sz="1000" dirty="0" smtClean="0">
+                <a:solidFill>
+                  <a:schemeClr val="dk1"/>
+                </a:solidFill>
+                <a:latin typeface="Raleway"/>
+                <a:ea typeface="Raleway"/>
+                <a:cs typeface="Raleway"/>
+                <a:sym typeface="Raleway"/>
+              </a:rPr>
+              <a:t>made </a:t>
+            </a:r>
+            <a:r>
+              <a:rPr lang="is-IS" sz="1000" dirty="0">
+                <a:solidFill>
+                  <a:schemeClr val="dk1"/>
+                </a:solidFill>
+                <a:latin typeface="Raleway"/>
+                <a:ea typeface="Raleway"/>
+                <a:cs typeface="Raleway"/>
+                <a:sym typeface="Raleway"/>
+              </a:rPr>
+              <a:t>per hour </a:t>
+            </a:r>
+            <a:r>
+              <a:rPr lang="is-IS" sz="1000" dirty="0" smtClean="0">
+                <a:solidFill>
+                  <a:schemeClr val="dk1"/>
+                </a:solidFill>
+                <a:latin typeface="Raleway"/>
+                <a:ea typeface="Raleway"/>
+                <a:cs typeface="Raleway"/>
+                <a:sym typeface="Raleway"/>
+              </a:rPr>
+              <a:t>	during </a:t>
+            </a:r>
+            <a:r>
+              <a:rPr lang="is-IS" sz="1000" dirty="0">
+                <a:solidFill>
+                  <a:schemeClr val="dk1"/>
+                </a:solidFill>
+                <a:latin typeface="Raleway"/>
+                <a:ea typeface="Raleway"/>
+                <a:cs typeface="Raleway"/>
+                <a:sym typeface="Raleway"/>
+              </a:rPr>
+              <a:t>the morning hours and the afternoon </a:t>
+            </a:r>
+            <a:r>
+              <a:rPr lang="is-IS" sz="1000" dirty="0" smtClean="0">
+                <a:solidFill>
+                  <a:schemeClr val="dk1"/>
+                </a:solidFill>
+                <a:latin typeface="Raleway"/>
+                <a:ea typeface="Raleway"/>
+                <a:cs typeface="Raleway"/>
+                <a:sym typeface="Raleway"/>
+              </a:rPr>
+              <a:t>hours</a:t>
+            </a:r>
+          </a:p>
+          <a:p>
+            <a:pPr marL="114300" lvl="4">
+              <a:spcBef>
+                <a:spcPts val="1000"/>
+              </a:spcBef>
+              <a:spcAft>
+                <a:spcPts val="1000"/>
+              </a:spcAft>
+              <a:buClr>
+                <a:schemeClr val="dk1"/>
+              </a:buClr>
+              <a:buSzPts val="1800"/>
+            </a:pPr>
+            <a:r>
+              <a:rPr lang="is-IS" sz="1000" dirty="0">
+                <a:solidFill>
+                  <a:schemeClr val="dk1"/>
+                </a:solidFill>
+                <a:latin typeface="Raleway"/>
+                <a:ea typeface="Raleway"/>
+                <a:cs typeface="Raleway"/>
+                <a:sym typeface="Raleway"/>
+              </a:rPr>
+              <a:t>	</a:t>
+            </a:r>
+            <a:r>
+              <a:rPr lang="is-IS" sz="1000" dirty="0" smtClean="0">
+                <a:solidFill>
+                  <a:schemeClr val="dk1"/>
+                </a:solidFill>
+                <a:latin typeface="Raleway"/>
+                <a:ea typeface="Raleway"/>
+                <a:cs typeface="Raleway"/>
+                <a:sym typeface="Raleway"/>
+              </a:rPr>
+              <a:t>-Alternate </a:t>
+            </a:r>
+            <a:r>
+              <a:rPr lang="is-IS" sz="1000" dirty="0">
+                <a:solidFill>
+                  <a:schemeClr val="dk1"/>
+                </a:solidFill>
+                <a:latin typeface="Raleway"/>
+                <a:ea typeface="Raleway"/>
+                <a:cs typeface="Raleway"/>
+                <a:sym typeface="Raleway"/>
+              </a:rPr>
+              <a:t>hypothesis: the mean number of posts made per </a:t>
+            </a:r>
+            <a:r>
+              <a:rPr lang="is-IS" sz="1000" dirty="0" smtClean="0">
+                <a:solidFill>
+                  <a:schemeClr val="dk1"/>
+                </a:solidFill>
+                <a:latin typeface="Raleway"/>
+                <a:ea typeface="Raleway"/>
+                <a:cs typeface="Raleway"/>
+                <a:sym typeface="Raleway"/>
+              </a:rPr>
+              <a:t>hour</a:t>
+            </a:r>
+            <a:r>
+              <a:rPr lang="is-IS" sz="1000" dirty="0">
+                <a:solidFill>
+                  <a:schemeClr val="dk1"/>
+                </a:solidFill>
+                <a:latin typeface="Raleway"/>
+                <a:ea typeface="Raleway"/>
+                <a:cs typeface="Raleway"/>
+                <a:sym typeface="Raleway"/>
+              </a:rPr>
+              <a:t> above the </a:t>
+            </a:r>
+            <a:r>
+              <a:rPr lang="is-IS" sz="1000" dirty="0" smtClean="0">
+                <a:solidFill>
+                  <a:schemeClr val="dk1"/>
+                </a:solidFill>
+                <a:latin typeface="Raleway"/>
+                <a:ea typeface="Raleway"/>
+                <a:cs typeface="Raleway"/>
+                <a:sym typeface="Raleway"/>
+              </a:rPr>
+              <a:t>scoring average </a:t>
+            </a:r>
+            <a:r>
+              <a:rPr lang="is-IS" sz="1000" dirty="0">
+                <a:solidFill>
+                  <a:schemeClr val="dk1"/>
+                </a:solidFill>
+                <a:latin typeface="Raleway"/>
+                <a:ea typeface="Raleway"/>
+                <a:cs typeface="Raleway"/>
+                <a:sym typeface="Raleway"/>
+              </a:rPr>
+              <a:t>during the </a:t>
+            </a:r>
+            <a:r>
+              <a:rPr lang="is-IS" sz="1000" dirty="0" smtClean="0">
+                <a:solidFill>
+                  <a:schemeClr val="dk1"/>
+                </a:solidFill>
+                <a:latin typeface="Raleway"/>
+                <a:ea typeface="Raleway"/>
+                <a:cs typeface="Raleway"/>
+                <a:sym typeface="Raleway"/>
+              </a:rPr>
+              <a:t>afternoon 	is </a:t>
+            </a:r>
+            <a:r>
+              <a:rPr lang="is-IS" sz="1000" dirty="0">
+                <a:solidFill>
+                  <a:schemeClr val="dk1"/>
+                </a:solidFill>
+                <a:latin typeface="Raleway"/>
+                <a:ea typeface="Raleway"/>
+                <a:cs typeface="Raleway"/>
+                <a:sym typeface="Raleway"/>
+              </a:rPr>
+              <a:t>significantly </a:t>
+            </a:r>
+            <a:r>
+              <a:rPr lang="is-IS" sz="1000" dirty="0" smtClean="0">
+                <a:solidFill>
+                  <a:schemeClr val="dk1"/>
+                </a:solidFill>
+                <a:latin typeface="Raleway"/>
+                <a:ea typeface="Raleway"/>
+                <a:cs typeface="Raleway"/>
+                <a:sym typeface="Raleway"/>
+              </a:rPr>
+              <a:t>different </a:t>
+            </a:r>
+            <a:r>
+              <a:rPr lang="is-IS" sz="1000" dirty="0">
+                <a:solidFill>
+                  <a:schemeClr val="dk1"/>
+                </a:solidFill>
+                <a:latin typeface="Raleway"/>
+                <a:ea typeface="Raleway"/>
+                <a:cs typeface="Raleway"/>
+                <a:sym typeface="Raleway"/>
+              </a:rPr>
+              <a:t>than the mean number of posts made above the </a:t>
+            </a:r>
+            <a:r>
+              <a:rPr lang="is-IS" sz="1000" dirty="0" smtClean="0">
+                <a:solidFill>
+                  <a:schemeClr val="dk1"/>
+                </a:solidFill>
+                <a:latin typeface="Raleway"/>
+                <a:ea typeface="Raleway"/>
+                <a:cs typeface="Raleway"/>
+                <a:sym typeface="Raleway"/>
+              </a:rPr>
+              <a:t>scoring threshold </a:t>
+            </a:r>
+            <a:r>
+              <a:rPr lang="is-IS" sz="1000" dirty="0">
+                <a:solidFill>
+                  <a:schemeClr val="dk1"/>
+                </a:solidFill>
+                <a:latin typeface="Raleway"/>
+                <a:ea typeface="Raleway"/>
+                <a:cs typeface="Raleway"/>
+                <a:sym typeface="Raleway"/>
+              </a:rPr>
+              <a:t>in the </a:t>
+            </a:r>
+            <a:r>
+              <a:rPr lang="is-IS" sz="1000" dirty="0" smtClean="0">
+                <a:solidFill>
+                  <a:schemeClr val="dk1"/>
+                </a:solidFill>
+                <a:latin typeface="Raleway"/>
+                <a:ea typeface="Raleway"/>
+                <a:cs typeface="Raleway"/>
+                <a:sym typeface="Raleway"/>
+              </a:rPr>
+              <a:t>morning</a:t>
+            </a:r>
+          </a:p>
+        </p:txBody>
+      </p:sp>
+    </p:spTree>
+    <p:extLst>
+      <p:ext uri="{BB962C8B-B14F-4D97-AF65-F5344CB8AC3E}">
+        <p14:creationId xmlns:p14="http://schemas.microsoft.com/office/powerpoint/2010/main" val="42026024"/>
+      </p:ext>
+    </p:extLst>
+  </p:cSld>
+  <p:clrMapOvr>
+    <a:masterClrMapping/>
+  </p:clrMapOvr>
+  <p:timing>
+    <p:tnLst>
+      <p:par>
+        <p:cTn id="1" dur="indefinite" restart="never" nodeType="tmRoot"/>
+      </p:par>
+    </p:tnLst>
+  </p:timing>
+</p:sld>
+</file>
+
+<file path=ppt/slides/slide11.xml><?xml version="1.0" encoding="utf-8"?>
 <p:sld xmlns:a="http://schemas.openxmlformats.org/drawingml/2006/main" xmlns:r="http://schemas.openxmlformats.org/officeDocument/2006/relationships" xmlns:p="http://schemas.openxmlformats.org/presentationml/2006/main">
   <p:cSld>
     <p:spTree>
@@ -8324,6 +9454,13 @@
   <p:clrMapOvr>
     <a:masterClrMapping/>
   </p:clrMapOvr>
+  <p:timing>
+    <p:tnLst>
+      <p:par>
+        <p:cTn id="1" dur="indefinite" restart="never" nodeType="tmRoot"/>
+      </p:par>
+    </p:tnLst>
+  </p:timing>
 </p:sld>
 </file>
 
@@ -8397,7 +9534,7 @@
                 <a:cs typeface="Raleway Medium"/>
                 <a:sym typeface="Raleway Medium"/>
               </a:rPr>
-              <a:t>James Skelton</a:t>
+              <a:t>Bio</a:t>
             </a:r>
             <a:endParaRPr dirty="0">
               <a:solidFill>
@@ -8760,13 +9897,19 @@
       </p:sp>
       <p:pic>
         <p:nvPicPr>
-          <p:cNvPr id="75" name="Google Shape;75;p16"/>
-          <p:cNvPicPr preferRelativeResize="0"/>
+          <p:cNvPr id="2" name="Picture 1"/>
+          <p:cNvPicPr>
+            <a:picLocks noChangeAspect="1"/>
+          </p:cNvPicPr>
           <p:nvPr/>
         </p:nvPicPr>
         <p:blipFill>
           <a:blip r:embed="rId3">
-            <a:alphaModFix/>
+            <a:extLst>
+              <a:ext uri="{28A0092B-C50C-407E-A947-70E740481C1C}">
+                <a14:useLocalDpi xmlns:a14="http://schemas.microsoft.com/office/drawing/2010/main" val="0"/>
+              </a:ext>
+            </a:extLst>
           </a:blip>
           <a:stretch>
             <a:fillRect/>
@@ -8774,16 +9917,12 @@
         </p:blipFill>
         <p:spPr>
           <a:xfrm>
-            <a:off x="5180150" y="994013"/>
-            <a:ext cx="2996352" cy="3951488"/>
+            <a:off x="5703411" y="887213"/>
+            <a:ext cx="2244789" cy="3695480"/>
           </a:xfrm>
           <a:prstGeom prst="rect">
             <a:avLst/>
           </a:prstGeom>
-          <a:noFill/>
-          <a:ln>
-            <a:noFill/>
-          </a:ln>
         </p:spPr>
       </p:pic>
     </p:spTree>
@@ -8791,6 +9930,13 @@
   <p:clrMapOvr>
     <a:masterClrMapping/>
   </p:clrMapOvr>
+  <p:timing>
+    <p:tnLst>
+      <p:par>
+        <p:cTn id="1" dur="indefinite" restart="never" nodeType="tmRoot"/>
+      </p:par>
+    </p:tnLst>
+  </p:timing>
 </p:sld>
 </file>
 
@@ -8864,8 +10010,23 @@
                 <a:cs typeface="Raleway Medium"/>
                 <a:sym typeface="Raleway Medium"/>
               </a:rPr>
-              <a:t>Set up and Questions</a:t>
-            </a:r>
+              <a:t>B</a:t>
+            </a:r>
+            <a:r>
+              <a:rPr lang="en-US" dirty="0" smtClean="0">
+                <a:latin typeface="Raleway Medium"/>
+                <a:ea typeface="Raleway Medium"/>
+                <a:cs typeface="Raleway Medium"/>
+                <a:sym typeface="Raleway Medium"/>
+              </a:rPr>
+              <a:t>ackground and EDA</a:t>
+            </a:r>
+            <a:endParaRPr lang="en-US" dirty="0" smtClean="0">
+              <a:latin typeface="Raleway Medium"/>
+              <a:ea typeface="Raleway Medium"/>
+              <a:cs typeface="Raleway Medium"/>
+              <a:sym typeface="Raleway Medium"/>
+            </a:endParaRPr>
           </a:p>
           <a:p>
             <a:pPr marL="0" marR="0" lvl="0" indent="0" algn="l" rtl="0">
@@ -8929,6 +10090,18 @@
               <a:buChar char="•"/>
             </a:pPr>
             <a:r>
+              <a:rPr lang="en-US" sz="1300" dirty="0" smtClean="0">
+                <a:solidFill>
+                  <a:schemeClr val="dk1"/>
+                </a:solidFill>
+                <a:latin typeface="Raleway"/>
+                <a:ea typeface="Raleway"/>
+                <a:cs typeface="Raleway"/>
+                <a:sym typeface="Raleway"/>
+              </a:rPr>
+              <a:t>I </a:t>
+            </a:r>
+            <a:r>
               <a:rPr lang="en-US" sz="1300" dirty="0">
                 <a:solidFill>
                   <a:schemeClr val="dk1"/>
@@ -8938,7 +10111,7 @@
                 <a:cs typeface="Raleway"/>
                 <a:sym typeface="Raleway"/>
               </a:rPr>
-              <a:t>I’ve noticed in my near decade of </a:t>
+              <a:t>created my scraper using the PRAW library that scraped </a:t>
             </a:r>
             <a:r>
               <a:rPr lang="en-US" sz="1300" dirty="0" err="1">
@@ -8950,7 +10123,7 @@
                 <a:cs typeface="Raleway"/>
                 <a:sym typeface="Raleway"/>
               </a:rPr>
-              <a:t>Reddit</a:t>
+              <a:t>datetime</a:t>
             </a:r>
             <a:r>
               <a:rPr lang="en-US" sz="1300" dirty="0">
@@ -8962,7 +10135,79 @@
                 <a:cs typeface="Raleway"/>
                 <a:sym typeface="Raleway"/>
               </a:rPr>
-              <a:t> use that many posts with huge score values do not have a comparably large amount of comments. Thinking about this, I decided to make my scraper to test whether or not these values are indeed independent of one another. Furthermore, I wanted to see their relationship to time of day.</a:t>
+              <a:t>, ID, number of comments, title text, score, </a:t>
+            </a:r>
+            <a:r>
+              <a:rPr lang="en-US" sz="1300" dirty="0" err="1">
+                <a:solidFill>
+                  <a:schemeClr val="dk1"/>
+                </a:solidFill>
+                <a:latin typeface="Raleway"/>
+                <a:ea typeface="Raleway"/>
+                <a:cs typeface="Raleway"/>
+                <a:sym typeface="Raleway"/>
+              </a:rPr>
+              <a:t>bodytext</a:t>
+            </a:r>
+            <a:r>
+              <a:rPr lang="en-US" sz="1300" dirty="0">
+                <a:solidFill>
+                  <a:schemeClr val="dk1"/>
+                </a:solidFill>
+                <a:latin typeface="Raleway"/>
+                <a:ea typeface="Raleway"/>
+                <a:cs typeface="Raleway"/>
+                <a:sym typeface="Raleway"/>
+              </a:rPr>
+              <a:t>, and URLs from </a:t>
+            </a:r>
+            <a:r>
+              <a:rPr lang="en-US" sz="1300" dirty="0" err="1">
+                <a:solidFill>
+                  <a:schemeClr val="dk1"/>
+                </a:solidFill>
+                <a:latin typeface="Raleway"/>
+                <a:ea typeface="Raleway"/>
+                <a:cs typeface="Raleway"/>
+                <a:sym typeface="Raleway"/>
+              </a:rPr>
+              <a:t>reddit</a:t>
+            </a:r>
+            <a:r>
+              <a:rPr lang="en-US" sz="1300" dirty="0">
+                <a:solidFill>
+                  <a:schemeClr val="dk1"/>
+                </a:solidFill>
+                <a:latin typeface="Raleway"/>
+                <a:ea typeface="Raleway"/>
+                <a:cs typeface="Raleway"/>
+                <a:sym typeface="Raleway"/>
+              </a:rPr>
+              <a:t>/r/all. There was an error with the body text, so this was immediately dropped from the </a:t>
+            </a:r>
+            <a:r>
+              <a:rPr lang="en-US" sz="1300" dirty="0" err="1">
+                <a:solidFill>
+                  <a:schemeClr val="dk1"/>
+                </a:solidFill>
+                <a:latin typeface="Raleway"/>
+                <a:ea typeface="Raleway"/>
+                <a:cs typeface="Raleway"/>
+                <a:sym typeface="Raleway"/>
+              </a:rPr>
+              <a:t>dataframe</a:t>
+            </a:r>
+            <a:r>
+              <a:rPr lang="en-US" sz="1300" dirty="0">
+                <a:solidFill>
+                  <a:schemeClr val="dk1"/>
+                </a:solidFill>
+                <a:latin typeface="Raleway"/>
+                <a:ea typeface="Raleway"/>
+                <a:cs typeface="Raleway"/>
+                <a:sym typeface="Raleway"/>
+              </a:rPr>
+              <a:t>. </a:t>
             </a:r>
           </a:p>
           <a:p>
@@ -8981,6 +10226,18 @@
               <a:buChar char="•"/>
             </a:pPr>
             <a:r>
+              <a:rPr lang="en-US" sz="1300" dirty="0" smtClean="0">
+                <a:solidFill>
+                  <a:schemeClr val="dk1"/>
+                </a:solidFill>
+                <a:latin typeface="Raleway"/>
+                <a:ea typeface="Raleway"/>
+                <a:cs typeface="Raleway"/>
+                <a:sym typeface="Raleway"/>
+              </a:rPr>
+              <a:t>I scraped </a:t>
+            </a:r>
+            <a:r>
               <a:rPr lang="en-US" sz="1300" dirty="0">
                 <a:solidFill>
                   <a:schemeClr val="dk1"/>
@@ -8990,10 +10247,10 @@
                 <a:cs typeface="Raleway"/>
                 <a:sym typeface="Raleway"/>
               </a:rPr>
-              <a:t>I created my scraper using the PRAW library that scraped </a:t>
-            </a:r>
-            <a:r>
-              <a:rPr lang="en-US" sz="1300" dirty="0" err="1">
+              <a:t>the ‘Hot’ organization of posts on r/all from </a:t>
+            </a:r>
+            <a:r>
+              <a:rPr lang="is-IS" sz="1300" dirty="0">
                 <a:solidFill>
                   <a:schemeClr val="dk1"/>
                 </a:solidFill>
@@ -9002,91 +10259,7 @@
                 <a:cs typeface="Raleway"/>
                 <a:sym typeface="Raleway"/>
               </a:rPr>
-              <a:t>datetime</a:t>
-            </a:r>
-            <a:r>
-              <a:rPr lang="en-US" sz="1300" dirty="0">
-                <a:solidFill>
-                  <a:schemeClr val="dk1"/>
-                </a:solidFill>
-                <a:latin typeface="Raleway"/>
-                <a:ea typeface="Raleway"/>
-                <a:cs typeface="Raleway"/>
-                <a:sym typeface="Raleway"/>
-              </a:rPr>
-              <a:t>, ID, number of comments, title text, score, </a:t>
-            </a:r>
-            <a:r>
-              <a:rPr lang="en-US" sz="1300" dirty="0" err="1">
-                <a:solidFill>
-                  <a:schemeClr val="dk1"/>
-                </a:solidFill>
-                <a:latin typeface="Raleway"/>
-                <a:ea typeface="Raleway"/>
-                <a:cs typeface="Raleway"/>
-                <a:sym typeface="Raleway"/>
-              </a:rPr>
-              <a:t>bodytext</a:t>
-            </a:r>
-            <a:r>
-              <a:rPr lang="en-US" sz="1300" dirty="0">
-                <a:solidFill>
-                  <a:schemeClr val="dk1"/>
-                </a:solidFill>
-                <a:latin typeface="Raleway"/>
-                <a:ea typeface="Raleway"/>
-                <a:cs typeface="Raleway"/>
-                <a:sym typeface="Raleway"/>
-              </a:rPr>
-              <a:t>, and URLs from </a:t>
-            </a:r>
-            <a:r>
-              <a:rPr lang="en-US" sz="1300" dirty="0" err="1">
-                <a:solidFill>
-                  <a:schemeClr val="dk1"/>
-                </a:solidFill>
-                <a:latin typeface="Raleway"/>
-                <a:ea typeface="Raleway"/>
-                <a:cs typeface="Raleway"/>
-                <a:sym typeface="Raleway"/>
-              </a:rPr>
-              <a:t>reddit</a:t>
-            </a:r>
-            <a:r>
-              <a:rPr lang="en-US" sz="1300" dirty="0">
-                <a:solidFill>
-                  <a:schemeClr val="dk1"/>
-                </a:solidFill>
-                <a:latin typeface="Raleway"/>
-                <a:ea typeface="Raleway"/>
-                <a:cs typeface="Raleway"/>
-                <a:sym typeface="Raleway"/>
-              </a:rPr>
-              <a:t>/r/all. There was an error with the body text, so this was immediately dropped from the </a:t>
-            </a:r>
-            <a:r>
-              <a:rPr lang="en-US" sz="1300" dirty="0" err="1">
-                <a:solidFill>
-                  <a:schemeClr val="dk1"/>
-                </a:solidFill>
-                <a:latin typeface="Raleway"/>
-                <a:ea typeface="Raleway"/>
-                <a:cs typeface="Raleway"/>
-                <a:sym typeface="Raleway"/>
-              </a:rPr>
-              <a:t>dataframe</a:t>
-            </a:r>
-            <a:r>
-              <a:rPr lang="en-US" sz="1300" dirty="0">
-                <a:solidFill>
-                  <a:schemeClr val="dk1"/>
-                </a:solidFill>
-                <a:latin typeface="Raleway"/>
-                <a:ea typeface="Raleway"/>
-                <a:cs typeface="Raleway"/>
-                <a:sym typeface="Raleway"/>
-              </a:rPr>
-              <a:t>. </a:t>
+              <a:t>2020-01-03 07:04:51 to 2020-01-06 06:00:00. Some posts incorrectly had datetime values after the time of scraping, and were removed due to impossibility. </a:t>
             </a:r>
           </a:p>
           <a:p>
@@ -9105,7 +10278,7 @@
               <a:buChar char="•"/>
             </a:pPr>
             <a:r>
-              <a:rPr lang="en-US" sz="1300" dirty="0">
+              <a:rPr lang="is-IS" sz="1300" dirty="0">
                 <a:solidFill>
                   <a:schemeClr val="dk1"/>
                 </a:solidFill>
@@ -9114,10 +10287,10 @@
                 <a:cs typeface="Raleway"/>
                 <a:sym typeface="Raleway"/>
               </a:rPr>
-              <a:t>The scraper scraped the ‘Hot’ organization of posts on r/all from </a:t>
-            </a:r>
-            <a:r>
-              <a:rPr lang="is-IS" sz="1300" dirty="0">
+              <a:t> </a:t>
+            </a:r>
+            <a:r>
+              <a:rPr lang="is-IS" sz="1300" dirty="0" smtClean="0">
                 <a:solidFill>
                   <a:schemeClr val="dk1"/>
                 </a:solidFill>
@@ -9126,52 +10299,8 @@
                 <a:cs typeface="Raleway"/>
                 <a:sym typeface="Raleway"/>
               </a:rPr>
-              <a:t>2020-01-03 07:04:51 to 2020-01-06 06:00:00. Some posts incorrectly had datetime values after the time of scraping, and were removed due to impossibility. </a:t>
-            </a:r>
-          </a:p>
-          <a:p>
-            <a:pPr marL="609585" indent="-457189">
-              <a:spcBef>
-                <a:spcPts val="1333"/>
-              </a:spcBef>
-              <a:spcAft>
-                <a:spcPts val="1333"/>
-              </a:spcAft>
-              <a:buClr>
-                <a:schemeClr val="dk1"/>
-              </a:buClr>
-              <a:buSzPts val="1800"/>
-              <a:buFont typeface="Raleway"/>
-              <a:buChar char="•"/>
-            </a:pPr>
-            <a:r>
-              <a:rPr lang="is-IS" sz="1300" dirty="0">
-                <a:solidFill>
-                  <a:schemeClr val="dk1"/>
-                </a:solidFill>
-                <a:latin typeface="Raleway"/>
-                <a:ea typeface="Raleway"/>
-                <a:cs typeface="Raleway"/>
-                <a:sym typeface="Raleway"/>
-              </a:rPr>
-              <a:t> After primary EDA, my main questions became clear: does hour of the day affect the amount of posts made per hour that are above the average comment or score threshold? Are their certain periods of the day where highly upvoted posts and highly commented posts are less likely to be made?</a:t>
-            </a:r>
-          </a:p>
-          <a:p>
-            <a:pPr marL="609585" indent="-457189">
-              <a:spcBef>
-                <a:spcPts val="1333"/>
-              </a:spcBef>
-              <a:spcAft>
-                <a:spcPts val="1333"/>
-              </a:spcAft>
-              <a:buClr>
-                <a:schemeClr val="dk1"/>
-              </a:buClr>
-              <a:buSzPts val="1800"/>
-              <a:buFont typeface="Raleway"/>
-              <a:buChar char="•"/>
-            </a:pPr>
+              <a:t>Data was also cleaned of all rows missing data. </a:t>
+            </a:r>
             <a:endParaRPr lang="en-US" sz="2400" dirty="0">
               <a:solidFill>
                 <a:schemeClr val="dk1"/>
@@ -9189,6 +10318,13 @@
   <p:clrMapOvr>
     <a:masterClrMapping/>
   </p:clrMapOvr>
+  <p:timing>
+    <p:tnLst>
+      <p:par>
+        <p:cTn id="1" dur="indefinite" restart="never" nodeType="tmRoot"/>
+      </p:par>
+    </p:tnLst>
+  </p:timing>
 </p:sld>
 </file>
 
@@ -9253,16 +10389,28 @@
           <a:lstStyle/>
           <a:p>
             <a:r>
+              <a:rPr lang="en-US" sz="1100" dirty="0" smtClean="0"/>
+              <a:t>I </a:t>
+            </a:r>
+            <a:r>
               <a:rPr lang="en-US" sz="1100" dirty="0"/>
-              <a:t>At the beginning of my analysis, I plotted the total count of posts by hour over the period I was scraping (time delta = 2 days, 22 hour, 55 minutes and 9 seconds). From this we can see the counts form a multinomial distribution with cresting </a:t>
-            </a:r>
-            <a:r>
-              <a:rPr lang="en-US" sz="1100" dirty="0" err="1"/>
-              <a:t>occuring</a:t>
+              <a:t>plotted the total count of posts by hour over the period I was scraping (time delta = 2 days, 22 hour, 55 minutes and 9 seconds). From this we can see </a:t>
+            </a:r>
+            <a:r>
+              <a:rPr lang="en-US" sz="1100" dirty="0" smtClean="0"/>
+              <a:t>a clear pattern, with the </a:t>
             </a:r>
             <a:r>
               <a:rPr lang="en-US" sz="1100" dirty="0"/>
-              <a:t> around 00:00 and </a:t>
+              <a:t>counts </a:t>
+            </a:r>
+            <a:r>
+              <a:rPr lang="en-US" sz="1100" dirty="0" smtClean="0"/>
+              <a:t>cresting </a:t>
+            </a:r>
+            <a:r>
+              <a:rPr lang="en-US" sz="1100" dirty="0"/>
+              <a:t>around 00:00 and </a:t>
             </a:r>
             <a:r>
               <a:rPr lang="en-US" sz="1100" dirty="0" err="1"/>
@@ -9285,7 +10433,7 @@
           <p:nvPr/>
         </p:nvPicPr>
         <p:blipFill>
-          <a:blip r:embed="rId2">
+          <a:blip r:embed="rId3">
             <a:extLst>
               <a:ext uri="{28A0092B-C50C-407E-A947-70E740481C1C}">
                 <a14:useLocalDpi xmlns:a14="http://schemas.microsoft.com/office/drawing/2010/main" val="0"/>
@@ -9316,6 +10464,13 @@
   <p:clrMapOvr>
     <a:masterClrMapping/>
   </p:clrMapOvr>
+  <p:timing>
+    <p:tnLst>
+      <p:par>
+        <p:cTn id="1" dur="indefinite" restart="never" nodeType="tmRoot"/>
+      </p:par>
+    </p:tnLst>
+  </p:timing>
 </p:sld>
 </file>
 
@@ -9381,34 +10536,55 @@
           <a:p>
             <a:r>
               <a:rPr lang="en-US" sz="1100" dirty="0" smtClean="0"/>
-              <a:t>I </a:t>
-            </a:r>
-            <a:r>
-              <a:rPr lang="en-US" sz="1100" dirty="0"/>
-              <a:t>saw that the distribution of the number of highly commented posts (threshold average comment value </a:t>
+              <a:t>To </a:t>
             </a:r>
             <a:r>
               <a:rPr lang="en-US" sz="1100" dirty="0" smtClean="0"/>
-              <a:t>=27.23, </a:t>
-            </a:r>
-            <a:r>
-              <a:rPr lang="en-US" sz="1100" dirty="0"/>
-              <a:t>all posts below this were removed from consideration) and high scoring posts (threshold average score value = </a:t>
+              <a:t>test </a:t>
             </a:r>
             <a:r>
               <a:rPr lang="en-US" sz="1100" dirty="0" smtClean="0"/>
-              <a:t>699.77) </a:t>
-            </a:r>
-            <a:r>
-              <a:rPr lang="en-US" sz="1100" dirty="0"/>
-              <a:t>appeared similar.   </a:t>
+              <a:t>if the number of  posts with above average comment counts(over 27 comments)  and scores were independently distributed, and this </a:t>
+            </a:r>
+            <a:r>
+              <a:rPr lang="en-US" sz="1100" dirty="0" smtClean="0"/>
+              <a:t>was true, I performed a chi^2  </a:t>
+            </a:r>
+            <a:r>
+              <a:rPr lang="en-US" sz="1100" dirty="0" smtClean="0"/>
+              <a:t>test. </a:t>
+            </a:r>
+          </a:p>
+          <a:p>
+            <a:r>
+              <a:rPr lang="en-US" sz="1100" dirty="0" smtClean="0"/>
+              <a:t>The </a:t>
+            </a:r>
+            <a:r>
+              <a:rPr lang="en-US" sz="1100" dirty="0" smtClean="0"/>
+              <a:t>null hypothesis was that they were independently distributed. </a:t>
             </a:r>
             <a:endParaRPr lang="en-US" sz="1100" dirty="0" smtClean="0"/>
           </a:p>
           <a:p>
             <a:r>
               <a:rPr lang="en-US" sz="1100" dirty="0" smtClean="0"/>
-              <a:t>To test if this was true, I performed a chi^2  test on the number of high scoring and heavily commented posts per hour of day. The null hypothesis was that they were independently distributed. The alternate hypothesis was that the distributions of the two values are not independent. Based on the results of the test, I was able to reject the null hypothesis, </a:t>
+              <a:t>The </a:t>
+            </a:r>
+            <a:r>
+              <a:rPr lang="en-US" sz="1100" dirty="0" smtClean="0"/>
+              <a:t>alternate hypothesis was that the distributions of the two values are not independent. </a:t>
+            </a:r>
+            <a:endParaRPr lang="en-US" sz="1100" dirty="0" smtClean="0"/>
+          </a:p>
+          <a:p>
+            <a:r>
+              <a:rPr lang="en-US" sz="1100" dirty="0" smtClean="0"/>
+              <a:t>Based </a:t>
+            </a:r>
+            <a:r>
+              <a:rPr lang="en-US" sz="1100" dirty="0" smtClean="0"/>
+              <a:t>on the results of the test, I was able to reject the null hypothesis, </a:t>
             </a:r>
             <a:r>
               <a:rPr lang="is-IS" sz="1100" i="1" dirty="0"/>
@@ -9468,7 +10644,15 @@
             </a:r>
             <a:r>
               <a:rPr lang="is-IS" sz="1100" dirty="0" smtClean="0"/>
-              <a:t>= 2.609e-48). Therefore, we can assert that the two sample distributions are not independently distributed. </a:t>
+              <a:t>= </a:t>
+            </a:r>
+            <a:r>
+              <a:rPr lang="is-IS" sz="1100" dirty="0" smtClean="0"/>
+              <a:t>2.609e-48) and assert </a:t>
+            </a:r>
+            <a:r>
+              <a:rPr lang="is-IS" sz="1100" dirty="0" smtClean="0"/>
+              <a:t>that the two sample distributions are not independently distributed. </a:t>
             </a:r>
             <a:endParaRPr lang="en-US" sz="1100" dirty="0"/>
           </a:p>
@@ -9514,6 +10698,13 @@
   <p:clrMapOvr>
     <a:masterClrMapping/>
   </p:clrMapOvr>
+  <p:timing>
+    <p:tnLst>
+      <p:par>
+        <p:cTn id="1" dur="indefinite" restart="never" nodeType="tmRoot"/>
+      </p:par>
+    </p:tnLst>
+  </p:timing>
 </p:sld>
 </file>
 
@@ -9547,7 +10738,7 @@
         <p:spPr>
           <a:xfrm>
             <a:off x="443100" y="346913"/>
-            <a:ext cx="7505100" cy="540300"/>
+            <a:ext cx="7505100" cy="736820"/>
           </a:xfrm>
           <a:prstGeom prst="rect">
             <a:avLst/>
@@ -9581,24 +10772,10 @@
               <a:buNone/>
             </a:pPr>
             <a:r>
-              <a:rPr lang="en" dirty="0">
-                <a:latin typeface="Raleway Medium"/>
-                <a:ea typeface="Raleway Medium"/>
-                <a:cs typeface="Raleway Medium"/>
-                <a:sym typeface="Raleway Medium"/>
-              </a:rPr>
-              <a:t>Key </a:t>
-            </a:r>
-            <a:r>
-              <a:rPr lang="en-US" dirty="0" smtClean="0">
-                <a:latin typeface="Raleway Medium"/>
-                <a:ea typeface="Raleway Medium"/>
-                <a:cs typeface="Raleway Medium"/>
-                <a:sym typeface="Raleway Medium"/>
-              </a:rPr>
-              <a:t>Findings</a:t>
-            </a:r>
-            <a:endParaRPr dirty="0"/>
+              <a:rPr lang="en-US" sz="1800" dirty="0" smtClean="0"/>
+              <a:t>Findings: Does morning or afternoon have an effect on post values?</a:t>
+            </a:r>
+            <a:endParaRPr sz="1800" dirty="0"/>
           </a:p>
         </p:txBody>
       </p:sp>
@@ -9661,8 +10838,8 @@
         </p:nvSpPr>
         <p:spPr>
           <a:xfrm>
-            <a:off x="757875" y="1300825"/>
-            <a:ext cx="6995400" cy="3271200"/>
+            <a:off x="757875" y="1083733"/>
+            <a:ext cx="6995400" cy="3488292"/>
           </a:xfrm>
           <a:prstGeom prst="rect">
             <a:avLst/>
@@ -9693,6 +10870,18 @@
               <a:buChar char="•"/>
             </a:pPr>
             <a:r>
+              <a:rPr lang="en-US" dirty="0" smtClean="0">
+                <a:solidFill>
+                  <a:schemeClr val="dk1"/>
+                </a:solidFill>
+                <a:latin typeface="Raleway"/>
+                <a:ea typeface="Raleway"/>
+                <a:cs typeface="Raleway"/>
+                <a:sym typeface="Raleway"/>
+              </a:rPr>
+              <a:t>Null hypothesis: there is not a significant difference in the post values in the morning</a:t>
+            </a:r>
+            <a:r>
               <a:rPr lang="en-US" dirty="0">
                 <a:solidFill>
                   <a:schemeClr val="dk1"/>
@@ -9702,11 +10891,44 @@
                 <a:cs typeface="Raleway"/>
                 <a:sym typeface="Raleway"/>
               </a:rPr>
-              <a:t>Encouraged by the findings of the chi square-test, I performed 4 more independent samples t-tests:</a:t>
-            </a:r>
+              <a:t> (0-11 hours)</a:t>
+            </a:r>
+            <a:r>
+              <a:rPr lang="en-US" dirty="0" smtClean="0">
+                <a:solidFill>
+                  <a:schemeClr val="dk1"/>
+                </a:solidFill>
+                <a:latin typeface="Raleway"/>
+                <a:ea typeface="Raleway"/>
+                <a:cs typeface="Raleway"/>
+                <a:sym typeface="Raleway"/>
+              </a:rPr>
+              <a:t> or afternoon</a:t>
+            </a:r>
+            <a:r>
+              <a:rPr lang="en-US" dirty="0">
+                <a:solidFill>
+                  <a:schemeClr val="dk1"/>
+                </a:solidFill>
+                <a:latin typeface="Raleway"/>
+                <a:ea typeface="Raleway"/>
+                <a:cs typeface="Raleway"/>
+                <a:sym typeface="Raleway"/>
+              </a:rPr>
+              <a:t> (12-23) </a:t>
+            </a:r>
+            <a:endParaRPr lang="en-US" dirty="0" smtClean="0">
+              <a:solidFill>
+                <a:schemeClr val="dk1"/>
+              </a:solidFill>
+              <a:latin typeface="Raleway"/>
+              <a:ea typeface="Raleway"/>
+              <a:cs typeface="Raleway"/>
+              <a:sym typeface="Raleway"/>
+            </a:endParaRPr>
           </a:p>
           <a:p>
-            <a:pPr marL="114300">
+            <a:pPr marL="457200" indent="-342900">
               <a:spcBef>
                 <a:spcPts val="1000"/>
               </a:spcBef>
@@ -9717,6 +10939,8 @@
                 <a:schemeClr val="dk1"/>
               </a:buClr>
               <a:buSzPts val="1800"/>
+              <a:buFont typeface="Raleway"/>
+              <a:buChar char="•"/>
             </a:pPr>
             <a:r>
               <a:rPr lang="en-US" dirty="0" smtClean="0">
@@ -9728,47 +10952,11 @@
                 <a:cs typeface="Raleway"/>
                 <a:sym typeface="Raleway"/>
               </a:rPr>
-              <a:t>	-</a:t>
-            </a:r>
-            <a:r>
-              <a:rPr lang="en-US" dirty="0">
-                <a:solidFill>
-                  <a:schemeClr val="dk1"/>
-                </a:solidFill>
-                <a:latin typeface="Raleway"/>
-                <a:ea typeface="Raleway"/>
-                <a:cs typeface="Raleway"/>
-                <a:sym typeface="Raleway"/>
-              </a:rPr>
-              <a:t>First, I determined that whether it is morning (0-11 hours) or afternoon (12-23) 	does not significantly effect the amount of posts made with scores, t(22) = -1.699, 	p=.103, and comments, t(22) = 0.783, </a:t>
-            </a:r>
-            <a:r>
-              <a:rPr lang="en-US" dirty="0" err="1">
-                <a:solidFill>
-                  <a:schemeClr val="dk1"/>
-                </a:solidFill>
-                <a:latin typeface="Raleway"/>
-                <a:ea typeface="Raleway"/>
-                <a:cs typeface="Raleway"/>
-                <a:sym typeface="Raleway"/>
-              </a:rPr>
-              <a:t>pvalue</a:t>
-            </a:r>
-            <a:r>
-              <a:rPr lang="en-US" dirty="0">
-                <a:solidFill>
-                  <a:schemeClr val="dk1"/>
-                </a:solidFill>
-                <a:latin typeface="Raleway"/>
-                <a:ea typeface="Raleway"/>
-                <a:cs typeface="Raleway"/>
-                <a:sym typeface="Raleway"/>
-              </a:rPr>
-              <a:t>=0.442. </a:t>
+              <a:t>Alternate hypothesis: posts made in the afternoon would have significantly different values than the afternoon. </a:t>
             </a:r>
           </a:p>
           <a:p>
-            <a:pPr marL="114300">
+            <a:pPr marL="457200" indent="-342900">
               <a:spcBef>
                 <a:spcPts val="1000"/>
               </a:spcBef>
@@ -9779,6 +10967,8 @@
                 <a:schemeClr val="dk1"/>
               </a:buClr>
               <a:buSzPts val="1800"/>
+              <a:buFont typeface="Raleway"/>
+              <a:buChar char="•"/>
             </a:pPr>
             <a:r>
               <a:rPr lang="en-US" dirty="0" smtClean="0">
@@ -9790,7 +10980,7 @@
                 <a:cs typeface="Raleway"/>
                 <a:sym typeface="Raleway"/>
               </a:rPr>
-              <a:t>	- </a:t>
+              <a:t>I found that Morning or </a:t>
             </a:r>
             <a:r>
               <a:rPr lang="en-US" dirty="0">
@@ -9802,7 +10992,79 @@
                 <a:cs typeface="Raleway"/>
                 <a:sym typeface="Raleway"/>
               </a:rPr>
-              <a:t>Secondly, I found that there was a significant difference in the mean posts 	made 	during working hours (9-18) and privately spent hours (measuring hours 0-8 	and 	hours 19-23) for scores, t(22) =2.620, p=0.0156, and comments, 	t(22)=4.491, p=1.82e-4).</a:t>
+              <a:t>afternoon </a:t>
+            </a:r>
+            <a:r>
+              <a:rPr lang="en-US" dirty="0" smtClean="0">
+                <a:solidFill>
+                  <a:schemeClr val="dk1"/>
+                </a:solidFill>
+                <a:latin typeface="Raleway"/>
+                <a:ea typeface="Raleway"/>
+                <a:cs typeface="Raleway"/>
+                <a:sym typeface="Raleway"/>
+              </a:rPr>
+              <a:t>does </a:t>
+            </a:r>
+            <a:r>
+              <a:rPr lang="en-US" dirty="0">
+                <a:solidFill>
+                  <a:schemeClr val="dk1"/>
+                </a:solidFill>
+                <a:latin typeface="Raleway"/>
+                <a:ea typeface="Raleway"/>
+                <a:cs typeface="Raleway"/>
+                <a:sym typeface="Raleway"/>
+              </a:rPr>
+              <a:t>not significantly effect the amount of posts made with scores, t(22) = -1.699, p=.</a:t>
+            </a:r>
+            <a:r>
+              <a:rPr lang="en-US" dirty="0" smtClean="0">
+                <a:solidFill>
+                  <a:schemeClr val="dk1"/>
+                </a:solidFill>
+                <a:latin typeface="Raleway"/>
+                <a:ea typeface="Raleway"/>
+                <a:cs typeface="Raleway"/>
+                <a:sym typeface="Raleway"/>
+              </a:rPr>
+              <a:t>106, </a:t>
+            </a:r>
+            <a:r>
+              <a:rPr lang="en-US" dirty="0">
+                <a:solidFill>
+                  <a:schemeClr val="dk1"/>
+                </a:solidFill>
+                <a:latin typeface="Raleway"/>
+                <a:ea typeface="Raleway"/>
+                <a:cs typeface="Raleway"/>
+                <a:sym typeface="Raleway"/>
+              </a:rPr>
+              <a:t>and comments, t(22) = 0.783, </a:t>
+            </a:r>
+            <a:r>
+              <a:rPr lang="en-US" dirty="0" err="1">
+                <a:solidFill>
+                  <a:schemeClr val="dk1"/>
+                </a:solidFill>
+                <a:latin typeface="Raleway"/>
+                <a:ea typeface="Raleway"/>
+                <a:cs typeface="Raleway"/>
+                <a:sym typeface="Raleway"/>
+              </a:rPr>
+              <a:t>pvalue</a:t>
+            </a:r>
+            <a:r>
+              <a:rPr lang="en-US" dirty="0">
+                <a:solidFill>
+                  <a:schemeClr val="dk1"/>
+                </a:solidFill>
+                <a:latin typeface="Raleway"/>
+                <a:ea typeface="Raleway"/>
+                <a:cs typeface="Raleway"/>
+                <a:sym typeface="Raleway"/>
+              </a:rPr>
+              <a:t>=0.442. </a:t>
             </a:r>
           </a:p>
         </p:txBody>
@@ -9812,6 +11074,13 @@
   <p:clrMapOvr>
     <a:masterClrMapping/>
   </p:clrMapOvr>
+  <p:timing>
+    <p:tnLst>
+      <p:par>
+        <p:cTn id="1" dur="indefinite" restart="never" nodeType="tmRoot"/>
+      </p:par>
+    </p:tnLst>
+  </p:timing>
 </p:sld>
 </file>
 
@@ -9848,6 +11117,234 @@
           <a:lstStyle/>
           <a:p>
             <a:r>
+              <a:rPr lang="en-US" sz="2200" dirty="0" smtClean="0"/>
+              <a:t>Findings: Do work hours effect post values? </a:t>
+            </a:r>
+            <a:endParaRPr lang="en-US" sz="2200" dirty="0"/>
+          </a:p>
+        </p:txBody>
+      </p:sp>
+      <p:sp>
+        <p:nvSpPr>
+          <p:cNvPr id="3" name="Text Placeholder 2"/>
+          <p:cNvSpPr>
+            <a:spLocks noGrp="1"/>
+          </p:cNvSpPr>
+          <p:nvPr>
+            <p:ph type="body" idx="2"/>
+          </p:nvPr>
+        </p:nvSpPr>
+        <p:spPr/>
+        <p:txBody>
+          <a:bodyPr/>
+          <a:lstStyle/>
+          <a:p>
+            <a:r>
+              <a:rPr lang="en-US" sz="1500" dirty="0" smtClean="0">
+                <a:solidFill>
+                  <a:schemeClr val="dk1"/>
+                </a:solidFill>
+                <a:latin typeface="Raleway"/>
+                <a:ea typeface="Raleway"/>
+                <a:cs typeface="Raleway"/>
+                <a:sym typeface="Raleway"/>
+              </a:rPr>
+              <a:t>Null hypothesis: there is no significant difference in the comment and score values for posts made during work hours (9-18) than posts made outside of them (0-8 and 19-23)</a:t>
+            </a:r>
+          </a:p>
+          <a:p>
+            <a:r>
+              <a:rPr lang="en-US" sz="1500" dirty="0" smtClean="0">
+                <a:solidFill>
+                  <a:schemeClr val="dk1"/>
+                </a:solidFill>
+                <a:latin typeface="Raleway"/>
+                <a:ea typeface="Raleway"/>
+                <a:cs typeface="Raleway"/>
+                <a:sym typeface="Raleway"/>
+              </a:rPr>
+              <a:t>Alternate hypothesis: posts made during work hours were significantly less likely to be highly </a:t>
+            </a:r>
+            <a:r>
+              <a:rPr lang="en-US" sz="1500" dirty="0" err="1" smtClean="0">
+                <a:solidFill>
+                  <a:schemeClr val="dk1"/>
+                </a:solidFill>
+                <a:latin typeface="Raleway"/>
+                <a:ea typeface="Raleway"/>
+                <a:cs typeface="Raleway"/>
+                <a:sym typeface="Raleway"/>
+              </a:rPr>
+              <a:t>upvoted</a:t>
+            </a:r>
+            <a:r>
+              <a:rPr lang="en-US" sz="1500" dirty="0" smtClean="0">
+                <a:solidFill>
+                  <a:schemeClr val="dk1"/>
+                </a:solidFill>
+                <a:latin typeface="Raleway"/>
+                <a:ea typeface="Raleway"/>
+                <a:cs typeface="Raleway"/>
+                <a:sym typeface="Raleway"/>
+              </a:rPr>
+              <a:t> or highly commented on. </a:t>
+            </a:r>
+          </a:p>
+          <a:p>
+            <a:r>
+              <a:rPr lang="en-US" sz="1500" dirty="0" smtClean="0">
+                <a:solidFill>
+                  <a:schemeClr val="dk1"/>
+                </a:solidFill>
+                <a:latin typeface="Raleway"/>
+                <a:ea typeface="Raleway"/>
+                <a:cs typeface="Raleway"/>
+                <a:sym typeface="Raleway"/>
+              </a:rPr>
+              <a:t>I </a:t>
+            </a:r>
+            <a:r>
+              <a:rPr lang="en-US" sz="1500" dirty="0">
+                <a:solidFill>
+                  <a:schemeClr val="dk1"/>
+                </a:solidFill>
+                <a:latin typeface="Raleway"/>
+                <a:ea typeface="Raleway"/>
+                <a:cs typeface="Raleway"/>
+                <a:sym typeface="Raleway"/>
+              </a:rPr>
+              <a:t>found that there was a significant difference in the mean posts made during working </a:t>
+            </a:r>
+            <a:r>
+              <a:rPr lang="en-US" sz="1500" dirty="0" smtClean="0">
+                <a:solidFill>
+                  <a:schemeClr val="dk1"/>
+                </a:solidFill>
+                <a:latin typeface="Raleway"/>
+                <a:ea typeface="Raleway"/>
+                <a:cs typeface="Raleway"/>
+                <a:sym typeface="Raleway"/>
+              </a:rPr>
+              <a:t>hours and </a:t>
+            </a:r>
+            <a:r>
+              <a:rPr lang="en-US" sz="1500" dirty="0">
+                <a:solidFill>
+                  <a:schemeClr val="dk1"/>
+                </a:solidFill>
+                <a:latin typeface="Raleway"/>
+                <a:ea typeface="Raleway"/>
+                <a:cs typeface="Raleway"/>
+                <a:sym typeface="Raleway"/>
+              </a:rPr>
+              <a:t>privately spent hours </a:t>
+            </a:r>
+            <a:r>
+              <a:rPr lang="en-US" sz="1500" dirty="0" smtClean="0">
+                <a:solidFill>
+                  <a:schemeClr val="dk1"/>
+                </a:solidFill>
+                <a:latin typeface="Raleway"/>
+                <a:ea typeface="Raleway"/>
+                <a:cs typeface="Raleway"/>
+                <a:sym typeface="Raleway"/>
+              </a:rPr>
+              <a:t>for </a:t>
+            </a:r>
+            <a:r>
+              <a:rPr lang="en-US" sz="1500" dirty="0">
+                <a:solidFill>
+                  <a:schemeClr val="dk1"/>
+                </a:solidFill>
+                <a:latin typeface="Raleway"/>
+                <a:ea typeface="Raleway"/>
+                <a:cs typeface="Raleway"/>
+                <a:sym typeface="Raleway"/>
+              </a:rPr>
+              <a:t>scores, t(22) =2.620, p=0.0156, and comments, t(22)=4.491, p=1.82e-4).</a:t>
+            </a:r>
+          </a:p>
+          <a:p>
+            <a:endParaRPr lang="en-US" dirty="0"/>
+          </a:p>
+        </p:txBody>
+      </p:sp>
+      <p:pic>
+        <p:nvPicPr>
+          <p:cNvPr id="4" name="Picture 3"/>
+          <p:cNvPicPr>
+            <a:picLocks noChangeAspect="1"/>
+          </p:cNvPicPr>
+          <p:nvPr/>
+        </p:nvPicPr>
+        <p:blipFill>
+          <a:blip r:embed="rId3">
+            <a:extLst>
+              <a:ext uri="{28A0092B-C50C-407E-A947-70E740481C1C}">
+                <a14:useLocalDpi xmlns:a14="http://schemas.microsoft.com/office/drawing/2010/main" val="0"/>
+              </a:ext>
+            </a:extLst>
+          </a:blip>
+          <a:stretch>
+            <a:fillRect/>
+          </a:stretch>
+        </p:blipFill>
+        <p:spPr>
+          <a:xfrm>
+            <a:off x="2991637" y="3123747"/>
+            <a:ext cx="4199385" cy="1640164"/>
+          </a:xfrm>
+          <a:prstGeom prst="rect">
+            <a:avLst/>
+          </a:prstGeom>
+        </p:spPr>
+      </p:pic>
+    </p:spTree>
+    <p:extLst>
+      <p:ext uri="{BB962C8B-B14F-4D97-AF65-F5344CB8AC3E}">
+        <p14:creationId xmlns:p14="http://schemas.microsoft.com/office/powerpoint/2010/main" val="883997695"/>
+      </p:ext>
+    </p:extLst>
+  </p:cSld>
+  <p:clrMapOvr>
+    <a:masterClrMapping/>
+  </p:clrMapOvr>
+</p:sld>
+</file>
+
+<file path=ppt/slides/slide8.xml><?xml version="1.0" encoding="utf-8"?>
+<p:sld xmlns:a="http://schemas.openxmlformats.org/drawingml/2006/main" xmlns:r="http://schemas.openxmlformats.org/officeDocument/2006/relationships" xmlns:p="http://schemas.openxmlformats.org/presentationml/2006/main">
+  <p:cSld>
+    <p:spTree>
+      <p:nvGrpSpPr>
+        <p:cNvPr id="1" name=""/>
+        <p:cNvGrpSpPr/>
+        <p:nvPr/>
+      </p:nvGrpSpPr>
+      <p:grpSpPr>
+        <a:xfrm>
+          <a:off x="0" y="0"/>
+          <a:ext cx="0" cy="0"/>
+          <a:chOff x="0" y="0"/>
+          <a:chExt cx="0" cy="0"/>
+        </a:xfrm>
+      </p:grpSpPr>
+      <p:sp>
+        <p:nvSpPr>
+          <p:cNvPr id="2" name="Text Placeholder 1"/>
+          <p:cNvSpPr>
+            <a:spLocks noGrp="1"/>
+          </p:cNvSpPr>
+          <p:nvPr>
+            <p:ph type="body" idx="1"/>
+          </p:nvPr>
+        </p:nvSpPr>
+        <p:spPr/>
+        <p:txBody>
+          <a:bodyPr/>
+          <a:lstStyle/>
+          <a:p>
+            <a:r>
               <a:rPr lang="en-US" dirty="0" smtClean="0"/>
               <a:t>Take away and next steps</a:t>
             </a:r>
@@ -9871,37 +11368,55 @@
           <a:lstStyle/>
           <a:p>
             <a:r>
-              <a:rPr lang="en-US" sz="1200" dirty="0"/>
-              <a:t>Its now evident that some factors associated with time of day are significantly associated with the rate at which highly </a:t>
-            </a:r>
-            <a:r>
-              <a:rPr lang="en-US" sz="1200" dirty="0" err="1"/>
+              <a:rPr lang="en-US" sz="1500" dirty="0" smtClean="0"/>
+              <a:t>In conclusion, there appears to be a correlation between time of day and the rate at which highly </a:t>
+            </a:r>
+            <a:r>
+              <a:rPr lang="en-US" sz="1500" dirty="0" err="1" smtClean="0"/>
               <a:t>upvoted</a:t>
             </a:r>
             <a:r>
-              <a:rPr lang="en-US" sz="1200" dirty="0"/>
-              <a:t> posts and comments are made. </a:t>
-            </a:r>
+              <a:rPr lang="en-US" sz="1500" dirty="0" smtClean="0"/>
+              <a:t> and highly commented posts are made</a:t>
+            </a:r>
+            <a:endParaRPr lang="en-US" sz="1500" dirty="0"/>
           </a:p>
           <a:p>
             <a:r>
-              <a:rPr lang="en-US" sz="1200" dirty="0"/>
-              <a:t>The next step would be to determine what these factors are, such as the work day effect indicated in this project, and incorporating those into a predictive model. This model could be modified to create a viable method for determining the best time of days for marketing on </a:t>
-            </a:r>
-            <a:r>
-              <a:rPr lang="en-US" sz="1200" dirty="0" err="1"/>
-              <a:t>reddit</a:t>
-            </a:r>
-            <a:r>
-              <a:rPr lang="en-US" sz="1200" dirty="0"/>
+              <a:rPr lang="en-US" sz="1500" dirty="0"/>
+              <a:t>The next step would be to </a:t>
+            </a:r>
+            <a:r>
+              <a:rPr lang="en-US" sz="1500" dirty="0" smtClean="0"/>
+              <a:t>determine some of the other </a:t>
+            </a:r>
+            <a:r>
+              <a:rPr lang="en-US" sz="1500" dirty="0"/>
+              <a:t>factors </a:t>
+            </a:r>
+            <a:r>
+              <a:rPr lang="en-US" sz="1500" dirty="0" smtClean="0"/>
+              <a:t>at play, using information like what is gleaned here about work hours, </a:t>
+            </a:r>
+            <a:r>
+              <a:rPr lang="en-US" sz="1500" dirty="0"/>
+              <a:t>and incorporating those into a predictive model. </a:t>
+            </a:r>
+            <a:r>
+              <a:rPr lang="en-US" sz="1500" dirty="0" smtClean="0"/>
+              <a:t>Potential uses for this model would be heavily focused on marketing to </a:t>
+            </a:r>
+            <a:r>
+              <a:rPr lang="en-US" sz="1500" dirty="0" err="1" smtClean="0"/>
+              <a:t>redditors</a:t>
+            </a:r>
+            <a:r>
+              <a:rPr lang="en-US" sz="1500" dirty="0" smtClean="0"/>
               <a:t>. </a:t>
             </a:r>
           </a:p>
           <a:p>
-            <a:r>
-              <a:rPr lang="en-US" sz="1200" dirty="0"/>
-              <a:t>My goal for my next capstone is to take the scraped title data I already have, incorporate it with newly scraped information as well as comment text data, and then use NLP to optimize my model of posting rates. </a:t>
-            </a:r>
+            <a:endParaRPr lang="en-US" sz="1200" dirty="0"/>
           </a:p>
         </p:txBody>
       </p:sp>
@@ -9915,10 +11430,17 @@
   <p:clrMapOvr>
     <a:masterClrMapping/>
   </p:clrMapOvr>
+  <p:timing>
+    <p:tnLst>
+      <p:par>
+        <p:cTn id="1" dur="indefinite" restart="never" nodeType="tmRoot"/>
+      </p:par>
+    </p:tnLst>
+  </p:timing>
 </p:sld>
 </file>
 
-<file path=ppt/slides/slide8.xml><?xml version="1.0" encoding="utf-8"?>
+<file path=ppt/slides/slide9.xml><?xml version="1.0" encoding="utf-8"?>
 <p:sld xmlns:a="http://schemas.openxmlformats.org/drawingml/2006/main" xmlns:r="http://schemas.openxmlformats.org/officeDocument/2006/relationships" xmlns:p="http://schemas.openxmlformats.org/presentationml/2006/main">
   <p:cSld>
     <p:spTree>
@@ -9969,7 +11491,7 @@
           <a:bodyPr/>
           <a:lstStyle/>
           <a:p>
-            <a:endParaRPr lang="en-US"/>
+            <a:endParaRPr lang="en-US" dirty="0"/>
           </a:p>
         </p:txBody>
       </p:sp>
@@ -9983,687 +11505,13 @@
   <p:clrMapOvr>
     <a:masterClrMapping/>
   </p:clrMapOvr>
-</p:sld>
-</file>
-
-<file path=ppt/slides/slide9.xml><?xml version="1.0" encoding="utf-8"?>
-<p:sld xmlns:a="http://schemas.openxmlformats.org/drawingml/2006/main" xmlns:r="http://schemas.openxmlformats.org/officeDocument/2006/relationships" xmlns:p="http://schemas.openxmlformats.org/presentationml/2006/main">
-  <p:cSld>
-    <p:spTree>
-      <p:nvGrpSpPr>
-        <p:cNvPr id="1" name="Shape 79"/>
-        <p:cNvGrpSpPr/>
-        <p:nvPr/>
-      </p:nvGrpSpPr>
-      <p:grpSpPr>
-        <a:xfrm>
-          <a:off x="0" y="0"/>
-          <a:ext cx="0" cy="0"/>
-          <a:chOff x="0" y="0"/>
-          <a:chExt cx="0" cy="0"/>
-        </a:xfrm>
-      </p:grpSpPr>
-      <p:sp>
-        <p:nvSpPr>
-          <p:cNvPr id="80" name="Google Shape;80;p17"/>
-          <p:cNvSpPr txBox="1">
-            <a:spLocks noGrp="1"/>
-          </p:cNvSpPr>
-          <p:nvPr>
-            <p:ph type="body" idx="1"/>
-          </p:nvPr>
-        </p:nvSpPr>
-        <p:spPr>
-          <a:xfrm>
-            <a:off x="443100" y="346913"/>
-            <a:ext cx="7505100" cy="540300"/>
-          </a:xfrm>
-          <a:prstGeom prst="rect">
-            <a:avLst/>
-          </a:prstGeom>
-          <a:noFill/>
-          <a:ln>
-            <a:noFill/>
-          </a:ln>
-        </p:spPr>
-        <p:txBody>
-          <a:bodyPr spcFirstLastPara="1" wrap="square" lIns="68575" tIns="68575" rIns="68575" bIns="68575" anchor="t" anchorCtr="0">
-            <a:noAutofit/>
-          </a:bodyPr>
-          <a:lstStyle/>
-          <a:p>
-            <a:pPr marL="0" lvl="0" indent="0"/>
-            <a:r>
-              <a:rPr lang="en" dirty="0" smtClean="0">
-                <a:latin typeface="Raleway Medium"/>
-                <a:ea typeface="Raleway Medium"/>
-                <a:cs typeface="Raleway Medium"/>
-                <a:sym typeface="Raleway Medium"/>
-              </a:rPr>
-              <a:t>Questions</a:t>
-            </a:r>
-            <a:r>
-              <a:rPr lang="en-US" dirty="0" smtClean="0">
-                <a:latin typeface="Raleway Medium"/>
-                <a:ea typeface="Raleway Medium"/>
-                <a:cs typeface="Raleway Medium"/>
-                <a:sym typeface="Raleway Medium"/>
-              </a:rPr>
-              <a:t>: Effect of Afternoon and Morning hours</a:t>
-            </a:r>
-            <a:endParaRPr lang="en" dirty="0">
-              <a:latin typeface="Raleway Medium"/>
-              <a:ea typeface="Raleway Medium"/>
-              <a:cs typeface="Raleway Medium"/>
-              <a:sym typeface="Raleway Medium"/>
-            </a:endParaRPr>
-          </a:p>
-        </p:txBody>
-      </p:sp>
-      <p:sp>
-        <p:nvSpPr>
-          <p:cNvPr id="81" name="Google Shape;81;p17"/>
-          <p:cNvSpPr txBox="1"/>
-          <p:nvPr/>
-        </p:nvSpPr>
-        <p:spPr>
-          <a:xfrm>
-            <a:off x="757875" y="1300825"/>
-            <a:ext cx="6995400" cy="3271200"/>
-          </a:xfrm>
-          <a:prstGeom prst="rect">
-            <a:avLst/>
-          </a:prstGeom>
-          <a:noFill/>
-          <a:ln>
-            <a:noFill/>
-          </a:ln>
-        </p:spPr>
-        <p:txBody>
-          <a:bodyPr spcFirstLastPara="1" wrap="square" lIns="34275" tIns="34275" rIns="34275" bIns="34275" anchor="t" anchorCtr="0">
-            <a:noAutofit/>
-          </a:bodyPr>
-          <a:lstStyle/>
-          <a:p>
-            <a:pPr marL="457200" lvl="0" indent="-342900">
-              <a:spcBef>
-                <a:spcPts val="1000"/>
-              </a:spcBef>
-              <a:spcAft>
-                <a:spcPts val="1000"/>
-              </a:spcAft>
-              <a:buClr>
-                <a:schemeClr val="dk1"/>
-              </a:buClr>
-              <a:buSzPts val="1800"/>
-              <a:buFont typeface="Raleway"/>
-              <a:buChar char="•"/>
-            </a:pPr>
-            <a:r>
-              <a:rPr lang="en-US" sz="1000" dirty="0" smtClean="0">
-                <a:solidFill>
-                  <a:schemeClr val="dk1"/>
-                </a:solidFill>
-                <a:latin typeface="Raleway"/>
-                <a:ea typeface="Raleway"/>
-                <a:cs typeface="Raleway"/>
-                <a:sym typeface="Raleway"/>
-              </a:rPr>
-              <a:t>Is there a significant difference in the amount of posts which receive above average comment count (comment </a:t>
-            </a:r>
-            <a:r>
-              <a:rPr lang="en-US" sz="1000" dirty="0">
-                <a:solidFill>
-                  <a:schemeClr val="dk1"/>
-                </a:solidFill>
-                <a:latin typeface="Raleway"/>
-                <a:ea typeface="Raleway"/>
-                <a:cs typeface="Raleway"/>
-                <a:sym typeface="Raleway"/>
-              </a:rPr>
-              <a:t>count average = </a:t>
-            </a:r>
-            <a:r>
-              <a:rPr lang="hr-HR" sz="1000" dirty="0">
-                <a:solidFill>
-                  <a:schemeClr val="dk1"/>
-                </a:solidFill>
-                <a:latin typeface="Raleway"/>
-                <a:ea typeface="Raleway"/>
-                <a:cs typeface="Raleway"/>
-                <a:sym typeface="Raleway"/>
-              </a:rPr>
-              <a:t>68.359865</a:t>
-            </a:r>
-            <a:r>
-              <a:rPr lang="en-US" sz="1000" dirty="0">
-                <a:solidFill>
-                  <a:schemeClr val="dk1"/>
-                </a:solidFill>
-                <a:latin typeface="Raleway"/>
-                <a:ea typeface="Raleway"/>
-                <a:cs typeface="Raleway"/>
-                <a:sym typeface="Raleway"/>
-              </a:rPr>
-              <a:t>)</a:t>
-            </a:r>
-            <a:r>
-              <a:rPr lang="en-US" sz="1000" dirty="0" smtClean="0">
-                <a:solidFill>
-                  <a:schemeClr val="dk1"/>
-                </a:solidFill>
-                <a:latin typeface="Raleway"/>
-                <a:ea typeface="Raleway"/>
-                <a:cs typeface="Raleway"/>
-                <a:sym typeface="Raleway"/>
-              </a:rPr>
-              <a:t> </a:t>
-            </a:r>
-            <a:r>
-              <a:rPr lang="is-IS" sz="1000" dirty="0" smtClean="0">
-                <a:solidFill>
-                  <a:schemeClr val="dk1"/>
-                </a:solidFill>
-                <a:latin typeface="Raleway"/>
-                <a:ea typeface="Raleway"/>
-                <a:cs typeface="Raleway"/>
-                <a:sym typeface="Raleway"/>
-              </a:rPr>
-              <a:t>during the morning (hour of day 0 -11) and the afternoon (hour of day range 11-23)?</a:t>
-            </a:r>
-          </a:p>
-          <a:p>
-            <a:pPr marL="114300" lvl="4">
-              <a:spcBef>
-                <a:spcPts val="1000"/>
-              </a:spcBef>
-              <a:spcAft>
-                <a:spcPts val="1000"/>
-              </a:spcAft>
-              <a:buClr>
-                <a:schemeClr val="dk1"/>
-              </a:buClr>
-              <a:buSzPts val="1800"/>
-            </a:pPr>
-            <a:r>
-              <a:rPr lang="is-IS" sz="1000" dirty="0" smtClean="0">
-                <a:solidFill>
-                  <a:schemeClr val="dk1"/>
-                </a:solidFill>
-                <a:latin typeface="Raleway"/>
-                <a:ea typeface="Raleway"/>
-                <a:cs typeface="Raleway"/>
-                <a:sym typeface="Raleway"/>
-              </a:rPr>
-              <a:t>	-Null hypothesis: there is no significant difference between the mean number of highly commented posts made per 	hour during the morning hours and the afternoon hours</a:t>
-            </a:r>
-          </a:p>
-          <a:p>
-            <a:pPr marL="114300" lvl="4">
-              <a:spcBef>
-                <a:spcPts val="1000"/>
-              </a:spcBef>
-              <a:spcAft>
-                <a:spcPts val="1000"/>
-              </a:spcAft>
-              <a:buClr>
-                <a:schemeClr val="dk1"/>
-              </a:buClr>
-              <a:buSzPts val="1800"/>
-            </a:pPr>
-            <a:r>
-              <a:rPr lang="is-IS" sz="1000" dirty="0">
-                <a:solidFill>
-                  <a:schemeClr val="dk1"/>
-                </a:solidFill>
-                <a:latin typeface="Raleway"/>
-                <a:ea typeface="Raleway"/>
-                <a:cs typeface="Raleway"/>
-                <a:sym typeface="Raleway"/>
-              </a:rPr>
-              <a:t>	</a:t>
-            </a:r>
-            <a:r>
-              <a:rPr lang="is-IS" sz="1000" dirty="0" smtClean="0">
-                <a:solidFill>
-                  <a:schemeClr val="dk1"/>
-                </a:solidFill>
-                <a:latin typeface="Raleway"/>
-                <a:ea typeface="Raleway"/>
-                <a:cs typeface="Raleway"/>
-                <a:sym typeface="Raleway"/>
-              </a:rPr>
-              <a:t>-Alternate hypothesis: the mean number of posts with above average comment count made per hour during the 	afternoon is significantly different than the mean number of posts made above the comment threshold in the morning.</a:t>
-            </a:r>
-          </a:p>
-          <a:p>
-            <a:pPr marL="457200" indent="-342900">
-              <a:spcBef>
-                <a:spcPts val="1000"/>
-              </a:spcBef>
-              <a:spcAft>
-                <a:spcPts val="1000"/>
-              </a:spcAft>
-              <a:buClr>
-                <a:schemeClr val="dk1"/>
-              </a:buClr>
-              <a:buSzPts val="1800"/>
-              <a:buFont typeface="Raleway"/>
-              <a:buChar char="•"/>
-            </a:pPr>
-            <a:r>
-              <a:rPr lang="en-US" sz="1000" dirty="0">
-                <a:solidFill>
-                  <a:schemeClr val="dk1"/>
-                </a:solidFill>
-                <a:latin typeface="Raleway"/>
-                <a:ea typeface="Raleway"/>
-                <a:cs typeface="Raleway"/>
-                <a:sym typeface="Raleway"/>
-              </a:rPr>
-              <a:t>Is there a significant difference in the amount of posts which receive above average </a:t>
-            </a:r>
-            <a:r>
-              <a:rPr lang="en-US" sz="1000" dirty="0" smtClean="0">
-                <a:solidFill>
-                  <a:schemeClr val="dk1"/>
-                </a:solidFill>
-                <a:latin typeface="Raleway"/>
-                <a:ea typeface="Raleway"/>
-                <a:cs typeface="Raleway"/>
-                <a:sym typeface="Raleway"/>
-              </a:rPr>
-              <a:t>amount of </a:t>
-            </a:r>
-            <a:r>
-              <a:rPr lang="en-US" sz="1000" dirty="0" err="1" smtClean="0">
-                <a:solidFill>
-                  <a:schemeClr val="dk1"/>
-                </a:solidFill>
-                <a:latin typeface="Raleway"/>
-                <a:ea typeface="Raleway"/>
-                <a:cs typeface="Raleway"/>
-                <a:sym typeface="Raleway"/>
-              </a:rPr>
-              <a:t>upvotes</a:t>
-            </a:r>
-            <a:r>
-              <a:rPr lang="en-US" sz="1000" dirty="0" smtClean="0">
-                <a:solidFill>
-                  <a:schemeClr val="dk1"/>
-                </a:solidFill>
-                <a:latin typeface="Raleway"/>
-                <a:ea typeface="Raleway"/>
-                <a:cs typeface="Raleway"/>
-                <a:sym typeface="Raleway"/>
-              </a:rPr>
-              <a:t> </a:t>
-            </a:r>
-            <a:r>
-              <a:rPr lang="en-US" sz="1000" dirty="0">
-                <a:solidFill>
-                  <a:schemeClr val="dk1"/>
-                </a:solidFill>
-                <a:latin typeface="Raleway"/>
-                <a:ea typeface="Raleway"/>
-                <a:cs typeface="Raleway"/>
-                <a:sym typeface="Raleway"/>
-              </a:rPr>
-              <a:t>(score average = </a:t>
-            </a:r>
-            <a:r>
-              <a:rPr lang="is-IS" sz="1000" dirty="0">
-                <a:solidFill>
-                  <a:schemeClr val="dk1"/>
-                </a:solidFill>
-                <a:latin typeface="Raleway"/>
-                <a:ea typeface="Raleway"/>
-                <a:cs typeface="Raleway"/>
-                <a:sym typeface="Raleway"/>
-              </a:rPr>
-              <a:t>2385.594459) during the morning (hour of day 0 -11) and the afternoon (hour of day range 11-23</a:t>
-            </a:r>
-            <a:r>
-              <a:rPr lang="is-IS" sz="1000" dirty="0" smtClean="0">
-                <a:solidFill>
-                  <a:schemeClr val="dk1"/>
-                </a:solidFill>
-                <a:latin typeface="Raleway"/>
-                <a:ea typeface="Raleway"/>
-                <a:cs typeface="Raleway"/>
-                <a:sym typeface="Raleway"/>
-              </a:rPr>
-              <a:t>)?</a:t>
-            </a:r>
-          </a:p>
-          <a:p>
-            <a:pPr marL="114300" lvl="4">
-              <a:spcBef>
-                <a:spcPts val="1000"/>
-              </a:spcBef>
-              <a:spcAft>
-                <a:spcPts val="1000"/>
-              </a:spcAft>
-              <a:buClr>
-                <a:schemeClr val="dk1"/>
-              </a:buClr>
-              <a:buSzPts val="1800"/>
-            </a:pPr>
-            <a:r>
-              <a:rPr lang="is-IS" sz="1000" dirty="0">
-                <a:solidFill>
-                  <a:schemeClr val="dk1"/>
-                </a:solidFill>
-                <a:latin typeface="Raleway"/>
-                <a:ea typeface="Raleway"/>
-                <a:cs typeface="Raleway"/>
-                <a:sym typeface="Raleway"/>
-              </a:rPr>
-              <a:t>	</a:t>
-            </a:r>
-            <a:r>
-              <a:rPr lang="is-IS" sz="1000" dirty="0" smtClean="0">
-                <a:solidFill>
-                  <a:schemeClr val="dk1"/>
-                </a:solidFill>
-                <a:latin typeface="Raleway"/>
-                <a:ea typeface="Raleway"/>
-                <a:cs typeface="Raleway"/>
-                <a:sym typeface="Raleway"/>
-              </a:rPr>
-              <a:t>-</a:t>
-            </a:r>
-            <a:r>
-              <a:rPr lang="is-IS" sz="1000" dirty="0">
-                <a:solidFill>
-                  <a:schemeClr val="dk1"/>
-                </a:solidFill>
-                <a:latin typeface="Raleway"/>
-                <a:ea typeface="Raleway"/>
-                <a:cs typeface="Raleway"/>
-                <a:sym typeface="Raleway"/>
-              </a:rPr>
-              <a:t>Null hypothesis: there is no significant difference between the mean number of highly </a:t>
-            </a:r>
-            <a:r>
-              <a:rPr lang="is-IS" sz="1000" dirty="0" smtClean="0">
-                <a:solidFill>
-                  <a:schemeClr val="dk1"/>
-                </a:solidFill>
-                <a:latin typeface="Raleway"/>
-                <a:ea typeface="Raleway"/>
-                <a:cs typeface="Raleway"/>
-                <a:sym typeface="Raleway"/>
-              </a:rPr>
-              <a:t>scored </a:t>
-            </a:r>
-            <a:r>
-              <a:rPr lang="is-IS" sz="1000" dirty="0">
-                <a:solidFill>
-                  <a:schemeClr val="dk1"/>
-                </a:solidFill>
-                <a:latin typeface="Raleway"/>
-                <a:ea typeface="Raleway"/>
-                <a:cs typeface="Raleway"/>
-                <a:sym typeface="Raleway"/>
-              </a:rPr>
-              <a:t>posts </a:t>
-            </a:r>
-            <a:r>
-              <a:rPr lang="is-IS" sz="1000" dirty="0" smtClean="0">
-                <a:solidFill>
-                  <a:schemeClr val="dk1"/>
-                </a:solidFill>
-                <a:latin typeface="Raleway"/>
-                <a:ea typeface="Raleway"/>
-                <a:cs typeface="Raleway"/>
-                <a:sym typeface="Raleway"/>
-              </a:rPr>
-              <a:t>made </a:t>
-            </a:r>
-            <a:r>
-              <a:rPr lang="is-IS" sz="1000" dirty="0">
-                <a:solidFill>
-                  <a:schemeClr val="dk1"/>
-                </a:solidFill>
-                <a:latin typeface="Raleway"/>
-                <a:ea typeface="Raleway"/>
-                <a:cs typeface="Raleway"/>
-                <a:sym typeface="Raleway"/>
-              </a:rPr>
-              <a:t>per hour </a:t>
-            </a:r>
-            <a:r>
-              <a:rPr lang="is-IS" sz="1000" dirty="0" smtClean="0">
-                <a:solidFill>
-                  <a:schemeClr val="dk1"/>
-                </a:solidFill>
-                <a:latin typeface="Raleway"/>
-                <a:ea typeface="Raleway"/>
-                <a:cs typeface="Raleway"/>
-                <a:sym typeface="Raleway"/>
-              </a:rPr>
-              <a:t>	during </a:t>
-            </a:r>
-            <a:r>
-              <a:rPr lang="is-IS" sz="1000" dirty="0">
-                <a:solidFill>
-                  <a:schemeClr val="dk1"/>
-                </a:solidFill>
-                <a:latin typeface="Raleway"/>
-                <a:ea typeface="Raleway"/>
-                <a:cs typeface="Raleway"/>
-                <a:sym typeface="Raleway"/>
-              </a:rPr>
-              <a:t>the morning hours and the afternoon </a:t>
-            </a:r>
-            <a:r>
-              <a:rPr lang="is-IS" sz="1000" dirty="0" smtClean="0">
-                <a:solidFill>
-                  <a:schemeClr val="dk1"/>
-                </a:solidFill>
-                <a:latin typeface="Raleway"/>
-                <a:ea typeface="Raleway"/>
-                <a:cs typeface="Raleway"/>
-                <a:sym typeface="Raleway"/>
-              </a:rPr>
-              <a:t>hours</a:t>
-            </a:r>
-          </a:p>
-          <a:p>
-            <a:pPr marL="114300" lvl="4">
-              <a:spcBef>
-                <a:spcPts val="1000"/>
-              </a:spcBef>
-              <a:spcAft>
-                <a:spcPts val="1000"/>
-              </a:spcAft>
-              <a:buClr>
-                <a:schemeClr val="dk1"/>
-              </a:buClr>
-              <a:buSzPts val="1800"/>
-            </a:pPr>
-            <a:r>
-              <a:rPr lang="is-IS" sz="1000" dirty="0">
-                <a:solidFill>
-                  <a:schemeClr val="dk1"/>
-                </a:solidFill>
-                <a:latin typeface="Raleway"/>
-                <a:ea typeface="Raleway"/>
-                <a:cs typeface="Raleway"/>
-                <a:sym typeface="Raleway"/>
-              </a:rPr>
-              <a:t>	</a:t>
-            </a:r>
-            <a:r>
-              <a:rPr lang="is-IS" sz="1000" dirty="0" smtClean="0">
-                <a:solidFill>
-                  <a:schemeClr val="dk1"/>
-                </a:solidFill>
-                <a:latin typeface="Raleway"/>
-                <a:ea typeface="Raleway"/>
-                <a:cs typeface="Raleway"/>
-                <a:sym typeface="Raleway"/>
-              </a:rPr>
-              <a:t>-Alternate </a:t>
-            </a:r>
-            <a:r>
-              <a:rPr lang="is-IS" sz="1000" dirty="0">
-                <a:solidFill>
-                  <a:schemeClr val="dk1"/>
-                </a:solidFill>
-                <a:latin typeface="Raleway"/>
-                <a:ea typeface="Raleway"/>
-                <a:cs typeface="Raleway"/>
-                <a:sym typeface="Raleway"/>
-              </a:rPr>
-              <a:t>hypothesis: the mean number of posts made per </a:t>
-            </a:r>
-            <a:r>
-              <a:rPr lang="is-IS" sz="1000" dirty="0" smtClean="0">
-                <a:solidFill>
-                  <a:schemeClr val="dk1"/>
-                </a:solidFill>
-                <a:latin typeface="Raleway"/>
-                <a:ea typeface="Raleway"/>
-                <a:cs typeface="Raleway"/>
-                <a:sym typeface="Raleway"/>
-              </a:rPr>
-              <a:t>hour</a:t>
-            </a:r>
-            <a:r>
-              <a:rPr lang="is-IS" sz="1000" dirty="0">
-                <a:solidFill>
-                  <a:schemeClr val="dk1"/>
-                </a:solidFill>
-                <a:latin typeface="Raleway"/>
-                <a:ea typeface="Raleway"/>
-                <a:cs typeface="Raleway"/>
-                <a:sym typeface="Raleway"/>
-              </a:rPr>
-              <a:t> above the </a:t>
-            </a:r>
-            <a:r>
-              <a:rPr lang="is-IS" sz="1000" dirty="0" smtClean="0">
-                <a:solidFill>
-                  <a:schemeClr val="dk1"/>
-                </a:solidFill>
-                <a:latin typeface="Raleway"/>
-                <a:ea typeface="Raleway"/>
-                <a:cs typeface="Raleway"/>
-                <a:sym typeface="Raleway"/>
-              </a:rPr>
-              <a:t>scoring average </a:t>
-            </a:r>
-            <a:r>
-              <a:rPr lang="is-IS" sz="1000" dirty="0">
-                <a:solidFill>
-                  <a:schemeClr val="dk1"/>
-                </a:solidFill>
-                <a:latin typeface="Raleway"/>
-                <a:ea typeface="Raleway"/>
-                <a:cs typeface="Raleway"/>
-                <a:sym typeface="Raleway"/>
-              </a:rPr>
-              <a:t>during the </a:t>
-            </a:r>
-            <a:r>
-              <a:rPr lang="is-IS" sz="1000" dirty="0" smtClean="0">
-                <a:solidFill>
-                  <a:schemeClr val="dk1"/>
-                </a:solidFill>
-                <a:latin typeface="Raleway"/>
-                <a:ea typeface="Raleway"/>
-                <a:cs typeface="Raleway"/>
-                <a:sym typeface="Raleway"/>
-              </a:rPr>
-              <a:t>afternoon 	is </a:t>
-            </a:r>
-            <a:r>
-              <a:rPr lang="is-IS" sz="1000" dirty="0">
-                <a:solidFill>
-                  <a:schemeClr val="dk1"/>
-                </a:solidFill>
-                <a:latin typeface="Raleway"/>
-                <a:ea typeface="Raleway"/>
-                <a:cs typeface="Raleway"/>
-                <a:sym typeface="Raleway"/>
-              </a:rPr>
-              <a:t>significantly </a:t>
-            </a:r>
-            <a:r>
-              <a:rPr lang="is-IS" sz="1000" dirty="0" smtClean="0">
-                <a:solidFill>
-                  <a:schemeClr val="dk1"/>
-                </a:solidFill>
-                <a:latin typeface="Raleway"/>
-                <a:ea typeface="Raleway"/>
-                <a:cs typeface="Raleway"/>
-                <a:sym typeface="Raleway"/>
-              </a:rPr>
-              <a:t>different </a:t>
-            </a:r>
-            <a:r>
-              <a:rPr lang="is-IS" sz="1000" dirty="0">
-                <a:solidFill>
-                  <a:schemeClr val="dk1"/>
-                </a:solidFill>
-                <a:latin typeface="Raleway"/>
-                <a:ea typeface="Raleway"/>
-                <a:cs typeface="Raleway"/>
-                <a:sym typeface="Raleway"/>
-              </a:rPr>
-              <a:t>than the mean number of posts made above the </a:t>
-            </a:r>
-            <a:r>
-              <a:rPr lang="is-IS" sz="1000" dirty="0" smtClean="0">
-                <a:solidFill>
-                  <a:schemeClr val="dk1"/>
-                </a:solidFill>
-                <a:latin typeface="Raleway"/>
-                <a:ea typeface="Raleway"/>
-                <a:cs typeface="Raleway"/>
-                <a:sym typeface="Raleway"/>
-              </a:rPr>
-              <a:t>scoring threshold </a:t>
-            </a:r>
-            <a:r>
-              <a:rPr lang="is-IS" sz="1000" dirty="0">
-                <a:solidFill>
-                  <a:schemeClr val="dk1"/>
-                </a:solidFill>
-                <a:latin typeface="Raleway"/>
-                <a:ea typeface="Raleway"/>
-                <a:cs typeface="Raleway"/>
-                <a:sym typeface="Raleway"/>
-              </a:rPr>
-              <a:t>in the </a:t>
-            </a:r>
-            <a:r>
-              <a:rPr lang="is-IS" sz="1000" dirty="0" smtClean="0">
-                <a:solidFill>
-                  <a:schemeClr val="dk1"/>
-                </a:solidFill>
-                <a:latin typeface="Raleway"/>
-                <a:ea typeface="Raleway"/>
-                <a:cs typeface="Raleway"/>
-                <a:sym typeface="Raleway"/>
-              </a:rPr>
-              <a:t>morning</a:t>
-            </a:r>
-          </a:p>
-        </p:txBody>
-      </p:sp>
-    </p:spTree>
-    <p:extLst>
-      <p:ext uri="{BB962C8B-B14F-4D97-AF65-F5344CB8AC3E}">
-        <p14:creationId xmlns:p14="http://schemas.microsoft.com/office/powerpoint/2010/main" val="42026024"/>
-      </p:ext>
-    </p:extLst>
-  </p:cSld>
-  <p:clrMapOvr>
-    <a:masterClrMapping/>
-  </p:clrMapOvr>
+  <p:timing>
+    <p:tnLst>
+      <p:par>
+        <p:cTn id="1" dur="indefinite" restart="never" nodeType="tmRoot"/>
+      </p:par>
+    </p:tnLst>
+  </p:timing>
 </p:sld>
 </file>
 

</xml_diff>

<commit_message>
added bar plot for t-tests
</commit_message>
<xml_diff>
--- a/G103-capstone-1-pres-draft-1.pptx
+++ b/G103-capstone-1-pres-draft-1.pptx
@@ -1108,14 +1108,10 @@
             </a:r>
             <a:r>
               <a:rPr lang="en-US" baseline="0" dirty="0" smtClean="0"/>
-              <a:t> had always thought it was odd how their appeared to be an noticeable amount of posts that had a significant amounts </a:t>
-            </a:r>
-            <a:r>
-              <a:rPr lang="en-US" baseline="0" smtClean="0"/>
-              <a:t>of score (</a:t>
-            </a:r>
-            <a:r>
-              <a:rPr lang="en-US" sz="1100" b="0" i="0" u="none" strike="noStrike" cap="none" smtClean="0">
+              <a:t> had always thought it was odd how their appeared to be an noticeable amount of posts that had a significant amounts of score (</a:t>
+            </a:r>
+            <a:r>
+              <a:rPr lang="en-US" sz="1100" b="0" i="0" u="none" strike="noStrike" cap="none" dirty="0" smtClean="0">
                 <a:solidFill>
                   <a:srgbClr val="000000"/>
                 </a:solidFill>
@@ -1125,20 +1121,7 @@
                 <a:cs typeface="Arial"/>
                 <a:sym typeface="Arial"/>
               </a:rPr>
-              <a:t>simply </a:t>
-            </a:r>
-            <a:r>
-              <a:rPr lang="en-US" sz="1100" b="0" i="0" u="none" strike="noStrike" cap="none" dirty="0" smtClean="0">
-                <a:solidFill>
-                  <a:srgbClr val="000000"/>
-                </a:solidFill>
-                <a:effectLst/>
-                <a:latin typeface="Arial"/>
-                <a:ea typeface="Arial"/>
-                <a:cs typeface="Arial"/>
-                <a:sym typeface="Arial"/>
-              </a:rPr>
-              <a:t>the number of </a:t>
+              <a:t>simply the number of </a:t>
             </a:r>
             <a:r>
               <a:rPr lang="en-US" sz="1100" b="0" i="0" u="none" strike="noStrike" cap="none" dirty="0" err="1" smtClean="0">
@@ -10933,7 +10916,7 @@
           </a:bodyPr>
           <a:lstStyle/>
           <a:p>
-            <a:pPr marL="457200" indent="-342900">
+            <a:pPr marL="114300" lvl="2">
               <a:spcBef>
                 <a:spcPts val="1000"/>
               </a:spcBef>
@@ -10944,8 +10927,6 @@
                 <a:schemeClr val="dk1"/>
               </a:buClr>
               <a:buSzPts val="1800"/>
-              <a:buFont typeface="Raleway"/>
-              <a:buChar char="•"/>
             </a:pPr>
             <a:r>
               <a:rPr lang="en-US" dirty="0" smtClean="0">
@@ -10957,7 +10938,7 @@
                 <a:cs typeface="Raleway"/>
                 <a:sym typeface="Raleway"/>
               </a:rPr>
-              <a:t>Null hypothesis: there is not a significant difference in the post values in the morning</a:t>
+              <a:t>				-Null hypothesis: there is not a significant 				difference in the post values in the morning</a:t>
             </a:r>
             <a:r>
               <a:rPr lang="en-US" dirty="0">
@@ -10969,7 +10950,31 @@
                 <a:cs typeface="Raleway"/>
                 <a:sym typeface="Raleway"/>
               </a:rPr>
-              <a:t> (0-11 hours)</a:t>
+              <a:t> </a:t>
+            </a:r>
+            <a:r>
+              <a:rPr lang="en-US" dirty="0" smtClean="0">
+                <a:solidFill>
+                  <a:schemeClr val="dk1"/>
+                </a:solidFill>
+                <a:latin typeface="Raleway"/>
+                <a:ea typeface="Raleway"/>
+                <a:cs typeface="Raleway"/>
+                <a:sym typeface="Raleway"/>
+              </a:rPr>
+              <a:t>				(</a:t>
+            </a:r>
+            <a:r>
+              <a:rPr lang="en-US" dirty="0">
+                <a:solidFill>
+                  <a:schemeClr val="dk1"/>
+                </a:solidFill>
+                <a:latin typeface="Raleway"/>
+                <a:ea typeface="Raleway"/>
+                <a:cs typeface="Raleway"/>
+                <a:sym typeface="Raleway"/>
+              </a:rPr>
+              <a:t>0-11 hours)</a:t>
             </a:r>
             <a:r>
               <a:rPr lang="en-US" dirty="0" smtClean="0">
@@ -11006,7 +11011,7 @@
             </a:endParaRPr>
           </a:p>
           <a:p>
-            <a:pPr marL="457200" indent="-342900">
+            <a:pPr marL="114300">
               <a:spcBef>
                 <a:spcPts val="1000"/>
               </a:spcBef>
@@ -11017,8 +11022,6 @@
                 <a:schemeClr val="dk1"/>
               </a:buClr>
               <a:buSzPts val="1800"/>
-              <a:buFont typeface="Raleway"/>
-              <a:buChar char="•"/>
             </a:pPr>
             <a:r>
               <a:rPr lang="en-US" dirty="0" smtClean="0">
@@ -11030,11 +11033,11 @@
                 <a:cs typeface="Raleway"/>
                 <a:sym typeface="Raleway"/>
               </a:rPr>
-              <a:t>Alternate hypothesis: posts made in the afternoon would have significantly different values than the afternoon. </a:t>
+              <a:t>				-Alternate hypothesis: posts made in the 				afternoon would have significantly different 				values than the afternoon. </a:t>
             </a:r>
           </a:p>
           <a:p>
-            <a:pPr marL="457200" indent="-342900">
+            <a:pPr marL="114300">
               <a:spcBef>
                 <a:spcPts val="1000"/>
               </a:spcBef>
@@ -11045,10 +11048,20 @@
                 <a:schemeClr val="dk1"/>
               </a:buClr>
               <a:buSzPts val="1800"/>
-              <a:buFont typeface="Raleway"/>
-              <a:buChar char="•"/>
             </a:pPr>
             <a:r>
+              <a:rPr lang="en-US" dirty="0">
+                <a:solidFill>
+                  <a:schemeClr val="dk1"/>
+                </a:solidFill>
+                <a:latin typeface="Raleway"/>
+                <a:ea typeface="Raleway"/>
+                <a:cs typeface="Raleway"/>
+                <a:sym typeface="Raleway"/>
+              </a:rPr>
+              <a:t>	</a:t>
+            </a:r>
+            <a:r>
               <a:rPr lang="en-US" dirty="0" smtClean="0">
                 <a:solidFill>
                   <a:schemeClr val="dk1"/>
@@ -11058,7 +11071,7 @@
                 <a:cs typeface="Raleway"/>
                 <a:sym typeface="Raleway"/>
               </a:rPr>
-              <a:t>I found that Morning or </a:t>
+              <a:t>			-I found that Morning or </a:t>
             </a:r>
             <a:r>
               <a:rPr lang="en-US" dirty="0">
@@ -11094,7 +11107,7 @@
                 <a:cs typeface="Raleway"/>
                 <a:sym typeface="Raleway"/>
               </a:rPr>
-              <a:t>not significantly effect the amount of posts made with scores, t(22) = -1.699, p=.</a:t>
+              <a:t>not </a:t>
             </a:r>
             <a:r>
               <a:rPr lang="en-US" dirty="0" smtClean="0">
@@ -11106,6 +11119,54 @@
                 <a:cs typeface="Raleway"/>
                 <a:sym typeface="Raleway"/>
               </a:rPr>
+              <a:t>				significantly </a:t>
+            </a:r>
+            <a:r>
+              <a:rPr lang="en-US" dirty="0">
+                <a:solidFill>
+                  <a:schemeClr val="dk1"/>
+                </a:solidFill>
+                <a:latin typeface="Raleway"/>
+                <a:ea typeface="Raleway"/>
+                <a:cs typeface="Raleway"/>
+                <a:sym typeface="Raleway"/>
+              </a:rPr>
+              <a:t>effect the amount of posts made </a:t>
+            </a:r>
+            <a:r>
+              <a:rPr lang="en-US" dirty="0" smtClean="0">
+                <a:solidFill>
+                  <a:schemeClr val="dk1"/>
+                </a:solidFill>
+                <a:latin typeface="Raleway"/>
+                <a:ea typeface="Raleway"/>
+                <a:cs typeface="Raleway"/>
+                <a:sym typeface="Raleway"/>
+              </a:rPr>
+              <a:t>				with </a:t>
+            </a:r>
+            <a:r>
+              <a:rPr lang="en-US" dirty="0">
+                <a:solidFill>
+                  <a:schemeClr val="dk1"/>
+                </a:solidFill>
+                <a:latin typeface="Raleway"/>
+                <a:ea typeface="Raleway"/>
+                <a:cs typeface="Raleway"/>
+                <a:sym typeface="Raleway"/>
+              </a:rPr>
+              <a:t>scores, t(22) = -1.699, p=.</a:t>
+            </a:r>
+            <a:r>
+              <a:rPr lang="en-US" dirty="0" smtClean="0">
+                <a:solidFill>
+                  <a:schemeClr val="dk1"/>
+                </a:solidFill>
+                <a:latin typeface="Raleway"/>
+                <a:ea typeface="Raleway"/>
+                <a:cs typeface="Raleway"/>
+                <a:sym typeface="Raleway"/>
+              </a:rPr>
               <a:t>106, </a:t>
             </a:r>
             <a:r>
@@ -11118,7 +11179,31 @@
                 <a:cs typeface="Raleway"/>
                 <a:sym typeface="Raleway"/>
               </a:rPr>
-              <a:t>and comments, t(22) = 0.783, </a:t>
+              <a:t>and </a:t>
+            </a:r>
+            <a:r>
+              <a:rPr lang="en-US" dirty="0" smtClean="0">
+                <a:solidFill>
+                  <a:schemeClr val="dk1"/>
+                </a:solidFill>
+                <a:latin typeface="Raleway"/>
+                <a:ea typeface="Raleway"/>
+                <a:cs typeface="Raleway"/>
+                <a:sym typeface="Raleway"/>
+              </a:rPr>
+              <a:t>				comments</a:t>
+            </a:r>
+            <a:r>
+              <a:rPr lang="en-US" dirty="0">
+                <a:solidFill>
+                  <a:schemeClr val="dk1"/>
+                </a:solidFill>
+                <a:latin typeface="Raleway"/>
+                <a:ea typeface="Raleway"/>
+                <a:cs typeface="Raleway"/>
+                <a:sym typeface="Raleway"/>
+              </a:rPr>
+              <a:t>, t(22) = 0.783, </a:t>
             </a:r>
             <a:r>
               <a:rPr lang="en-US" dirty="0" err="1">
@@ -11147,6 +11232,105 @@
           </a:p>
         </p:txBody>
       </p:sp>
+      <p:sp>
+        <p:nvSpPr>
+          <p:cNvPr id="3" name="AutoShape 4" descr="data:image/png;base64,iVBORw0KGgoAAAANSUhEUgAAAawAAAFqCAYAAABGeW4FAAAABHNCSVQICAgIfAhkiAAAAAlwSFlzAAALEgAACxIB0t1+/AAAADh0RVh0U29mdHdhcmUAbWF0cGxvdGxpYiB2ZXJzaW9uMy4xLjEsIGh0dHA6Ly9tYXRwbG90bGliLm9yZy8QZhcZAAAgAElEQVR4nO3dd7hcVbnH8e8vhBJ6C0pNQFpAEQEFFJULXJpSVBAEaZdqRUABy70CcgW8Kui1IIo0BUREmiAqVZEieBFFRIqRxAQIkEDoBN77x7uG7ExmTknOnJmd/D7Pc54zs9usXd+91l57LUUEZmZmvW5EtxNgZmY2EA5YZmZWCw5YZmZWCw5YZmZWCw5YZmZWCw5YZmZWC/N0wJK0t6RfdTsdDZJGSbpC0lOSftrt9MxrJI2VFJJGdun33yHpfknPSNq1G2mwedtQHuOStpQ0cS7mf6ek++Y2HYMxoIAlaS9Jd5QTcbKkqyVt0enEza2I+HFEbNvtdFTsBrwOWC4idu92YmzInQB8KyIWj4hLu52YTpN0tqQTu52OTpiX122oRMRvI2Kd4fzNfgOWpCOB04Avkxfb1YDvALt0Nmlzp1t32f0YA/w9ImZ0MxE9um16yhxuozHAPUOdFrNe07VrSES0/QOWAp4Bdu9jmoXJgDap/J0GLFzGbQlMBI4GHgMmA7sCOwJ/B54EPldZ1nHAxcBPgOnAH4E3V8YfCzxYxv0VeF9l3P7AzcCpZbknlmG/K+NVxj0GPAXcDbyxsp7nAlOAfwJfAEZUlvs74KvAVOAfwA59bI9xwA3ANPLitXMZfjzwEvBy2aYHtpj3bcAtZd7JwLeAhcq404GvNk1/GXBk+bwS8LOyDv8APtliu/4IeBo4qK/fKvNsC9xXttV3gBuBgyrj/wO4t2yTa4AxbbbHWCCA/YCHgceBz1fGnw2cWPm+JTCx8n088Jmyv54FziRvnK4ux8FvgGWafusQ8licDBxVWdYIZh5DTwAXAcs2zXtgSedNbdbnYOAB8hi7HFipDH8QeBV4vuzfhVvMuypwSdlHT5C5sUa6vkAee4+Rx+JSTek6AJhQtvdhwFvLNpnWWE6L82Aa8BDw9jJ8Qln+fk3n71fLOj9KHmejms7fo5h5/h5Qxh1CHssvlfW9ogw/BvhX2Tf3AVv3cW0ZqnNuPPBZ8powFTgLWGQA+6zlNWEI1u1s8py5usx/M/B68to4Ffgb8JYBXtcWKNvh8bIvP1aOh5GV7Xhm2Tf/Iq97C7RJ16iStqnldz7DrOdaAGu2Ojcrx8IxwCPAebQ+Vz9dtuNT5HW8uh+OLumcRF6DZvm9gfz1F7C2B2Y0Nk6baU4AbgVWAEYDvwe+VFnJGcB/AQuWA2cKcD6wBLA+8AKwRuXC+jJZdLZgWfl/AAuW8buTF+YRwB7kBWzFykE+A/gEMLLsnP2ZGbC2A+4EliYP1HGVec8lL/5LkBeIv1MCSlnGyyXtCwAfKRtcLbbFguSJ8TlgIWAr8iBcp7J+P+pjW24MbFbSP5YMCJ8q495FXnBUvi9DXhwb2+POsp0XAtYgD+7tmrbrrmXaUf381vJkYHt/GX94mf+gMn7Xsp7jyvgvAL/vJ2B9v/zum4EXgXGDCFi3kkFqZfLi8kfgLeTF9jrgi02/dQGwGPAm8njbpoz/VFnWKmXe7wEXNM17bpl3VIt12Yq8cGxU5v9fKoGtpHWbNtthAeBP5AVyMWARYIsy7j/K9lwDWJwMauc1pev0Ms+25DlzKXnONbbJu5vOgwPKb55IBqNvlzRvSx6Ti5fpTyMv4suSx/8VwElN5+8J5LG9I/AcM28QmvfdOuQxulIl7W9osz2G5JyrbPe/kDcEy5IB4sT+9hl9XxPmZt3OLr+5cdln15HXsX0r++T6yvR9XdcOIwNcY92uZ9aAdSl5HC9WjofbgUPbpOtk4LdlOauWbTaYgDUDOKVsx1G0PldvL+uyLHlNOawSSx4hr/mLkgFvyAPW3sAj/UzzILBj5ft2wPjKSj5PifjkwRnAppXp7wR2rVxYb62MG0FG5He2+e27gF0qB/nDTeP3Z2bA2oo8KTaj3MlVLiQvAutVhh0K3FBZxgOVcYuWdXh9i/S8s+yU6vIvAI6rrF/bgNVieZ8Cfl4+i7zwvKt8Pxi4rnzetMW6fxY4q/K7LXMMbX5rX+CWyjiRJ2sjYF1NJYdY9tNztMhlMfOCu0pl2O3Anm0uDFsy+0mwd+X7z4DvVr5/Ari06bfWrYz/CnBm+XwvlbtiYEXywjiyMu8afWyjM4GvVL4vXuYfW0lru4C1ORk8Z7v5A64FPlr5vk6LdK1cGf8EsEfTNmncbOwP3F8Z96Yy/+ua5t+w7NdnqVx4Szr/0XT+jqyMfwzYrM2+W7OM34Zyk9lmWwzZOVfZ7odVvu8IPNjfPqPNNWFu1q0y7/ebjtF7m/bJtD7mr17Xrmtat23LthhJ3sS9SOXmCvgQlWDYtNyHgO0r3w9hcAHrJWbNMW3J7Ofqh5vOvdPL5x9SboQq23PQAau/Z1hPAMv3U165Epmlb/hnGfbaMiLilfL5+fL/0cr458mDqGFC40NEvEpmQ1cCkLSvpLskTZM0jcy+L99q3mYRcR1Z7PVt4FFJZ0hassy/UIt1WLny/ZHKcp4rH6tpblgJmFDS3W5ZbUlaW9KVkh6R9DT53HD58rsBXEgekAB7AT8un8cAKzW2S9k2nyMP6IZZtk1fv9VYj8o6B7kfGsYA36j81pPkxa+v9Xyk8vk5Wm+/dpqPl76OH5h1XavH4xjg55V03wu8Qh/bqcksx3pEPEOeIwPZv6sC/4zWzy9bnUONC1LDYLZB8zgiotX0o8lgcGdlm/yyDG94oinNbfddRDxA3vgcBzwm6UJJK7WYdCjPuYZ2+7ztPuvjmjA369Yw4P3Vz3VtlnORWbfZGDLnO7ky7/fInFYrfS1rIKZExAv9TNPuPG/+7b7Os7b6C1i3kMUPfVXRnURuuIbVyrA5tWrjg6QRZPHNJEljyGKlj5O17JYms7SqzBt9LTgivhkRG5PZ0rXJMtzHyTuu5nX41xykfRKwakn3nCzru2T2f62IWJIMOtX1uwDYrWyLTck7a8id/4+IWLryt0RE7FiZt3nb9PVbk8ntDoAkVb+X3zu06fdGRcTvB7ieVc+SF82G18/BMpqtWvlcPR4nkM9CquleJCKq+6evY2iWY13SYsByDGz/TgBWa3Pz1+ocmsGsF7lOeJy8eK5f2R5LRcRAbyZm21YRcX5EbEGuT5BFSK1+d6jOuYZ2+7zPfdbmmgBzvm6DMoDr2uQW69YwgcxhLV/Zf0tGxPptfq6vZUEGmL7OxT6vr/2Y5ZrSlI4B6zNgRcRT5HORb0vaVdKikhaUtIOkr5TJLgC+IGm0pOXL9D+ak8QUG0t6fzmxP0XukFvJMtogi1WQdAB5JzIgkt4qaVNJC5IXyReAV0ru7yLgvyUtUQ6gI+dwHW4ryz66bKctgZ3InNFALEE+O3pG0rpk2f1rIuL/yPX/AXBNREwro24HnpZ0THnXawFJb5T01jn8rV8Abyr7fCT5oLd68J4OfFbS+gCSlpI0p9X07wJ2lLSspNeT+3xu/Wc5Vtcnn+X8pAw/ndzPYwDKMTuY2q7nAwdI2lDSwmSu9LaIGD+AeW8nT9qTJS0maRFJ7yjjLgCOkLS6pMXLcn/SJjc2ZEpJwPeBUyWtACBpZUnbDXARj5LP3SjzriNpq7JtXiCD4SvNMw3xOdfwMUmrSFqWvPlq7PO2+6zdNWFu1m0O9Hdduwj4ZFm3ZcgKGgBExGTgV8DXJC0paYSkN0h6d5vfuog8b5eRtApZVFl1F7BXuX5sD7Rbzpy4iNwP4yQtSsaJQeu3WntEfJ08mL5AbtQJ5N1A4z2TE4E7yJohfyYfiM/N+wuXkQ8epwL7AO+PiJcj4q/A18hc36NkOfDNg1jukuTJOZXMCj9B1r6B3HHPkmW8vyMP8h8ONuER8RKwM7ADeRf5HWDfiPjbABfxabKob3pJ609aTHMBWY5+fuV3XyED44bkw93HyaC21Jz8VkQ8Tj4I/gq5ndYj9/GLZfzPybvLC0tx4l/KOs+J88jKCOPJk6/VOg/WjWQlhmvJmpWNl8e/QVYw+JWk6eSN0KYDXWhEXAv8J5mznQy8AdhzgPM29tGa5LPIieRxDnmsnQfcRO6/F5j9YtIpx5Db6tayL39DPkMbiDOB9Upx1KXkw/iTyePvEbJo6nNt5h2Sc67ifPL4eaj8nQj97rO+rglzs24DNoDr2vfJWrh/Iq+tlzQtYl+yeLVRQ/Ji8tlsK8eT6/kPclud1zT+cPIYnUbWXxiydwkj4mrgm2SlkQfI9YVyTRmoRo2zniDpOPIh3Ie7nRabqRRxTiQrP1zf7fSYVUkaT1YI+k2302IDI2kceaO78GBKEubppplszknaTtLSpQik8Xzr1i4ny8xqStL7JC1UijZPId9vG1SxtwOWtbM5+crC42Qxwa4R8Xzfs5iZtXUo+VjpQfL530f6nnx2PVUkaGZm1o5zWGZmVgsOWENMc9lkfy9Qh7sNkHSopNM6tfw+fndhSX9rVOEeht8bVFcQg51+bmke7w5F0gW9uF6SPinp5G6no44csOZSucCs2aFl71+W//Wm4buW4Wd34nejg90GSFqIfEXifyrDNpR0p6Tnyv8N+5pf0sWSxpdtsGXT+H+TdL2yz7Hx1XER8SJZdfqYoVynOVXWYZsO/8bqkl6V9J0Wo2fpDkXSDZIO6mR6houkDch2Ky8r31eUdLmkSeW4Gds0/VdL8J5ebmr27Wf5baeXtLykmyU9UarF36KZ79wBnAF8eLhunOYlDli970Fgj6a77n3JNtAGbbju3vuwC/C3RusSJYBdRr40ugxwDnBZGd7O74APM2szMA3PkkHpMy3GQb6vs1+p/Tg/2Jd8P2fPFus8hiHsDkXSAkO1rCFwKPDjmPmQ/lWy2akPtJn+WbJy0VJkzwLfkPT2Ppbf1/TPkA0ajyaP6VOAKxrnXmne6Gpy39hgDKbhQf/N1pjkTeRb6s+SB+ke9NElQ5mnbXcOLZa/P3lx/iXwnjJsWfJC/T/A2ZVpdyYvPtPI7k3GVcaNJ3MVd5Mv6o2kj64A6GC3AWQw+ULl+7ZkMzmqDHuYSiOdfWz/icCWbcZtQ2mEucW4+ymtm7cY11+3K0G2oH0/GQi+zczKS312BdH0O+cxa3ckR9N/Vyxtu0fpYxs9SNbGehTYrWl49fdPImtuvVC+N7o+WRf4Ndle5H3AByvLOJts4usq8hzYpgz7NtlaynSy9Zdq47pvB/5QjqM/AG+vjFuJfLH7SfLl0oMr444r63tuWe49wCZ9rPdDlNbwm4aPLNt4bD/b7XIqXdMM4FhsOX3ZZzuV31yhMnxv2jRS678+tnO3E1D3P2Zv4XhL+u6SoW13Di2WvT8ZsPYim+oB+CjZwOWJlIBFtoH2LPDv5TePLid8oy+t8WSzK6sys6+j8bTvCmBLOtRtQLlI7V75fgRwddM0Vw7kYsGcB6zLqfQX1jSubbcrlf19JdklxWpkNd3ty7g+u4Jo8VvjqbTuTv9dsbTtHqXN8t9Z5l+G7Fbj8n5+/wZm7fNsMbJlmwPK9tiIDKLrl/Fnk4HnHeSFeZEy7Eky8I8kG2i+sEy/LDNbsBlJNuQ8lWxDD7KFku+U5WxYtu3WZdxxZDDdkbwxOIlKzw5N69Vo7mh0i3H9Bqyy7SczgJumvqYnb/BeauzTpnEbAU924po0L/+5SLAzXgZOiGxS6iryjnUdSSK7BTkiIp6MiOlk22b9Ne/zc2BLSUuRxQjnNo3fA/hFRPw6Il4m7/JHkXezDd+MiAkx67tU34yISRHxJBk42z476mPaD5LdmNwT2ar28f2sy9LkHXLD4uRFr+opMph3yvSSjtlExJ0RcWtEzIhsI/B7zN6m2skRMS0iHiaDUnVbnFa285PkRXVOHB8Rz0fEn8gmed5chh9K5rgmRj6PO45sDLldMe9+5M3AVLIodIdBPjd5Lxn0zyrb449kE0e7Vaa5LCJujohXY2ZL3pdExO2RL4X+mJnb5z1k1yfnleVdQAb4nSStCmwBHBMRL0TEXWTzYvtUfut3EXFVZDNX51W2S7PGvp3eZnx/Tie3+zVzM31EbEA2/7QXeeNZNZ2+m06zFhywOqNdlwwD6c5hNiXI/IKsrLB8RDS3odjchcKr5J1xtbuGVs35D6bLj6HqNmAqswajZ8iTumpJYLqk1UoNtmckPdPPcgdjCbLIbzbqu9uVhoFui8F239Df8sfQf/cojfUYRbYH+WOAiLiFLGbcaxDpGANsqlm7rdmbWRtCHsxx1dyNCszsVmQlMscxvcW4dstdpE2wbuzbQd/0SPofsvHZD0ZkVkjS6ZXj8HP9TV9Vgu8FwLGSqgF2CWa/UbN+OGANr7npzuFc8rlYc4OVMHsXCiKLpQbabcbcGGy3AXeTRZgN9wAblDQ3bADcExEPR9ZgW3yA22igxpF3xK3018VLX/rrvqHZYPfJQLpHaXgfGfi/U4LvI+TFv68H/c3pmQDc2PR7i0fER/qYpy/N3ajAzG5FJgHLSlqixbhBiYhnyWd0a/c3bZWk48lGnLeNiKcryzuschx+ub/p21iQSuvv9H0MWhsOWHNvlm4I+hJz153DjeQzqv9tMe4i4D2StlZ2lXAU+exiTvqnGqzBdhtwFbMWsd1A5hI+qXxP6uNl+HXtFlCmW6R8XUjZVYfKuBFl3IL5VYtUaxxKWpl8ltKuXcQ+u3jpR9uuINoY8LFTDKZ7lP3ICi5vIovkNiSfNW0o6U0DTM+VwNqS9lF2l7OgskuOcYNIc9VVZXl7SRopaQ+yJ4ArI2ICebyeVPbZBsCBzOykdE5+a5ai3HJcNGpKVo8hJH2WzH3+e0Q80d/C+5pe0maStlC+gjFK0jFkLvi2ymTvJmsK2iA4YM2944BzSpHJBwcw/Rx15xDp2vJspHncfWQ17/9lZtt/O0V2d9JRMfhuA64A1lXprbWkcVfyzn8aWR14137Sfh+ZU12ZfG7wPDPv3N9Vvl9F3qE/T3al0LAXcE55BtTKQLp4aae/riCanUT2JTdN0qcHsPwBdY9SgvLW5PO0Ryp/d5JF0Pv1sfzdJE2V9M1SPLct+Yx1ElkkdwozL/qDUi7s7yVvqJ4gKwe9N7I7G8hKGGPLb/0c+GJE/HpOfot812nvppx7o0YkZC66+jz3y+Tx0niRerbivyZ9Tb8wWVPyCTKHuCNZy3cSvBY4dyRf4bBBcFuCNqQ0gG4DJB0CrBcRQ9FZ42DStjAZTN4VEY8N52/b8JN0PnBRRAxZv05DQdIngFUj4uhup6VuHLBsrkl6H1kpZDHyrvHViOi5JnHMrN5cJGhDYa67DTAz649zWGZmVgvOYZmZWS04YJmZWS10u+XuubL88svH2LFju50MM7NaufPOOx+PiD5b2OlFtQ5YY8eO5Y477uh2MszMakXSnDYb1lUuEjQzs1pwwDIzs1pwwDIzs1pwwDIzs1pwwDIzs1pwwDIzs1pwwDIzs1pwwDIzs1qo9YvDc0MD7fTc5jtuD9qsNzmHZWZmteCAZWZmteCAZWZmteCAZWZmteCAZWZmteCAZWZmteCAZWZmteCAZWZmteCAZWZmteCAZWZmteCAZWZmteCAZWZmteCAZWZmteCAZWZmteCAZWZmteCAZWZmteCAZWZmteCAZWZmteCAZWZmteCAZWZmteCAZWZmteCAZWZmteCAZWZmteCAZWZmtTCy0z8gaQHgDuBfEfFeSasDFwLLAn8E9omIlyQtDJwLbAw8AewREeM7nT6znnW+up0C61V7RbdT0BXDkcM6HLi38v0U4NSIWAuYChxYhh8ITI2INYFTy3RmZmZAhwOWpFWA9wA/KN8FbAVcXCY5B9i1fN6lfKeM37pMb2Zm1vEc1mnA0cCr5ftywLSImFG+TwRWLp9XBiYAlPFPlenNzMw6F7AkvRd4LCLurA5uMWkMYFx1uYdIukPSHVOmTBmClJqZWR10Mof1DmBnSePJShZbkTmupSU1KnusAkwqnycCqwKU8UsBTzYvNCLOiIhNImKT0aNHdzD5ZmbWSzoWsCLisxGxSkSMBfYErouIvYHrgd3KZPsBl5XPl5fvlPHXRcT8WRXGzMxm0433sI4BjpT0APmM6swy/ExguTL8SODYLqTNzMx6VMffwwKIiBuAG8rnh4C3tZjmBWD34UiPmZnVj1u6MDOzWnDAMjOzWnDAMjOzWnDAMjOzWnDAMjOzWnDAMjOzWnDAMjOzWnDAMjOzWnDAMjOzWnDAMjOzWnDAMjOzWnDAMjOzWnDAMjOzWnDAMjOzWnDAMjOzWnDAMjOzWnDAMjOzWnDAMjOzWnDAMjOzWnDAMjOzWnDAMjOzWnDAMjOzWnDAMjOzWnDAMjOzWnDAMjOzWnDAMjOzWnDAMjOzWnDAMjOzWnDAMjOzWnDAMjOzWnDAMjOzWnDAMjOzWnDAMjOzWnDAMjOzWnDAMjOzWuhYwJK0iKTbJf1J0j2Sji/DV5d0m6T7Jf1E0kJl+MLl+wNl/NhOpc3MzOqnkzmsF4GtIuLNwIbA9pI2A04BTo2ItYCpwIFl+gOBqRGxJnBqmc7MzAzoYMCK9Ez5umD5C2Ar4OIy/Bxg1/J5l/KdMn5rSepU+szMrF46+gxL0gKS7gIeA34NPAhMi4gZZZKJwMrl88rABIAy/ilguU6mz8zM6qOjASsiXomIDYFVgLcB41pNVv63yk1F8wBJh0i6Q9IdU6ZMGbrEmplZTxuWWoIRMQ24AdgMWFrSyDJqFWBS+TwRWBWgjF8KeLLFss6IiE0iYpPRo0d3OulmZtYjOllLcLSkpcvnUcA2wL3A9cBuZbL9gMvK58vLd8r46yJithyWmZnNn0b2P8kcWxE4R9ICZGC8KCKulPRX4EJJJwL/B5xZpj8TOE/SA2TOas8Ops3MzGqmYwErIu4G3tJi+EPk86zm4S8Au3cqPWZmVm9u6cLMzGrBAcvMzGrBAcvMzGrBAcvMzGrBAcvMzGrBAcvMzGrBAcvMzGrBAcvMzGrBAcvMzGrBAcvMzGrBAcvMzGrBAcvMzGrBAcvMzGrBAcvMzGrBAcvMzGrBAcvMzGrBAcvMzGrBAcvMzGrBAcvMzGrBAcvMzGrBAcvMzGrBAcvMzGrBAcvMzGrBAcvMzGrBAcvMzGrBAcvMzGrBAcvMzGrBAcvMzGrBAcvMzGrBAcvMzGrBAcvMzGrBAcvMzGrBAcvMzGrBAcvMzGrBAcvMzGrBAcvMzGqhYwFL0qqSrpd0r6R7JB1ehi8r6deS7i//lynDJembkh6QdLekjTqVNjMzq59O5rBmAEdFxDhgM+BjktYDjgWujYi1gGvLd4AdgLXK3yHAdzuYNjMzq5mOBayImBwRfyyfpwP3AisDuwDnlMnOAXYtn3cBzo10K7C0pBU7lT4zM6uXYXmGJWks8BbgNuB1ETEZMqgBK5TJVgYmVGabWIaZmZl1PmBJWhz4GfCpiHi6r0lbDIsWyztE0h2S7pgyZcpQJdPMzHpcRwOWpAXJYPXjiLikDH60UdRX/j9Whk8EVq3MvgowqXmZEXFGRGwSEZuMHj26c4k3M7Oe0slaggLOBO6NiK9XRl0O7Fc+7wdcVhm+b6ktuBnwVKPo0MzMbGQHl/0OYB/gz5LuKsM+B5wMXCTpQOBhYPcy7ipgR+AB4DnggA6mzczMaqZjASsifkfr51IAW7eYPoCPdSo9ZmZWb27pwszMasEBy8zMasEBy8zMasEBy8zMasEBy8zMasEBy8zMasEBy8zMasEBy8zMasEBy8zMasEBy8zMasEBy8zMasEBy8zMasEBy8zMasEBy8zMasEBy8zMasEBy8zMasEBy8zMasEBy8zMasEBy8zMasEBy8zMasEBy8zMasEBy8zMasEBy8zMasEBy8zMasEBy8zMasEBy8zMasEBy8zMasEBy8zMasEBy8zMasEBy8zMasEBy8zMasEBy8zMasEBy8zMasEBy8zMasEBy8zMasEBy8zMaqFjAUvSDyU9JukvlWHLSvq1pPvL/2XKcEn6pqQHJN0taaNOpcvMzOqpkzmss4Htm4YdC1wbEWsB15bvADsAa5W/Q4DvdjBdZmZWQx0LWBFxE/Bk0+BdgHPK53OAXSvDz410K7C0pBU7lTYzM6uf4X6G9bqImAxQ/q9Qhq8MTKhMN7EMMzMzA3qn0oVaDIuWE0qHSLpD0h1TpkzpcLLMzKxXDHfAerRR1Ff+P1aGTwRWrUy3CjCp1QIi4oyI2CQiNhk9enRHE2tmZr1juAPW5cB+5fN+wGWV4fuW2oKbAU81ig7NzMwARnZqwZIuALYElpc0EfgicDJwkaQDgYeB3cvkVwE7Ag8AzwEHdCpdZmZWTx0LWBHxoTajtm4xbQAf61RazMys/nql0oWZmVmfHLDMzKwWHLDMzKwWHLDMzKwWHLDMzKwWHLDMzKwWHLDMzKwWHLDMzKwWHLDMzKwWHLDMzKwWHLDMzKwWHLDMzKwWHLDMzKwWHLDMzKwWHLDMzKwWHLDMzKwWHLDMzKwWHLDMzKwWHLDMzKwWHLDMzKwWHLDMzKwWHLDMzKwWHLDMzKwWHLDMzKwWHLDMzKwWHLDMzKwWHLDMzKwWHLDMzKwWHLDMzKwWHLDMzKwWHLDMzKwWHLDMzKwWHLDMzKwWHLDMzKwWHLDMzKwWHLDMzKwWeipgSdpe0n2SHpB0bLfTY2ZmvaNnApakBYBvAzsA6wEfkrRed1NlZma9omcCFvA24IGIeCgiXgIuBHbpcprMzKxH9FLAWhmYUPk+sQwzMzNjZLcTUKEWw2K2iaRDgEPK12ck3dfRVM0/lgce73YieoFaHYnWC3yMNuw91wfpmKFIxnDrpYA1EVi18n0VYFLzRBFxBnDGcCVqfiHpjojYpNvpMGvHx6j1UpHgH4C1JK0uaSFgT+DyLqfJzMx6RM/ksCJihqSPA9cACwA/jIh7upwsMzPrET0TsAAi4irgqm6nYz7lYlbrdT5G53OKmK1eg5mZWc/ppWdYZmZmbQYEVvYAABNnSURBVDlgWddJWqTbaTCz3uciQesqSUsCHyEr2pwKvFJaOjGrDUkKX0w7zjks67YFgMuA9YETgMMlLdvdJJn1T9J7JH1J0ihgwW6nZ37gHJb1BEkjgG2BfyNbNPhMRDzZ3VSZtSZpYWBd4CBgceAvwFURcW9XEzaPc8CyYSfpjcDuEfHF8n2BiHilfF4bOBB4Hjg5Il7oXkrNZidpJeC5iJhWvm8DvBV4C/DliLirm+mbl/XUe1g275O0MlkEOFbSYhHx6Yh4RdKIiHg1Iv4u6SpgJzKnNbGrCTarkPRtYDVgmqQbI+IHEfGb0qbpi8BHJX0pIib0vSSbE36GZcNtLPBFYGngnZK+ARARr5ZiQYCbgEWBT3QlhWYtSPoOsAJwKHAbsFhjXAlQvwSmAGuX6d2M8hBzwLJhFRE3A9dGxHRgO2CzpqC1TKlt9XlghitgWC+QtD4wNSJ2j4hJwBuAvSV9UdKRABHxV+BhstYrrjU49BywrOMkvU7SMo3vETG5VAOeBmwPbC7peEmbA9+StDwwHfgZ8FR3Um02U2nX9HgASVuRz6u+AFwH7CHpoDLd94DxkjbtVlrnZa50YR1V7kwvJWtRfSQiHmk8r5I0MiJmlOkmAMsBe0XEpWXYiIh4tWuJt/mepD3Jor+rgUfL89blyAzUk2Waw4HpEfHD8v1NwIMR8Vy30j2vcsCyjilVf38CPAI8RN6VHllyWK8FI0mrAHcAB0fEFX4J03qBpLOBZcmOZJ8BvhAR/2gx3ZVkMfep5btvtDrEAcs6StIawCvl66HA6sBR5TlAY5otyDvWmxsPqh2wrJskHQ1sHRHble9nAS9GxGGVaVYhW2d5OiIO7E5K5y8OWDZsJI0FDgHWiIg9y/ssoyLiwa4mzKyJpI3JZsLuqnw/uClg7QBsExFHle/OWXWYK11Yx1VyTeOBM4E7Jd0C/JV8bmXWa/5MPndteJksHQDyOVVEXO1gNbwcsKxjlEZERDTesSq5qX8B44B9I+L2ribSrIWIeKlSIWgk2Vbgs+X7z4D3Nk3vYDUMXCRoQ0LSmuRJPAH4fURMrox7PfAusqZVlP+nRsQlfmZlvag5x1R6FTgPWAiYGBEHdy1x8zHnsGyulYoVNwPLkBUrPiPpwDJuKeAWYPGImB4RzwA7O1hZr5C0k6Rdy7EKzMwxSfpQad9yAWAbsmr7wWWcr5/DzDksm2uSticfPn9a0opkburfyKrqdwNrRsT5ZVoHKesZks4hq64vQz6z+q+IeKyM+x7wemC3iHhZ0rsi4qYyzq9edIHvEGwozAB2kTSmFAX+kmwBYF2yym8jWI2IootpNQNA0nHAChGxE3mTtRJwWBm3GFm8vVtEvAxQCVYjfAx3hwOWzbWI+A3wI+BoSStGxFNkA7arA5tVpvODaeslNwHHwGvH5rcoDdpGxLMRcWLJWc3SOaOP4+5xwLKhcgkwDficpNUi4hHgGmBtSQt0N2lmLd0GNHe4uE7jg6R1StHfy8ObLGvHAcvmSqW6+p+BnwJPAL+UdBRwEnB9o3NGs26TdIikd8JruaiXy/ARwEtko8uNquvbuuivt7jShQ1K42GzpHUj4m9tpnk/WbQyMSKuH94UmrVWKljsAnwHuCYibmwavzLwDbJj2ycj4j+GP5XWF+ewbFBKsNoBuErSBtVxlRqAl0TEeY1g5Y7srNtK9zb3Ah8iu6zZUdK7myZbEHg/MKURrFx1vbc4h2WDIumNZHchH4yIP5aXgqcDz7n4xHpZ6Rx0amnTcn9gFPCriLi2Ms3OEXF5+eyq6z3GAcsGTNI6ZBfhjXesNgD2Ah4EjouIP3UxeWYDJml14ACy5ZVryOrsn4/s6t5tA/YoZ3dtQEoXIF8ly/fXJVu0eBjYCZhCBi+zWij9Wp1GvkN4MbBcI1iV8Q5WPcg5LOtXKQY8CLipNKm0FPBCRLwoaV3gfOATEXFzVxNqVkhaYCC1UyX9BbgrIj5cvjtn1cOcw7KB2IJsCWAjSYtHxFMlWG0LnAWc4GBlvaIRrCSNkPR5SWPaTLcI8H0Hq/pwDsvakrQesFNEnCJpP2BL4AIyp/VCqXAxOiL+7AfU1ktK7b4bgFsi4pimcbMdqw5W9TCy2wmw3lNO9gBWBNaXdFREfK20r7Y7sJCk60trFo+AG7O17qvkrEQ+Y/1DRBxTur7Zjnwv8LJWx6qDVT04h2WzkbRcRDwhaRSwOfBB4MGI+B9JRwAbAkdFxONdTahZ0cghlZutD5BV1j9Pdm3zEtmP1c7AlhFxd/dSanPDOSx7TWnzbzTwoKQ9I+KK0pX9COBISa9ExNdLq+wOVtYzSrAS8CmyBfZjy/G8IHBRREyTdAHZr5XVlHNYNhtJe5DN13w4Iq4uw35M3rUeVaoEm3Vd9XmUpIuA9cg2ACdVplkS+AHwckTs3Z2U2lBwDms+V2kbcDOyK5B7gZ8BTwIXS9obeBRYCviMg5X1kqbnUZ8jiwA/RhYHUoq1twWmRcQhZZgrCNWUc1hGaRvwm8DlwCrAVOAE4M1kf0Ejga9FxM+7lkizJpWbrVPIxmpPKRUsbgW+GhEnt5jHtQFrzAFrPlfK+U8Bfh0R10haG9gBWDoiji+Nhr4aEU/5ztR6QXPQkbQ98FGyBfZvS3oDcDPww4j4XLfSaUPPLw7Ph6qtp5fWAJYlq6sTEX8H7gY2l7RoREwtPQi76rr1hEawkrRvOUZ/CZwKbCfpiIh4kHxncMkuJtM6wAFrPiJpIXiti5BxkjYvo74CvCjp4+X7o2Qx4FJdSKZZS9UbLUlvA/4dOELSqNKVzXeB4yQdGxF/i4iPN89n9eaANZ+QtBxwgqSVSkO2PwfOkPRN8h2Va8g+gq4hGwP9dkRM7l6KzWYqLwW/lsOPiNuB75OvYRxRhl0N/BZ4sTqvSwbmHX6GNR8od5grAUeSwWkscDjZ2vpZwPjy/1/AOODZiLjfz6ysF1QqV4wgb6aeB0TWClwPeC8ZuBYC/hoRn63O16VkWwc4hzWPk7Q0cAbZBcg5wGPA2sCyETGDvDtdDTgKWDEi7oqI+8F3ptYbKsfh2cBDZAWLGWQN1ruAE8lKFrc4WM3b/B7WPK684f84WevvbkmvAssB+0t6PiLukXQUWa19VFcTa9aGpIWBRYELSyWgfSVdCJwSEfuQfVs1pnXV9XmUc1jzuFKMsgTwnwAR8RfgPDLHdbCkN5VmlvaLiHu7l1Kzmcpx2/isiHiRLLJ+s6QlyqijgGfKqxmvcbCad/kZ1nygvO3/K+DKiDilDNsI2I2sCXgM8JxPdOsFjcaXy+dTyFqrV5M5rBOBXwB/AT4CPBERH+1WWm14OWDN4ypdLryNfEj924j4Whm3IfB8RNzX1USaFZIOIjsL/TxwEtl47V3AfsD7yYoVewJjyO5CPlPm8zOr+YAD1jymqTHQ18ryyztYbwO+DPwfcCzwSkS85DJ/6wWSxpK5qbOAV4BHI+LIMm5/8oZrr4i4Q9KCEfFyGefjdz7hZ1jzmEZDtpLeULpcWKAMfykifge8B1ge+C/gmPLSpU9266pSArBPRDwPHEj2YfU2SeuVUoKzyZutGyWtT9YSbNyg+fidTziHNY+ovKsyjmy5YjXgfRHxUKVYsPF/BLAM2dDtgxHxTDfTbiZpDHAZcEREXF+eu/4AeJxsyHZCme4dEXFzF5NqXeSANQ+R9F6y7P9CsqfgNwB7R8TfKz2yuqzfekrlZutDwAbA6RHxT0mLke8QPkn2FjC+Mo+LAedDLhKct+xAntjfAPYnm186V9LqJViNcLCyXlM5Ju8hawK+W9LrI+JZ4BDyRfd3Nc3jYDUfcsCaR5RivkWAjcqgl4ArgJeB0yWt7JPcellE3E22WPFu4P2S3liC1s4RcW53U2e9wAGr5iRtJOktwAJkp4s7Szq8BKfFyc7sHiaLCM26rvlF3+qwiLgIuISsGPTfkvYkj20zP8Oqo0qZ/5ZkFeCHgD8DPwamkz0H30beqe4IfAiYHBHf6k6KzVL1WSrwFuDvjUo/kkaW9i0pz682JmsM/gS4seS2bD7mgFVTkt4OHES+XPk0sC+wMvBD4IHy+QWyZfZvAR/0C8LWTZVaqgJ+CawA3ALcUHJWr01TmWdR4AUXZxu4SLA2JK0i6WuVzuh2Aj5Mvvz7KFnBYiLwceDtpcX1UeQd6r4OVtZtlWDVaF5pM+BvZO/WezemaZrHTYbZa5zDqhFJbyJzU5Mi4mVJZ5FV13curbKvBXwAuCwi7pW0ILBIREzvYrLNXiNpBzJY/UdEnC1pebLJpfWBeyLijK4m0HqaA1YNVItJJF1J5py2i4gZpcfgcWSR39TScsXzfk/FekFzEV8ZdiTZp9WepZmlpYEDgCkR8aNupNPqwQGrx1UqWIwqzdYg6adkI6C7lZzWGWTQ+jfgVQcq6wWVChYjgOOApYErgbuBbcnOQw+NiNslLRoRz3UvtVYHDlg1IGl7sqbfAxHxpTLsZ2Q34XuUoLVeRPy1m+k0a1aeWV1DvhT8ONnK+sNkCxbvJ9u03CIiHmpM75fbrR1XuuhxkjYj705/A2wr6auSlo+ID5BFg5cCOFhZjxoHvBwRR0TEf5Pd3K8DrBsRp5Mdhz7UmNjByvrigNXDJK1EdgPy04g4D9gdeB3ZyvroiNiB0pOwWS9o8VLww8Aikj4MEBG/B8YDW5fvvy7z+Vpk/fJB0qMkvRv4IDAJ2EXS+hHxCFnuvwbwhdIn0B+7mU6zhmpvAJL2lPRBskfrnwBjJB1YJh1HFg++xs9dbSD8DKsHlaaWvkIGpxfI962WBr5XqquPBlaKiD91MZlmsynPrH5Hvl+1DnAjMI0MUHuRx/OTEbFf1xJpteWA1WMkrQkcTb7d/8kybGOyiaVVgdP8vMp6laSdyFcs9pG0JLAb2dr6V4BngRUb3YT41QsbLBcJ9h4BzwFvlPQugIi4k2zK5pFuJsysWYtnT88D4ySNiYingYuALYFNI+LFSrByT8E2aA5YXdZoaqm0ur4ZsDDwWeD3wPaSNgeIiD+QPa86d2U9oTyzelXpzZIWi4jfANcC7ylB6xnyRmuWohzXBrQ54SLBLqo8pN4O+F/ypco9gU+TJ/3HgCWAi90tuPWSppeCrwdmkO9Y7UA2uLw1sB0wAXgxInbvVlpt3uGA1QWSlo2IJxufyVpUX4+Iq8vzqp8CR5EPr48AznHjtdYrqi/3SjoeGBER/1k+v5u80bqP7Ex0kYi4qXk+sznhIsFhJmkscKekkwBK4HoQeLbctd4JHE62sD4F+LKDlfWKUioQkkZK2h94J9m7NRHxRfIF9+8Db4mI2x2sbCg5YA2/GeR231LS18uwycBhZMsVkLWpXpU0snw267pyQ9XoIuQ08ji+BlhF0rYAEXEicBNZq/U1DlY2FFwk2AWSPk12+z0amBERx0o6E1iW7NPqncB/RcTlXUym2WxKsDoMWCMiPiPpdWRHoksB10fE1V1NoM3TnMMaBpJWl7RHZdCfyIY/rwKWkHRCRBwIfJV80fKjEXF5pbNGs65pOg73AfYHFi8trTxKtg/4FPA+SRu0mc9srjmH1WGSFgL+DqwGnAzcDtwAvJdsveK35DOrZxovCpv1ijb9WR1Adg9yBnBLRLwgaTVgQ5cKWCc5h9VhEfESsAvwT+Ad5IvBVwKbAxuX5pVOI3Na63UtoWZNKs+sRkj6maQvSTojIs4C7iIbY96i9NX2cCNYOWdlneKANQxKUNoFeCP5XtU+ZdSKktYG/gx80i8FWy9pvBQMXE6WDFwC7CNp44g4hWyJ/RCyMebqfC62sY5wkeAwkvRWstrvRyLi/NI1+DMRMaPLSTN7jaSRjWNS0jLAR4CvA1cAv4iI0yS9PiIekbRjRFzVzfTa/MM5rGFUmlfaBjhN0icjYpqDlfUSSasCryvvWb2PrP33AbJb+x9GxGll0pMkbdgIVi4GtOHgHFYXSNqUzGmtD0x0I6DWCyTtCywGrAtsBtwWEZ8snS9+i2zEdhLZjNjzEbF/l5Jq8ykHrC6RtGRpzdqs6ySdBjwNfI188fcVsvv6P5fxBwMHAw8AUyPiY2W4W7CwYeOA1SWNE90nvHWbpKWAHwEXACsBT5B9WI0EroyIG8t0KwBPR8QL5bv7s7Jh5YBlZkh6D1mp4tqI+HdJiwFfIrsFuYps0PZ7EXFNmd43WjbsXOnCzCBzUz8FNpW0S0Q8C5xAtmW5F/BcI1iBq65bdziHZTYfknQWcD/w+4i4oTJ8O+Bi4ICIuLi01LJI43mriwGtmxywzOYzkhYlXwJeEHiOfGb1FeBfEfGUpJ3IZ1qfiIhzK/O5GNC6ykWCZvOZiHiObL0iyB6unwAOAH4gaY2IuIJsnHmLpvkcrKyrnMMym4809RZ8JVmR4gpJlwIbks0tPQR8NiImdzGpZrMZ2e0EmNnwKa9SNJ5DXQRsIGlHYJmIGCtpI2BFByvrRc5hmc2nJI0lW1yJiFirxXg/s7Ke4mdYZvOpiBgPfBy4WdJikkY0jXewsp7igGU2f7sDeAOwpqurW69zkaDZfE7SmhHxQLfTYdYfBywzA/zMynqfA5aZmdWCn2GZmVktOGCZmVktOGCZmVktOGCZmVktOGCZmVkt/D8uOTfyTttN8wAAAABJRU5ErkJggg=="/>
+          <p:cNvSpPr>
+            <a:spLocks noChangeAspect="1" noChangeArrowheads="1"/>
+          </p:cNvSpPr>
+          <p:nvPr/>
+        </p:nvSpPr>
+        <p:spPr bwMode="auto">
+          <a:xfrm>
+            <a:off x="0" y="0"/>
+            <a:ext cx="304800" cy="304800"/>
+          </a:xfrm>
+          <a:prstGeom prst="rect">
+            <a:avLst/>
+          </a:prstGeom>
+          <a:noFill/>
+          <a:extLst>
+            <a:ext uri="{909E8E84-426E-40DD-AFC4-6F175D3DCCD1}">
+              <a14:hiddenFill xmlns:a14="http://schemas.microsoft.com/office/drawing/2010/main">
+                <a:solidFill>
+                  <a:srgbClr val="FFFFFF"/>
+                </a:solidFill>
+              </a14:hiddenFill>
+            </a:ext>
+          </a:extLst>
+        </p:spPr>
+        <p:txBody>
+          <a:bodyPr vert="horz" wrap="square" lIns="91440" tIns="45720" rIns="91440" bIns="45720" numCol="1" anchor="t" anchorCtr="0" compatLnSpc="1">
+            <a:prstTxWarp prst="textNoShape">
+              <a:avLst/>
+            </a:prstTxWarp>
+          </a:bodyPr>
+          <a:lstStyle/>
+          <a:p>
+            <a:endParaRPr lang="en-US"/>
+          </a:p>
+        </p:txBody>
+      </p:sp>
+      <p:pic>
+        <p:nvPicPr>
+          <p:cNvPr id="7" name="Picture 6"/>
+          <p:cNvPicPr>
+            <a:picLocks noChangeAspect="1"/>
+          </p:cNvPicPr>
+          <p:nvPr/>
+        </p:nvPicPr>
+        <p:blipFill>
+          <a:blip r:embed="rId3">
+            <a:extLst>
+              <a:ext uri="{28A0092B-C50C-407E-A947-70E740481C1C}">
+                <a14:useLocalDpi xmlns:a14="http://schemas.microsoft.com/office/drawing/2010/main" val="0"/>
+              </a:ext>
+            </a:extLst>
+          </a:blip>
+          <a:stretch>
+            <a:fillRect/>
+          </a:stretch>
+        </p:blipFill>
+        <p:spPr>
+          <a:xfrm>
+            <a:off x="653903" y="1001774"/>
+            <a:ext cx="2738401" cy="1964046"/>
+          </a:xfrm>
+          <a:prstGeom prst="rect">
+            <a:avLst/>
+          </a:prstGeom>
+        </p:spPr>
+      </p:pic>
+      <p:pic>
+        <p:nvPicPr>
+          <p:cNvPr id="8" name="Picture 7"/>
+          <p:cNvPicPr>
+            <a:picLocks noChangeAspect="1"/>
+          </p:cNvPicPr>
+          <p:nvPr/>
+        </p:nvPicPr>
+        <p:blipFill>
+          <a:blip r:embed="rId4">
+            <a:extLst>
+              <a:ext uri="{28A0092B-C50C-407E-A947-70E740481C1C}">
+                <a14:useLocalDpi xmlns:a14="http://schemas.microsoft.com/office/drawing/2010/main" val="0"/>
+              </a:ext>
+            </a:extLst>
+          </a:blip>
+          <a:stretch>
+            <a:fillRect/>
+          </a:stretch>
+        </p:blipFill>
+        <p:spPr>
+          <a:xfrm>
+            <a:off x="653903" y="2965820"/>
+            <a:ext cx="2970472" cy="1936359"/>
+          </a:xfrm>
+          <a:prstGeom prst="rect">
+            <a:avLst/>
+          </a:prstGeom>
+        </p:spPr>
+      </p:pic>
     </p:spTree>
   </p:cSld>
   <p:clrMapOvr>
@@ -11212,11 +11396,19 @@
             <p:ph type="body" idx="2"/>
           </p:nvPr>
         </p:nvSpPr>
-        <p:spPr/>
+        <p:spPr>
+          <a:xfrm>
+            <a:off x="446483" y="1184671"/>
+            <a:ext cx="7647649" cy="3601818"/>
+          </a:xfrm>
+        </p:spPr>
         <p:txBody>
           <a:bodyPr/>
           <a:lstStyle/>
           <a:p>
+            <a:pPr marL="82550" indent="0">
+              <a:buNone/>
+            </a:pPr>
             <a:r>
               <a:rPr lang="en-US" sz="1500" dirty="0" smtClean="0">
                 <a:solidFill>
@@ -11227,10 +11419,13 @@
                 <a:cs typeface="Raleway"/>
                 <a:sym typeface="Raleway"/>
               </a:rPr>
-              <a:t>Null hypothesis: there is no significant difference in the comment and score values for posts made during work hours (9-18) than posts made outside of them (0-8 and 19-23)</a:t>
+              <a:t>				- Null hypothesis: there is no significant 					difference in the comment and score values for 					posts made during work hours (9-18) than posts 				made outside of them (0-8 and 19-23)</a:t>
             </a:r>
           </a:p>
           <a:p>
+            <a:pPr marL="82550" indent="0">
+              <a:buNone/>
+            </a:pPr>
             <a:r>
               <a:rPr lang="en-US" sz="1500" dirty="0" smtClean="0">
                 <a:solidFill>
@@ -11241,7 +11436,7 @@
                 <a:cs typeface="Raleway"/>
                 <a:sym typeface="Raleway"/>
               </a:rPr>
-              <a:t>Alternate hypothesis: posts made during work hours were significantly less likely to be highly </a:t>
+              <a:t>				- Alternate hypothesis: posts made during work 				hours were significantly less likely to be highly 					</a:t>
             </a:r>
             <a:r>
               <a:rPr lang="en-US" sz="1500" dirty="0" err="1" smtClean="0">
@@ -11269,6 +11464,9 @@
             </a:r>
           </a:p>
           <a:p>
+            <a:pPr marL="82550" indent="0">
+              <a:buNone/>
+            </a:pPr>
             <a:r>
               <a:rPr lang="en-US" sz="1500" dirty="0" smtClean="0">
                 <a:solidFill>
@@ -11279,7 +11477,7 @@
                 <a:cs typeface="Raleway"/>
                 <a:sym typeface="Raleway"/>
               </a:rPr>
-              <a:t>I </a:t>
+              <a:t>				- I </a:t>
             </a:r>
             <a:r>
               <a:rPr lang="en-US" sz="1500" dirty="0">
@@ -11291,7 +11489,7 @@
                 <a:cs typeface="Raleway"/>
                 <a:sym typeface="Raleway"/>
               </a:rPr>
-              <a:t>found that there was a significant difference in the mean posts made during working </a:t>
+              <a:t>found that there was a significant difference </a:t>
             </a:r>
             <a:r>
               <a:rPr lang="en-US" sz="1500" dirty="0" smtClean="0">
@@ -11303,7 +11501,7 @@
                 <a:cs typeface="Raleway"/>
                 <a:sym typeface="Raleway"/>
               </a:rPr>
-              <a:t>hours and </a:t>
+              <a:t>					in </a:t>
             </a:r>
             <a:r>
               <a:rPr lang="en-US" sz="1500" dirty="0">
@@ -11315,6 +11513,30 @@
                 <a:cs typeface="Raleway"/>
                 <a:sym typeface="Raleway"/>
               </a:rPr>
+              <a:t>the mean posts made during working </a:t>
+            </a:r>
+            <a:r>
+              <a:rPr lang="en-US" sz="1500" dirty="0" smtClean="0">
+                <a:solidFill>
+                  <a:schemeClr val="dk1"/>
+                </a:solidFill>
+                <a:latin typeface="Raleway"/>
+                <a:ea typeface="Raleway"/>
+                <a:cs typeface="Raleway"/>
+                <a:sym typeface="Raleway"/>
+              </a:rPr>
+              <a:t>hours 					and </a:t>
+            </a:r>
+            <a:r>
+              <a:rPr lang="en-US" sz="1500" dirty="0">
+                <a:solidFill>
+                  <a:schemeClr val="dk1"/>
+                </a:solidFill>
+                <a:latin typeface="Raleway"/>
+                <a:ea typeface="Raleway"/>
+                <a:cs typeface="Raleway"/>
+                <a:sym typeface="Raleway"/>
+              </a:rPr>
               <a:t>privately spent hours </a:t>
             </a:r>
             <a:r>
@@ -11339,7 +11561,79 @@
                 <a:cs typeface="Raleway"/>
                 <a:sym typeface="Raleway"/>
               </a:rPr>
-              <a:t>scores, t(22) =2.620, p=0.0156, and comments, t(22)=4.491, p=1.82e-4).</a:t>
+              <a:t>scores, </a:t>
+            </a:r>
+            <a:r>
+              <a:rPr lang="en-US" sz="1500" dirty="0" smtClean="0">
+                <a:solidFill>
+                  <a:schemeClr val="dk1"/>
+                </a:solidFill>
+                <a:latin typeface="Raleway"/>
+                <a:ea typeface="Raleway"/>
+                <a:cs typeface="Raleway"/>
+                <a:sym typeface="Raleway"/>
+              </a:rPr>
+              <a:t>t(22</a:t>
+            </a:r>
+            <a:r>
+              <a:rPr lang="en-US" sz="1500" dirty="0">
+                <a:solidFill>
+                  <a:schemeClr val="dk1"/>
+                </a:solidFill>
+                <a:latin typeface="Raleway"/>
+                <a:ea typeface="Raleway"/>
+                <a:cs typeface="Raleway"/>
+                <a:sym typeface="Raleway"/>
+              </a:rPr>
+              <a:t>) </a:t>
+            </a:r>
+            <a:r>
+              <a:rPr lang="en-US" sz="1500" dirty="0" smtClean="0">
+                <a:solidFill>
+                  <a:schemeClr val="dk1"/>
+                </a:solidFill>
+                <a:latin typeface="Raleway"/>
+                <a:ea typeface="Raleway"/>
+                <a:cs typeface="Raleway"/>
+                <a:sym typeface="Raleway"/>
+              </a:rPr>
+              <a:t>= 					2.620</a:t>
+            </a:r>
+            <a:r>
+              <a:rPr lang="en-US" sz="1500" dirty="0">
+                <a:solidFill>
+                  <a:schemeClr val="dk1"/>
+                </a:solidFill>
+                <a:latin typeface="Raleway"/>
+                <a:ea typeface="Raleway"/>
+                <a:cs typeface="Raleway"/>
+                <a:sym typeface="Raleway"/>
+              </a:rPr>
+              <a:t>, p=0.0156, and comments, t(22)=4.491, </a:t>
+            </a:r>
+            <a:r>
+              <a:rPr lang="en-US" sz="1500" dirty="0" smtClean="0">
+                <a:solidFill>
+                  <a:schemeClr val="dk1"/>
+                </a:solidFill>
+                <a:latin typeface="Raleway"/>
+                <a:ea typeface="Raleway"/>
+                <a:cs typeface="Raleway"/>
+                <a:sym typeface="Raleway"/>
+              </a:rPr>
+              <a:t>					p=1.82e-4</a:t>
+            </a:r>
+            <a:r>
+              <a:rPr lang="en-US" sz="1500" dirty="0">
+                <a:solidFill>
+                  <a:schemeClr val="dk1"/>
+                </a:solidFill>
+                <a:latin typeface="Raleway"/>
+                <a:ea typeface="Raleway"/>
+                <a:cs typeface="Raleway"/>
+                <a:sym typeface="Raleway"/>
+              </a:rPr>
+              <a:t>).</a:t>
             </a:r>
           </a:p>
           <a:p>
@@ -11349,7 +11643,7 @@
       </p:sp>
       <p:pic>
         <p:nvPicPr>
-          <p:cNvPr id="4" name="Picture 3"/>
+          <p:cNvPr id="5" name="Picture 4"/>
           <p:cNvPicPr>
             <a:picLocks noChangeAspect="1"/>
           </p:cNvPicPr>
@@ -11369,8 +11663,38 @@
         </p:blipFill>
         <p:spPr>
           <a:xfrm>
-            <a:off x="2991637" y="3123747"/>
-            <a:ext cx="4199385" cy="1640164"/>
+            <a:off x="443103" y="887206"/>
+            <a:ext cx="2974622" cy="2117142"/>
+          </a:xfrm>
+          <a:prstGeom prst="rect">
+            <a:avLst/>
+          </a:prstGeom>
+        </p:spPr>
+      </p:pic>
+      <p:pic>
+        <p:nvPicPr>
+          <p:cNvPr id="6" name="Picture 5"/>
+          <p:cNvPicPr>
+            <a:picLocks noChangeAspect="1"/>
+          </p:cNvPicPr>
+          <p:nvPr/>
+        </p:nvPicPr>
+        <p:blipFill>
+          <a:blip r:embed="rId4">
+            <a:extLst>
+              <a:ext uri="{28A0092B-C50C-407E-A947-70E740481C1C}">
+                <a14:useLocalDpi xmlns:a14="http://schemas.microsoft.com/office/drawing/2010/main" val="0"/>
+              </a:ext>
+            </a:extLst>
+          </a:blip>
+          <a:stretch>
+            <a:fillRect/>
+          </a:stretch>
+        </p:blipFill>
+        <p:spPr>
+          <a:xfrm>
+            <a:off x="444182" y="3004348"/>
+            <a:ext cx="3302971" cy="2153105"/>
           </a:xfrm>
           <a:prstGeom prst="rect">
             <a:avLst/>

</xml_diff>